<commit_message>
Committing new changes to Final presentation
</commit_message>
<xml_diff>
--- a/An Analysis of the World Suicide Data_sn.pptx
+++ b/An Analysis of the World Suicide Data_sn.pptx
@@ -8,24 +8,19 @@
     <p:sldId id="256" r:id="rId2"/>
     <p:sldId id="271" r:id="rId3"/>
     <p:sldId id="273" r:id="rId4"/>
-    <p:sldId id="274" r:id="rId5"/>
-    <p:sldId id="272" r:id="rId6"/>
-    <p:sldId id="275" r:id="rId7"/>
-    <p:sldId id="276" r:id="rId8"/>
-    <p:sldId id="277" r:id="rId9"/>
-    <p:sldId id="278" r:id="rId10"/>
-    <p:sldId id="286" r:id="rId11"/>
-    <p:sldId id="290" r:id="rId12"/>
-    <p:sldId id="289" r:id="rId13"/>
+    <p:sldId id="292" r:id="rId5"/>
+    <p:sldId id="274" r:id="rId6"/>
+    <p:sldId id="272" r:id="rId7"/>
+    <p:sldId id="275" r:id="rId8"/>
+    <p:sldId id="276" r:id="rId9"/>
+    <p:sldId id="277" r:id="rId10"/>
+    <p:sldId id="278" r:id="rId11"/>
+    <p:sldId id="286" r:id="rId12"/>
+    <p:sldId id="290" r:id="rId13"/>
     <p:sldId id="279" r:id="rId14"/>
     <p:sldId id="288" r:id="rId15"/>
     <p:sldId id="287" r:id="rId16"/>
-    <p:sldId id="280" r:id="rId17"/>
-    <p:sldId id="281" r:id="rId18"/>
-    <p:sldId id="282" r:id="rId19"/>
-    <p:sldId id="283" r:id="rId20"/>
-    <p:sldId id="284" r:id="rId21"/>
-    <p:sldId id="285" r:id="rId22"/>
+    <p:sldId id="291" r:id="rId17"/>
   </p:sldIdLst>
   <p:sldSz cx="12192000" cy="6858000"/>
   <p:notesSz cx="6858000" cy="9144000"/>
@@ -263,7 +258,7 @@
           <a:p>
             <a:fld id="{EC605549-8D56-4ECC-A387-285E02A83312}" type="datetimeFigureOut">
               <a:rPr lang="en-US" smtClean="0"/>
-              <a:t>6/23/2020</a:t>
+              <a:t>6/24/2020</a:t>
             </a:fld>
             <a:endParaRPr lang="en-US"/>
           </a:p>
@@ -433,7 +428,7 @@
           <a:p>
             <a:fld id="{EC605549-8D56-4ECC-A387-285E02A83312}" type="datetimeFigureOut">
               <a:rPr lang="en-US" smtClean="0"/>
-              <a:t>6/23/2020</a:t>
+              <a:t>6/24/2020</a:t>
             </a:fld>
             <a:endParaRPr lang="en-US"/>
           </a:p>
@@ -613,7 +608,7 @@
           <a:p>
             <a:fld id="{EC605549-8D56-4ECC-A387-285E02A83312}" type="datetimeFigureOut">
               <a:rPr lang="en-US" smtClean="0"/>
-              <a:t>6/23/2020</a:t>
+              <a:t>6/24/2020</a:t>
             </a:fld>
             <a:endParaRPr lang="en-US"/>
           </a:p>
@@ -783,7 +778,7 @@
           <a:p>
             <a:fld id="{EC605549-8D56-4ECC-A387-285E02A83312}" type="datetimeFigureOut">
               <a:rPr lang="en-US" smtClean="0"/>
-              <a:t>6/23/2020</a:t>
+              <a:t>6/24/2020</a:t>
             </a:fld>
             <a:endParaRPr lang="en-US"/>
           </a:p>
@@ -1029,7 +1024,7 @@
           <a:p>
             <a:fld id="{EC605549-8D56-4ECC-A387-285E02A83312}" type="datetimeFigureOut">
               <a:rPr lang="en-US" smtClean="0"/>
-              <a:t>6/23/2020</a:t>
+              <a:t>6/24/2020</a:t>
             </a:fld>
             <a:endParaRPr lang="en-US"/>
           </a:p>
@@ -1261,7 +1256,7 @@
           <a:p>
             <a:fld id="{EC605549-8D56-4ECC-A387-285E02A83312}" type="datetimeFigureOut">
               <a:rPr lang="en-US" smtClean="0"/>
-              <a:t>6/23/2020</a:t>
+              <a:t>6/24/2020</a:t>
             </a:fld>
             <a:endParaRPr lang="en-US"/>
           </a:p>
@@ -1628,7 +1623,7 @@
           <a:p>
             <a:fld id="{EC605549-8D56-4ECC-A387-285E02A83312}" type="datetimeFigureOut">
               <a:rPr lang="en-US" smtClean="0"/>
-              <a:t>6/23/2020</a:t>
+              <a:t>6/24/2020</a:t>
             </a:fld>
             <a:endParaRPr lang="en-US"/>
           </a:p>
@@ -1746,7 +1741,7 @@
           <a:p>
             <a:fld id="{EC605549-8D56-4ECC-A387-285E02A83312}" type="datetimeFigureOut">
               <a:rPr lang="en-US" smtClean="0"/>
-              <a:t>6/23/2020</a:t>
+              <a:t>6/24/2020</a:t>
             </a:fld>
             <a:endParaRPr lang="en-US"/>
           </a:p>
@@ -1841,7 +1836,7 @@
           <a:p>
             <a:fld id="{EC605549-8D56-4ECC-A387-285E02A83312}" type="datetimeFigureOut">
               <a:rPr lang="en-US" smtClean="0"/>
-              <a:t>6/23/2020</a:t>
+              <a:t>6/24/2020</a:t>
             </a:fld>
             <a:endParaRPr lang="en-US"/>
           </a:p>
@@ -2118,7 +2113,7 @@
           <a:p>
             <a:fld id="{EC605549-8D56-4ECC-A387-285E02A83312}" type="datetimeFigureOut">
               <a:rPr lang="en-US" smtClean="0"/>
-              <a:t>6/23/2020</a:t>
+              <a:t>6/24/2020</a:t>
             </a:fld>
             <a:endParaRPr lang="en-US"/>
           </a:p>
@@ -2371,7 +2366,7 @@
           <a:p>
             <a:fld id="{EC605549-8D56-4ECC-A387-285E02A83312}" type="datetimeFigureOut">
               <a:rPr lang="en-US" smtClean="0"/>
-              <a:t>6/23/2020</a:t>
+              <a:t>6/24/2020</a:t>
             </a:fld>
             <a:endParaRPr lang="en-US"/>
           </a:p>
@@ -2584,7 +2579,7 @@
           <a:p>
             <a:fld id="{EC605549-8D56-4ECC-A387-285E02A83312}" type="datetimeFigureOut">
               <a:rPr lang="en-US" smtClean="0"/>
-              <a:t>6/23/2020</a:t>
+              <a:t>6/24/2020</a:t>
             </a:fld>
             <a:endParaRPr lang="en-US"/>
           </a:p>
@@ -3132,135 +3127,7 @@
           <a:p>
             <a:r>
               <a:rPr lang="en-US" dirty="0" smtClean="0"/>
-              <a:t>Top 5 countries by Continent/Year</a:t>
-            </a:r>
-            <a:endParaRPr lang="en-US" dirty="0"/>
-          </a:p>
-        </p:txBody>
-      </p:sp>
-      <p:sp>
-        <p:nvSpPr>
-          <p:cNvPr id="6" name="TextBox 5"/>
-          <p:cNvSpPr txBox="1"/>
-          <p:nvPr/>
-        </p:nvSpPr>
-        <p:spPr>
-          <a:xfrm>
-            <a:off x="563255" y="956231"/>
-            <a:ext cx="1536192" cy="369332"/>
-          </a:xfrm>
-          <a:prstGeom prst="rect">
-            <a:avLst/>
-          </a:prstGeom>
-          <a:solidFill>
-            <a:schemeClr val="accent2"/>
-          </a:solidFill>
-        </p:spPr>
-        <p:txBody>
-          <a:bodyPr wrap="square" rtlCol="0">
-            <a:spAutoFit/>
-          </a:bodyPr>
-          <a:lstStyle/>
-          <a:p>
-            <a:r>
-              <a:rPr lang="en-US" dirty="0" smtClean="0"/>
-              <a:t>1985</a:t>
-            </a:r>
-            <a:endParaRPr lang="en-US" dirty="0"/>
-          </a:p>
-        </p:txBody>
-      </p:sp>
-      <p:sp>
-        <p:nvSpPr>
-          <p:cNvPr id="7" name="TextBox 6"/>
-          <p:cNvSpPr txBox="1"/>
-          <p:nvPr/>
-        </p:nvSpPr>
-        <p:spPr>
-          <a:xfrm>
-            <a:off x="258455" y="4137501"/>
-            <a:ext cx="1536192" cy="369332"/>
-          </a:xfrm>
-          <a:prstGeom prst="rect">
-            <a:avLst/>
-          </a:prstGeom>
-          <a:solidFill>
-            <a:schemeClr val="accent2"/>
-          </a:solidFill>
-        </p:spPr>
-        <p:txBody>
-          <a:bodyPr wrap="square" rtlCol="0">
-            <a:spAutoFit/>
-          </a:bodyPr>
-          <a:lstStyle/>
-          <a:p>
-            <a:r>
-              <a:rPr lang="en-US" dirty="0" smtClean="0"/>
-              <a:t>1995</a:t>
-            </a:r>
-            <a:endParaRPr lang="en-US" dirty="0"/>
-          </a:p>
-        </p:txBody>
-      </p:sp>
-      <p:sp>
-        <p:nvSpPr>
-          <p:cNvPr id="8" name="TextBox 7"/>
-          <p:cNvSpPr txBox="1"/>
-          <p:nvPr/>
-        </p:nvSpPr>
-        <p:spPr>
-          <a:xfrm>
-            <a:off x="6247775" y="1176418"/>
-            <a:ext cx="1536192" cy="369332"/>
-          </a:xfrm>
-          <a:prstGeom prst="rect">
-            <a:avLst/>
-          </a:prstGeom>
-          <a:solidFill>
-            <a:schemeClr val="accent2"/>
-          </a:solidFill>
-        </p:spPr>
-        <p:txBody>
-          <a:bodyPr wrap="square" rtlCol="0">
-            <a:spAutoFit/>
-          </a:bodyPr>
-          <a:lstStyle/>
-          <a:p>
-            <a:r>
-              <a:rPr lang="en-US" dirty="0" smtClean="0"/>
-              <a:t>2005</a:t>
-            </a:r>
-            <a:endParaRPr lang="en-US" dirty="0"/>
-          </a:p>
-        </p:txBody>
-      </p:sp>
-      <p:sp>
-        <p:nvSpPr>
-          <p:cNvPr id="9" name="TextBox 8"/>
-          <p:cNvSpPr txBox="1"/>
-          <p:nvPr/>
-        </p:nvSpPr>
-        <p:spPr>
-          <a:xfrm>
-            <a:off x="5942975" y="4357688"/>
-            <a:ext cx="1536192" cy="369332"/>
-          </a:xfrm>
-          <a:prstGeom prst="rect">
-            <a:avLst/>
-          </a:prstGeom>
-          <a:solidFill>
-            <a:schemeClr val="accent2"/>
-          </a:solidFill>
-        </p:spPr>
-        <p:txBody>
-          <a:bodyPr wrap="square" rtlCol="0">
-            <a:spAutoFit/>
-          </a:bodyPr>
-          <a:lstStyle/>
-          <a:p>
-            <a:r>
-              <a:rPr lang="en-US" dirty="0" smtClean="0"/>
-              <a:t>2015</a:t>
+              <a:t>Top 5 countries by Year</a:t>
             </a:r>
             <a:endParaRPr lang="en-US" dirty="0"/>
           </a:p>
@@ -3268,11 +3135,13 @@
       </p:sp>
       <p:pic>
         <p:nvPicPr>
-          <p:cNvPr id="12" name="Picture 11"/>
+          <p:cNvPr id="4" name="Content Placeholder 3"/>
           <p:cNvPicPr>
-            <a:picLocks noChangeAspect="1"/>
+            <a:picLocks noGrp="1" noChangeAspect="1"/>
           </p:cNvPicPr>
-          <p:nvPr/>
+          <p:nvPr>
+            <p:ph idx="1"/>
+          </p:nvPr>
         </p:nvPicPr>
         <p:blipFill>
           <a:blip r:embed="rId2">
@@ -3288,17 +3157,14 @@
         </p:blipFill>
         <p:spPr>
           <a:xfrm>
-            <a:off x="258455" y="1361084"/>
-            <a:ext cx="3741771" cy="2494514"/>
-          </a:xfrm>
-          <a:prstGeom prst="rect">
-            <a:avLst/>
-          </a:prstGeom>
+            <a:off x="563255" y="1393350"/>
+            <a:ext cx="4116227" cy="2744151"/>
+          </a:xfrm>
         </p:spPr>
       </p:pic>
       <p:pic>
         <p:nvPicPr>
-          <p:cNvPr id="13" name="Picture 12"/>
+          <p:cNvPr id="5" name="Picture 4"/>
           <p:cNvPicPr>
             <a:picLocks noChangeAspect="1"/>
           </p:cNvPicPr>
@@ -3318,17 +3184,145 @@
         </p:blipFill>
         <p:spPr>
           <a:xfrm>
-            <a:off x="461421" y="4425450"/>
-            <a:ext cx="3196179" cy="2130786"/>
+            <a:off x="563255" y="4357688"/>
+            <a:ext cx="4025412" cy="2683608"/>
           </a:xfrm>
           <a:prstGeom prst="rect">
             <a:avLst/>
           </a:prstGeom>
         </p:spPr>
       </p:pic>
+      <p:sp>
+        <p:nvSpPr>
+          <p:cNvPr id="6" name="TextBox 5"/>
+          <p:cNvSpPr txBox="1"/>
+          <p:nvPr/>
+        </p:nvSpPr>
+        <p:spPr>
+          <a:xfrm>
+            <a:off x="563255" y="956231"/>
+            <a:ext cx="1536192" cy="369332"/>
+          </a:xfrm>
+          <a:prstGeom prst="rect">
+            <a:avLst/>
+          </a:prstGeom>
+          <a:solidFill>
+            <a:schemeClr val="accent2"/>
+          </a:solidFill>
+        </p:spPr>
+        <p:txBody>
+          <a:bodyPr wrap="square" rtlCol="0">
+            <a:spAutoFit/>
+          </a:bodyPr>
+          <a:lstStyle/>
+          <a:p>
+            <a:r>
+              <a:rPr lang="en-US" dirty="0" smtClean="0"/>
+              <a:t>1985</a:t>
+            </a:r>
+            <a:endParaRPr lang="en-US" dirty="0"/>
+          </a:p>
+        </p:txBody>
+      </p:sp>
+      <p:sp>
+        <p:nvSpPr>
+          <p:cNvPr id="7" name="TextBox 6"/>
+          <p:cNvSpPr txBox="1"/>
+          <p:nvPr/>
+        </p:nvSpPr>
+        <p:spPr>
+          <a:xfrm>
+            <a:off x="258455" y="4137501"/>
+            <a:ext cx="1536192" cy="369332"/>
+          </a:xfrm>
+          <a:prstGeom prst="rect">
+            <a:avLst/>
+          </a:prstGeom>
+          <a:solidFill>
+            <a:schemeClr val="accent2"/>
+          </a:solidFill>
+        </p:spPr>
+        <p:txBody>
+          <a:bodyPr wrap="square" rtlCol="0">
+            <a:spAutoFit/>
+          </a:bodyPr>
+          <a:lstStyle/>
+          <a:p>
+            <a:r>
+              <a:rPr lang="en-US" dirty="0" smtClean="0"/>
+              <a:t>1995</a:t>
+            </a:r>
+            <a:endParaRPr lang="en-US" dirty="0"/>
+          </a:p>
+        </p:txBody>
+      </p:sp>
+      <p:sp>
+        <p:nvSpPr>
+          <p:cNvPr id="8" name="TextBox 7"/>
+          <p:cNvSpPr txBox="1"/>
+          <p:nvPr/>
+        </p:nvSpPr>
+        <p:spPr>
+          <a:xfrm>
+            <a:off x="6247775" y="1176418"/>
+            <a:ext cx="1536192" cy="369332"/>
+          </a:xfrm>
+          <a:prstGeom prst="rect">
+            <a:avLst/>
+          </a:prstGeom>
+          <a:solidFill>
+            <a:schemeClr val="accent2"/>
+          </a:solidFill>
+        </p:spPr>
+        <p:txBody>
+          <a:bodyPr wrap="square" rtlCol="0">
+            <a:spAutoFit/>
+          </a:bodyPr>
+          <a:lstStyle/>
+          <a:p>
+            <a:r>
+              <a:rPr lang="en-US" dirty="0" smtClean="0"/>
+              <a:t>2005</a:t>
+            </a:r>
+            <a:endParaRPr lang="en-US" dirty="0"/>
+          </a:p>
+        </p:txBody>
+      </p:sp>
+      <p:sp>
+        <p:nvSpPr>
+          <p:cNvPr id="9" name="TextBox 8"/>
+          <p:cNvSpPr txBox="1"/>
+          <p:nvPr/>
+        </p:nvSpPr>
+        <p:spPr>
+          <a:xfrm>
+            <a:off x="5942975" y="4357688"/>
+            <a:ext cx="1536192" cy="369332"/>
+          </a:xfrm>
+          <a:prstGeom prst="rect">
+            <a:avLst/>
+          </a:prstGeom>
+          <a:solidFill>
+            <a:schemeClr val="accent2"/>
+          </a:solidFill>
+        </p:spPr>
+        <p:txBody>
+          <a:bodyPr wrap="square" rtlCol="0">
+            <a:spAutoFit/>
+          </a:bodyPr>
+          <a:lstStyle/>
+          <a:p>
+            <a:r>
+              <a:rPr lang="en-US" dirty="0" smtClean="0"/>
+              <a:t>2015</a:t>
+            </a:r>
+            <a:endParaRPr lang="en-US" dirty="0"/>
+          </a:p>
+        </p:txBody>
+      </p:sp>
       <p:pic>
         <p:nvPicPr>
-          <p:cNvPr id="14" name="Picture 13"/>
+          <p:cNvPr id="10" name="Picture 9"/>
           <p:cNvPicPr>
             <a:picLocks noChangeAspect="1"/>
           </p:cNvPicPr>
@@ -3348,8 +3342,8 @@
         </p:blipFill>
         <p:spPr>
           <a:xfrm>
-            <a:off x="5942975" y="1634206"/>
-            <a:ext cx="3703945" cy="2469296"/>
+            <a:off x="7626994" y="1538905"/>
+            <a:ext cx="3908161" cy="2605440"/>
           </a:xfrm>
           <a:prstGeom prst="rect">
             <a:avLst/>
@@ -3358,7 +3352,7 @@
       </p:pic>
       <p:pic>
         <p:nvPicPr>
-          <p:cNvPr id="15" name="Picture 14"/>
+          <p:cNvPr id="11" name="Picture 10"/>
           <p:cNvPicPr>
             <a:picLocks noChangeAspect="1"/>
           </p:cNvPicPr>
@@ -3378,8 +3372,8 @@
         </p:blipFill>
         <p:spPr>
           <a:xfrm>
-            <a:off x="7833321" y="4322167"/>
-            <a:ext cx="3862441" cy="2574960"/>
+            <a:off x="7695575" y="4506833"/>
+            <a:ext cx="3771001" cy="2514000"/>
           </a:xfrm>
           <a:prstGeom prst="rect">
             <a:avLst/>
@@ -3389,7 +3383,7 @@
     </p:spTree>
     <p:extLst>
       <p:ext uri="{BB962C8B-B14F-4D97-AF65-F5344CB8AC3E}">
-        <p14:creationId xmlns:p14="http://schemas.microsoft.com/office/powerpoint/2010/main" val="825486652"/>
+        <p14:creationId xmlns:p14="http://schemas.microsoft.com/office/powerpoint/2010/main" val="2999283922"/>
       </p:ext>
     </p:extLst>
   </p:cSld>
@@ -3426,24 +3420,159 @@
             <p:ph type="title"/>
           </p:nvPr>
         </p:nvSpPr>
-        <p:spPr/>
+        <p:spPr>
+          <a:xfrm>
+            <a:off x="408432" y="0"/>
+            <a:ext cx="10515600" cy="1325563"/>
+          </a:xfrm>
+        </p:spPr>
         <p:txBody>
           <a:bodyPr/>
           <a:lstStyle/>
           <a:p>
-            <a:endParaRPr lang="en-US"/>
+            <a:r>
+              <a:rPr lang="en-US" dirty="0" smtClean="0"/>
+              <a:t>Top 5 countries by Continent/Year</a:t>
+            </a:r>
+            <a:endParaRPr lang="en-US" dirty="0"/>
+          </a:p>
+        </p:txBody>
+      </p:sp>
+      <p:sp>
+        <p:nvSpPr>
+          <p:cNvPr id="6" name="TextBox 5"/>
+          <p:cNvSpPr txBox="1"/>
+          <p:nvPr/>
+        </p:nvSpPr>
+        <p:spPr>
+          <a:xfrm>
+            <a:off x="563255" y="956231"/>
+            <a:ext cx="1536192" cy="369332"/>
+          </a:xfrm>
+          <a:prstGeom prst="rect">
+            <a:avLst/>
+          </a:prstGeom>
+          <a:solidFill>
+            <a:schemeClr val="accent2"/>
+          </a:solidFill>
+        </p:spPr>
+        <p:txBody>
+          <a:bodyPr wrap="square" rtlCol="0">
+            <a:spAutoFit/>
+          </a:bodyPr>
+          <a:lstStyle/>
+          <a:p>
+            <a:r>
+              <a:rPr lang="en-US" dirty="0" smtClean="0"/>
+              <a:t>1985</a:t>
+            </a:r>
+            <a:endParaRPr lang="en-US" dirty="0"/>
+          </a:p>
+        </p:txBody>
+      </p:sp>
+      <p:sp>
+        <p:nvSpPr>
+          <p:cNvPr id="7" name="TextBox 6"/>
+          <p:cNvSpPr txBox="1"/>
+          <p:nvPr/>
+        </p:nvSpPr>
+        <p:spPr>
+          <a:xfrm>
+            <a:off x="258455" y="4137501"/>
+            <a:ext cx="1536192" cy="369332"/>
+          </a:xfrm>
+          <a:prstGeom prst="rect">
+            <a:avLst/>
+          </a:prstGeom>
+          <a:solidFill>
+            <a:schemeClr val="accent2"/>
+          </a:solidFill>
+        </p:spPr>
+        <p:txBody>
+          <a:bodyPr wrap="square" rtlCol="0">
+            <a:spAutoFit/>
+          </a:bodyPr>
+          <a:lstStyle/>
+          <a:p>
+            <a:r>
+              <a:rPr lang="en-US" dirty="0" smtClean="0"/>
+              <a:t>1995</a:t>
+            </a:r>
+            <a:endParaRPr lang="en-US" dirty="0"/>
+          </a:p>
+        </p:txBody>
+      </p:sp>
+      <p:sp>
+        <p:nvSpPr>
+          <p:cNvPr id="8" name="TextBox 7"/>
+          <p:cNvSpPr txBox="1"/>
+          <p:nvPr/>
+        </p:nvSpPr>
+        <p:spPr>
+          <a:xfrm>
+            <a:off x="6247775" y="1176418"/>
+            <a:ext cx="1536192" cy="369332"/>
+          </a:xfrm>
+          <a:prstGeom prst="rect">
+            <a:avLst/>
+          </a:prstGeom>
+          <a:solidFill>
+            <a:schemeClr val="accent2"/>
+          </a:solidFill>
+        </p:spPr>
+        <p:txBody>
+          <a:bodyPr wrap="square" rtlCol="0">
+            <a:spAutoFit/>
+          </a:bodyPr>
+          <a:lstStyle/>
+          <a:p>
+            <a:r>
+              <a:rPr lang="en-US" dirty="0" smtClean="0"/>
+              <a:t>2005</a:t>
+            </a:r>
+            <a:endParaRPr lang="en-US" dirty="0"/>
+          </a:p>
+        </p:txBody>
+      </p:sp>
+      <p:sp>
+        <p:nvSpPr>
+          <p:cNvPr id="9" name="TextBox 8"/>
+          <p:cNvSpPr txBox="1"/>
+          <p:nvPr/>
+        </p:nvSpPr>
+        <p:spPr>
+          <a:xfrm>
+            <a:off x="5942975" y="4357688"/>
+            <a:ext cx="1536192" cy="369332"/>
+          </a:xfrm>
+          <a:prstGeom prst="rect">
+            <a:avLst/>
+          </a:prstGeom>
+          <a:solidFill>
+            <a:schemeClr val="accent2"/>
+          </a:solidFill>
+        </p:spPr>
+        <p:txBody>
+          <a:bodyPr wrap="square" rtlCol="0">
+            <a:spAutoFit/>
+          </a:bodyPr>
+          <a:lstStyle/>
+          <a:p>
+            <a:r>
+              <a:rPr lang="en-US" dirty="0" smtClean="0"/>
+              <a:t>2015</a:t>
+            </a:r>
+            <a:endParaRPr lang="en-US" dirty="0"/>
           </a:p>
         </p:txBody>
       </p:sp>
       <p:pic>
         <p:nvPicPr>
-          <p:cNvPr id="4" name="Content Placeholder 3"/>
+          <p:cNvPr id="12" name="Picture 11"/>
           <p:cNvPicPr>
-            <a:picLocks noGrp="1" noChangeAspect="1"/>
+            <a:picLocks noChangeAspect="1"/>
           </p:cNvPicPr>
-          <p:nvPr>
-            <p:ph idx="1"/>
-          </p:nvPr>
+          <p:nvPr/>
         </p:nvPicPr>
         <p:blipFill>
           <a:blip r:embed="rId2">
@@ -3459,21 +3588,17 @@
         </p:blipFill>
         <p:spPr>
           <a:xfrm>
-            <a:off x="5964555" y="1475232"/>
-            <a:ext cx="5843397" cy="5257800"/>
-          </a:xfrm>
-          <a:ln>
-            <a:solidFill>
-              <a:schemeClr val="bg2">
-                <a:lumMod val="90000"/>
-              </a:schemeClr>
-            </a:solidFill>
-          </a:ln>
+            <a:off x="258455" y="1361084"/>
+            <a:ext cx="3741771" cy="2494514"/>
+          </a:xfrm>
+          <a:prstGeom prst="rect">
+            <a:avLst/>
+          </a:prstGeom>
         </p:spPr>
       </p:pic>
       <p:pic>
         <p:nvPicPr>
-          <p:cNvPr id="5" name="Picture 4"/>
+          <p:cNvPr id="13" name="Picture 12"/>
           <p:cNvPicPr>
             <a:picLocks noChangeAspect="1"/>
           </p:cNvPicPr>
@@ -3493,25 +3618,78 @@
         </p:blipFill>
         <p:spPr>
           <a:xfrm>
-            <a:off x="384048" y="1475232"/>
-            <a:ext cx="5257800" cy="5257800"/>
+            <a:off x="461421" y="4425450"/>
+            <a:ext cx="3196179" cy="2130786"/>
           </a:xfrm>
           <a:prstGeom prst="rect">
             <a:avLst/>
           </a:prstGeom>
-          <a:ln>
-            <a:solidFill>
-              <a:schemeClr val="bg2">
-                <a:lumMod val="90000"/>
-              </a:schemeClr>
-            </a:solidFill>
-          </a:ln>
+        </p:spPr>
+      </p:pic>
+      <p:pic>
+        <p:nvPicPr>
+          <p:cNvPr id="14" name="Picture 13"/>
+          <p:cNvPicPr>
+            <a:picLocks noChangeAspect="1"/>
+          </p:cNvPicPr>
+          <p:nvPr/>
+        </p:nvPicPr>
+        <p:blipFill>
+          <a:blip r:embed="rId4">
+            <a:extLst>
+              <a:ext uri="{28A0092B-C50C-407E-A947-70E740481C1C}">
+                <a14:useLocalDpi xmlns:a14="http://schemas.microsoft.com/office/drawing/2010/main" val="0"/>
+              </a:ext>
+            </a:extLst>
+          </a:blip>
+          <a:stretch>
+            <a:fillRect/>
+          </a:stretch>
+        </p:blipFill>
+        <p:spPr>
+          <a:xfrm>
+            <a:off x="5942975" y="1634206"/>
+            <a:ext cx="3703945" cy="2469296"/>
+          </a:xfrm>
+          <a:prstGeom prst="rect">
+            <a:avLst/>
+          </a:prstGeom>
+        </p:spPr>
+      </p:pic>
+      <p:pic>
+        <p:nvPicPr>
+          <p:cNvPr id="15" name="Picture 14"/>
+          <p:cNvPicPr>
+            <a:picLocks noChangeAspect="1"/>
+          </p:cNvPicPr>
+          <p:nvPr/>
+        </p:nvPicPr>
+        <p:blipFill>
+          <a:blip r:embed="rId5">
+            <a:extLst>
+              <a:ext uri="{28A0092B-C50C-407E-A947-70E740481C1C}">
+                <a14:useLocalDpi xmlns:a14="http://schemas.microsoft.com/office/drawing/2010/main" val="0"/>
+              </a:ext>
+            </a:extLst>
+          </a:blip>
+          <a:stretch>
+            <a:fillRect/>
+          </a:stretch>
+        </p:blipFill>
+        <p:spPr>
+          <a:xfrm>
+            <a:off x="7833321" y="4322167"/>
+            <a:ext cx="3862441" cy="2574960"/>
+          </a:xfrm>
+          <a:prstGeom prst="rect">
+            <a:avLst/>
+          </a:prstGeom>
         </p:spPr>
       </p:pic>
     </p:spTree>
     <p:extLst>
       <p:ext uri="{BB962C8B-B14F-4D97-AF65-F5344CB8AC3E}">
-        <p14:creationId xmlns:p14="http://schemas.microsoft.com/office/powerpoint/2010/main" val="1542870532"/>
+        <p14:creationId xmlns:p14="http://schemas.microsoft.com/office/powerpoint/2010/main" val="825486652"/>
       </p:ext>
     </p:extLst>
   </p:cSld>
@@ -3557,29 +3735,83 @@
           </a:p>
         </p:txBody>
       </p:sp>
-      <p:sp>
-        <p:nvSpPr>
-          <p:cNvPr id="3" name="Content Placeholder 2"/>
-          <p:cNvSpPr>
-            <a:spLocks noGrp="1"/>
-          </p:cNvSpPr>
+      <p:pic>
+        <p:nvPicPr>
+          <p:cNvPr id="4" name="Content Placeholder 3"/>
+          <p:cNvPicPr>
+            <a:picLocks noGrp="1" noChangeAspect="1"/>
+          </p:cNvPicPr>
           <p:nvPr>
             <p:ph idx="1"/>
           </p:nvPr>
-        </p:nvSpPr>
-        <p:spPr/>
-        <p:txBody>
-          <a:bodyPr/>
-          <a:lstStyle/>
-          <a:p>
-            <a:endParaRPr lang="en-US"/>
-          </a:p>
-        </p:txBody>
-      </p:sp>
+        </p:nvPicPr>
+        <p:blipFill>
+          <a:blip r:embed="rId2">
+            <a:extLst>
+              <a:ext uri="{28A0092B-C50C-407E-A947-70E740481C1C}">
+                <a14:useLocalDpi xmlns:a14="http://schemas.microsoft.com/office/drawing/2010/main" val="0"/>
+              </a:ext>
+            </a:extLst>
+          </a:blip>
+          <a:stretch>
+            <a:fillRect/>
+          </a:stretch>
+        </p:blipFill>
+        <p:spPr>
+          <a:xfrm>
+            <a:off x="5768081" y="1298448"/>
+            <a:ext cx="6039871" cy="5434584"/>
+          </a:xfrm>
+          <a:ln>
+            <a:solidFill>
+              <a:schemeClr val="bg2">
+                <a:lumMod val="90000"/>
+              </a:schemeClr>
+            </a:solidFill>
+          </a:ln>
+        </p:spPr>
+      </p:pic>
+      <p:pic>
+        <p:nvPicPr>
+          <p:cNvPr id="5" name="Picture 4"/>
+          <p:cNvPicPr>
+            <a:picLocks noChangeAspect="1"/>
+          </p:cNvPicPr>
+          <p:nvPr/>
+        </p:nvPicPr>
+        <p:blipFill>
+          <a:blip r:embed="rId3">
+            <a:extLst>
+              <a:ext uri="{28A0092B-C50C-407E-A947-70E740481C1C}">
+                <a14:useLocalDpi xmlns:a14="http://schemas.microsoft.com/office/drawing/2010/main" val="0"/>
+              </a:ext>
+            </a:extLst>
+          </a:blip>
+          <a:stretch>
+            <a:fillRect/>
+          </a:stretch>
+        </p:blipFill>
+        <p:spPr>
+          <a:xfrm>
+            <a:off x="384048" y="1475232"/>
+            <a:ext cx="5257800" cy="5257800"/>
+          </a:xfrm>
+          <a:prstGeom prst="rect">
+            <a:avLst/>
+          </a:prstGeom>
+          <a:ln>
+            <a:solidFill>
+              <a:schemeClr val="bg2">
+                <a:lumMod val="90000"/>
+              </a:schemeClr>
+            </a:solidFill>
+          </a:ln>
+        </p:spPr>
+      </p:pic>
     </p:spTree>
     <p:extLst>
       <p:ext uri="{BB962C8B-B14F-4D97-AF65-F5344CB8AC3E}">
-        <p14:creationId xmlns:p14="http://schemas.microsoft.com/office/powerpoint/2010/main" val="3075939537"/>
+        <p14:creationId xmlns:p14="http://schemas.microsoft.com/office/powerpoint/2010/main" val="1542870532"/>
       </p:ext>
     </p:extLst>
   </p:cSld>
@@ -4264,12 +4496,21 @@
             <p:ph type="title"/>
           </p:nvPr>
         </p:nvSpPr>
-        <p:spPr/>
+        <p:spPr>
+          <a:xfrm>
+            <a:off x="838200" y="1"/>
+            <a:ext cx="10515600" cy="713232"/>
+          </a:xfrm>
+        </p:spPr>
         <p:txBody>
           <a:bodyPr/>
           <a:lstStyle/>
           <a:p>
-            <a:endParaRPr lang="en-US"/>
+            <a:r>
+              <a:rPr lang="en-US" dirty="0" smtClean="0"/>
+              <a:t>CONCLUSIONS</a:t>
+            </a:r>
+            <a:endParaRPr lang="en-US" dirty="0"/>
           </a:p>
         </p:txBody>
       </p:sp>
@@ -4283,223 +4524,61 @@
             <p:ph idx="1"/>
           </p:nvPr>
         </p:nvSpPr>
-        <p:spPr/>
+        <p:spPr>
+          <a:xfrm>
+            <a:off x="838200" y="1197866"/>
+            <a:ext cx="10515600" cy="5463730"/>
+          </a:xfrm>
+        </p:spPr>
         <p:txBody>
           <a:bodyPr/>
           <a:lstStyle/>
           <a:p>
-            <a:endParaRPr lang="en-US"/>
+            <a:r>
+              <a:rPr lang="en-US" dirty="0" smtClean="0"/>
+              <a:t>The male suicide rate was 3.5 times the female suicide rate.</a:t>
+            </a:r>
+          </a:p>
+          <a:p>
+            <a:endParaRPr lang="en-US" dirty="0" smtClean="0"/>
+          </a:p>
+          <a:p>
+            <a:r>
+              <a:rPr lang="en-US" dirty="0" smtClean="0"/>
+              <a:t>The highest suicide rate was seen in the oldest age group(75+). Further analysis showed a declining trend for the oldest age group, but a flat or increasing trend for all other age groups.</a:t>
+            </a:r>
+          </a:p>
+          <a:p>
+            <a:pPr marL="0" indent="0">
+              <a:buNone/>
+            </a:pPr>
+            <a:endParaRPr lang="en-US" dirty="0" smtClean="0"/>
+          </a:p>
+          <a:p>
+            <a:r>
+              <a:rPr lang="en-US" dirty="0" smtClean="0"/>
+              <a:t>On a normalized basis, Europe had the highest suicide rate out of 6 other continents in the analysis.</a:t>
+            </a:r>
+          </a:p>
+          <a:p>
+            <a:endParaRPr lang="en-US" dirty="0"/>
+          </a:p>
+          <a:p>
+            <a:r>
+              <a:rPr lang="en-US" dirty="0" smtClean="0"/>
+              <a:t>The correlations between variables based on different data slices was presented.</a:t>
+            </a:r>
+            <a:endParaRPr lang="en-US" dirty="0"/>
+          </a:p>
+          <a:p>
+            <a:endParaRPr lang="en-US" dirty="0"/>
           </a:p>
         </p:txBody>
       </p:sp>
     </p:spTree>
     <p:extLst>
       <p:ext uri="{BB962C8B-B14F-4D97-AF65-F5344CB8AC3E}">
-        <p14:creationId xmlns:p14="http://schemas.microsoft.com/office/powerpoint/2010/main" val="2332209437"/>
-      </p:ext>
-    </p:extLst>
-  </p:cSld>
-  <p:clrMapOvr>
-    <a:masterClrMapping/>
-  </p:clrMapOvr>
-</p:sld>
-</file>
-
-<file path=ppt/slides/slide17.xml><?xml version="1.0" encoding="utf-8"?>
-<p:sld xmlns:a="http://schemas.openxmlformats.org/drawingml/2006/main" xmlns:r="http://schemas.openxmlformats.org/officeDocument/2006/relationships" xmlns:p="http://schemas.openxmlformats.org/presentationml/2006/main">
-  <p:cSld>
-    <p:spTree>
-      <p:nvGrpSpPr>
-        <p:cNvPr id="1" name=""/>
-        <p:cNvGrpSpPr/>
-        <p:nvPr/>
-      </p:nvGrpSpPr>
-      <p:grpSpPr>
-        <a:xfrm>
-          <a:off x="0" y="0"/>
-          <a:ext cx="0" cy="0"/>
-          <a:chOff x="0" y="0"/>
-          <a:chExt cx="0" cy="0"/>
-        </a:xfrm>
-      </p:grpSpPr>
-      <p:sp>
-        <p:nvSpPr>
-          <p:cNvPr id="2" name="Title 1"/>
-          <p:cNvSpPr>
-            <a:spLocks noGrp="1"/>
-          </p:cNvSpPr>
-          <p:nvPr>
-            <p:ph type="title"/>
-          </p:nvPr>
-        </p:nvSpPr>
-        <p:spPr/>
-        <p:txBody>
-          <a:bodyPr/>
-          <a:lstStyle/>
-          <a:p>
-            <a:endParaRPr lang="en-US"/>
-          </a:p>
-        </p:txBody>
-      </p:sp>
-      <p:sp>
-        <p:nvSpPr>
-          <p:cNvPr id="3" name="Content Placeholder 2"/>
-          <p:cNvSpPr>
-            <a:spLocks noGrp="1"/>
-          </p:cNvSpPr>
-          <p:nvPr>
-            <p:ph idx="1"/>
-          </p:nvPr>
-        </p:nvSpPr>
-        <p:spPr/>
-        <p:txBody>
-          <a:bodyPr/>
-          <a:lstStyle/>
-          <a:p>
-            <a:endParaRPr lang="en-US"/>
-          </a:p>
-        </p:txBody>
-      </p:sp>
-    </p:spTree>
-    <p:extLst>
-      <p:ext uri="{BB962C8B-B14F-4D97-AF65-F5344CB8AC3E}">
-        <p14:creationId xmlns:p14="http://schemas.microsoft.com/office/powerpoint/2010/main" val="1473676836"/>
-      </p:ext>
-    </p:extLst>
-  </p:cSld>
-  <p:clrMapOvr>
-    <a:masterClrMapping/>
-  </p:clrMapOvr>
-</p:sld>
-</file>
-
-<file path=ppt/slides/slide18.xml><?xml version="1.0" encoding="utf-8"?>
-<p:sld xmlns:a="http://schemas.openxmlformats.org/drawingml/2006/main" xmlns:r="http://schemas.openxmlformats.org/officeDocument/2006/relationships" xmlns:p="http://schemas.openxmlformats.org/presentationml/2006/main">
-  <p:cSld>
-    <p:spTree>
-      <p:nvGrpSpPr>
-        <p:cNvPr id="1" name=""/>
-        <p:cNvGrpSpPr/>
-        <p:nvPr/>
-      </p:nvGrpSpPr>
-      <p:grpSpPr>
-        <a:xfrm>
-          <a:off x="0" y="0"/>
-          <a:ext cx="0" cy="0"/>
-          <a:chOff x="0" y="0"/>
-          <a:chExt cx="0" cy="0"/>
-        </a:xfrm>
-      </p:grpSpPr>
-      <p:sp>
-        <p:nvSpPr>
-          <p:cNvPr id="2" name="Title 1"/>
-          <p:cNvSpPr>
-            <a:spLocks noGrp="1"/>
-          </p:cNvSpPr>
-          <p:nvPr>
-            <p:ph type="title"/>
-          </p:nvPr>
-        </p:nvSpPr>
-        <p:spPr/>
-        <p:txBody>
-          <a:bodyPr/>
-          <a:lstStyle/>
-          <a:p>
-            <a:endParaRPr lang="en-US"/>
-          </a:p>
-        </p:txBody>
-      </p:sp>
-      <p:sp>
-        <p:nvSpPr>
-          <p:cNvPr id="3" name="Content Placeholder 2"/>
-          <p:cNvSpPr>
-            <a:spLocks noGrp="1"/>
-          </p:cNvSpPr>
-          <p:nvPr>
-            <p:ph idx="1"/>
-          </p:nvPr>
-        </p:nvSpPr>
-        <p:spPr/>
-        <p:txBody>
-          <a:bodyPr/>
-          <a:lstStyle/>
-          <a:p>
-            <a:endParaRPr lang="en-US"/>
-          </a:p>
-        </p:txBody>
-      </p:sp>
-    </p:spTree>
-    <p:extLst>
-      <p:ext uri="{BB962C8B-B14F-4D97-AF65-F5344CB8AC3E}">
-        <p14:creationId xmlns:p14="http://schemas.microsoft.com/office/powerpoint/2010/main" val="1588586215"/>
-      </p:ext>
-    </p:extLst>
-  </p:cSld>
-  <p:clrMapOvr>
-    <a:masterClrMapping/>
-  </p:clrMapOvr>
-</p:sld>
-</file>
-
-<file path=ppt/slides/slide19.xml><?xml version="1.0" encoding="utf-8"?>
-<p:sld xmlns:a="http://schemas.openxmlformats.org/drawingml/2006/main" xmlns:r="http://schemas.openxmlformats.org/officeDocument/2006/relationships" xmlns:p="http://schemas.openxmlformats.org/presentationml/2006/main">
-  <p:cSld>
-    <p:spTree>
-      <p:nvGrpSpPr>
-        <p:cNvPr id="1" name=""/>
-        <p:cNvGrpSpPr/>
-        <p:nvPr/>
-      </p:nvGrpSpPr>
-      <p:grpSpPr>
-        <a:xfrm>
-          <a:off x="0" y="0"/>
-          <a:ext cx="0" cy="0"/>
-          <a:chOff x="0" y="0"/>
-          <a:chExt cx="0" cy="0"/>
-        </a:xfrm>
-      </p:grpSpPr>
-      <p:sp>
-        <p:nvSpPr>
-          <p:cNvPr id="2" name="Title 1"/>
-          <p:cNvSpPr>
-            <a:spLocks noGrp="1"/>
-          </p:cNvSpPr>
-          <p:nvPr>
-            <p:ph type="title"/>
-          </p:nvPr>
-        </p:nvSpPr>
-        <p:spPr/>
-        <p:txBody>
-          <a:bodyPr/>
-          <a:lstStyle/>
-          <a:p>
-            <a:endParaRPr lang="en-US"/>
-          </a:p>
-        </p:txBody>
-      </p:sp>
-      <p:sp>
-        <p:nvSpPr>
-          <p:cNvPr id="3" name="Content Placeholder 2"/>
-          <p:cNvSpPr>
-            <a:spLocks noGrp="1"/>
-          </p:cNvSpPr>
-          <p:nvPr>
-            <p:ph idx="1"/>
-          </p:nvPr>
-        </p:nvSpPr>
-        <p:spPr/>
-        <p:txBody>
-          <a:bodyPr/>
-          <a:lstStyle/>
-          <a:p>
-            <a:endParaRPr lang="en-US"/>
-          </a:p>
-        </p:txBody>
-      </p:sp>
-    </p:spTree>
-    <p:extLst>
-      <p:ext uri="{BB962C8B-B14F-4D97-AF65-F5344CB8AC3E}">
-        <p14:creationId xmlns:p14="http://schemas.microsoft.com/office/powerpoint/2010/main" val="3047254177"/>
+        <p14:creationId xmlns:p14="http://schemas.microsoft.com/office/powerpoint/2010/main" val="1220065480"/>
       </p:ext>
     </p:extLst>
   </p:cSld>
@@ -4587,142 +4666,6 @@
 </p:sld>
 </file>
 
-<file path=ppt/slides/slide20.xml><?xml version="1.0" encoding="utf-8"?>
-<p:sld xmlns:a="http://schemas.openxmlformats.org/drawingml/2006/main" xmlns:r="http://schemas.openxmlformats.org/officeDocument/2006/relationships" xmlns:p="http://schemas.openxmlformats.org/presentationml/2006/main">
-  <p:cSld>
-    <p:spTree>
-      <p:nvGrpSpPr>
-        <p:cNvPr id="1" name=""/>
-        <p:cNvGrpSpPr/>
-        <p:nvPr/>
-      </p:nvGrpSpPr>
-      <p:grpSpPr>
-        <a:xfrm>
-          <a:off x="0" y="0"/>
-          <a:ext cx="0" cy="0"/>
-          <a:chOff x="0" y="0"/>
-          <a:chExt cx="0" cy="0"/>
-        </a:xfrm>
-      </p:grpSpPr>
-      <p:sp>
-        <p:nvSpPr>
-          <p:cNvPr id="2" name="Title 1"/>
-          <p:cNvSpPr>
-            <a:spLocks noGrp="1"/>
-          </p:cNvSpPr>
-          <p:nvPr>
-            <p:ph type="title"/>
-          </p:nvPr>
-        </p:nvSpPr>
-        <p:spPr/>
-        <p:txBody>
-          <a:bodyPr/>
-          <a:lstStyle/>
-          <a:p>
-            <a:endParaRPr lang="en-US"/>
-          </a:p>
-        </p:txBody>
-      </p:sp>
-      <p:sp>
-        <p:nvSpPr>
-          <p:cNvPr id="3" name="Content Placeholder 2"/>
-          <p:cNvSpPr>
-            <a:spLocks noGrp="1"/>
-          </p:cNvSpPr>
-          <p:nvPr>
-            <p:ph idx="1"/>
-          </p:nvPr>
-        </p:nvSpPr>
-        <p:spPr/>
-        <p:txBody>
-          <a:bodyPr/>
-          <a:lstStyle/>
-          <a:p>
-            <a:endParaRPr lang="en-US"/>
-          </a:p>
-        </p:txBody>
-      </p:sp>
-    </p:spTree>
-    <p:extLst>
-      <p:ext uri="{BB962C8B-B14F-4D97-AF65-F5344CB8AC3E}">
-        <p14:creationId xmlns:p14="http://schemas.microsoft.com/office/powerpoint/2010/main" val="3109822834"/>
-      </p:ext>
-    </p:extLst>
-  </p:cSld>
-  <p:clrMapOvr>
-    <a:masterClrMapping/>
-  </p:clrMapOvr>
-</p:sld>
-</file>
-
-<file path=ppt/slides/slide21.xml><?xml version="1.0" encoding="utf-8"?>
-<p:sld xmlns:a="http://schemas.openxmlformats.org/drawingml/2006/main" xmlns:r="http://schemas.openxmlformats.org/officeDocument/2006/relationships" xmlns:p="http://schemas.openxmlformats.org/presentationml/2006/main">
-  <p:cSld>
-    <p:spTree>
-      <p:nvGrpSpPr>
-        <p:cNvPr id="1" name=""/>
-        <p:cNvGrpSpPr/>
-        <p:nvPr/>
-      </p:nvGrpSpPr>
-      <p:grpSpPr>
-        <a:xfrm>
-          <a:off x="0" y="0"/>
-          <a:ext cx="0" cy="0"/>
-          <a:chOff x="0" y="0"/>
-          <a:chExt cx="0" cy="0"/>
-        </a:xfrm>
-      </p:grpSpPr>
-      <p:sp>
-        <p:nvSpPr>
-          <p:cNvPr id="2" name="Title 1"/>
-          <p:cNvSpPr>
-            <a:spLocks noGrp="1"/>
-          </p:cNvSpPr>
-          <p:nvPr>
-            <p:ph type="title"/>
-          </p:nvPr>
-        </p:nvSpPr>
-        <p:spPr/>
-        <p:txBody>
-          <a:bodyPr/>
-          <a:lstStyle/>
-          <a:p>
-            <a:endParaRPr lang="en-US"/>
-          </a:p>
-        </p:txBody>
-      </p:sp>
-      <p:sp>
-        <p:nvSpPr>
-          <p:cNvPr id="3" name="Content Placeholder 2"/>
-          <p:cNvSpPr>
-            <a:spLocks noGrp="1"/>
-          </p:cNvSpPr>
-          <p:nvPr>
-            <p:ph idx="1"/>
-          </p:nvPr>
-        </p:nvSpPr>
-        <p:spPr/>
-        <p:txBody>
-          <a:bodyPr/>
-          <a:lstStyle/>
-          <a:p>
-            <a:endParaRPr lang="en-US"/>
-          </a:p>
-        </p:txBody>
-      </p:sp>
-    </p:spTree>
-    <p:extLst>
-      <p:ext uri="{BB962C8B-B14F-4D97-AF65-F5344CB8AC3E}">
-        <p14:creationId xmlns:p14="http://schemas.microsoft.com/office/powerpoint/2010/main" val="459107222"/>
-      </p:ext>
-    </p:extLst>
-  </p:cSld>
-  <p:clrMapOvr>
-    <a:masterClrMapping/>
-  </p:clrMapOvr>
-</p:sld>
-</file>
-
 <file path=ppt/slides/slide3.xml><?xml version="1.0" encoding="utf-8"?>
 <p:sld xmlns:a="http://schemas.openxmlformats.org/drawingml/2006/main" xmlns:r="http://schemas.openxmlformats.org/officeDocument/2006/relationships" xmlns:p="http://schemas.openxmlformats.org/presentationml/2006/main">
   <p:cSld>
@@ -4757,7 +4700,15 @@
           <a:p>
             <a:r>
               <a:rPr lang="en-US" dirty="0"/>
-              <a:t>Suicide Number</a:t>
+              <a:t>Suicide </a:t>
+            </a:r>
+            <a:r>
+              <a:rPr lang="en-US" dirty="0" smtClean="0"/>
+              <a:t>Number/Rate by Continent</a:t>
+            </a:r>
+            <a:r>
+              <a:rPr lang="en-US" dirty="0"/>
+              <a:t/>
             </a:r>
             <a:br>
               <a:rPr lang="en-US" dirty="0"/>
@@ -4852,6 +4803,143 @@
 </file>
 
 <file path=ppt/slides/slide4.xml><?xml version="1.0" encoding="utf-8"?>
+<p:sld xmlns:a="http://schemas.openxmlformats.org/drawingml/2006/main" xmlns:r="http://schemas.openxmlformats.org/officeDocument/2006/relationships" xmlns:p="http://schemas.openxmlformats.org/presentationml/2006/main">
+  <p:cSld>
+    <p:spTree>
+      <p:nvGrpSpPr>
+        <p:cNvPr id="1" name=""/>
+        <p:cNvGrpSpPr/>
+        <p:nvPr/>
+      </p:nvGrpSpPr>
+      <p:grpSpPr>
+        <a:xfrm>
+          <a:off x="0" y="0"/>
+          <a:ext cx="0" cy="0"/>
+          <a:chOff x="0" y="0"/>
+          <a:chExt cx="0" cy="0"/>
+        </a:xfrm>
+      </p:grpSpPr>
+      <p:sp>
+        <p:nvSpPr>
+          <p:cNvPr id="2" name="Title 1"/>
+          <p:cNvSpPr>
+            <a:spLocks noGrp="1"/>
+          </p:cNvSpPr>
+          <p:nvPr>
+            <p:ph type="title"/>
+          </p:nvPr>
+        </p:nvSpPr>
+        <p:spPr/>
+        <p:txBody>
+          <a:bodyPr/>
+          <a:lstStyle/>
+          <a:p>
+            <a:r>
+              <a:rPr lang="en-US" dirty="0"/>
+              <a:t>Suicide </a:t>
+            </a:r>
+            <a:r>
+              <a:rPr lang="en-US" dirty="0" smtClean="0"/>
+              <a:t>Number/Rate by Generation</a:t>
+            </a:r>
+            <a:r>
+              <a:rPr lang="en-US" dirty="0"/>
+              <a:t/>
+            </a:r>
+            <a:br>
+              <a:rPr lang="en-US" dirty="0"/>
+            </a:br>
+            <a:endParaRPr lang="en-US" dirty="0"/>
+          </a:p>
+        </p:txBody>
+      </p:sp>
+      <p:pic>
+        <p:nvPicPr>
+          <p:cNvPr id="4" name="Content Placeholder 3"/>
+          <p:cNvPicPr>
+            <a:picLocks noGrp="1" noChangeAspect="1"/>
+          </p:cNvPicPr>
+          <p:nvPr>
+            <p:ph idx="1"/>
+          </p:nvPr>
+        </p:nvPicPr>
+        <p:blipFill>
+          <a:blip r:embed="rId2">
+            <a:extLst>
+              <a:ext uri="{28A0092B-C50C-407E-A947-70E740481C1C}">
+                <a14:useLocalDpi xmlns:a14="http://schemas.microsoft.com/office/drawing/2010/main" val="0"/>
+              </a:ext>
+            </a:extLst>
+          </a:blip>
+          <a:stretch>
+            <a:fillRect/>
+          </a:stretch>
+        </p:blipFill>
+        <p:spPr>
+          <a:xfrm>
+            <a:off x="6287399" y="1690687"/>
+            <a:ext cx="5487650" cy="3658433"/>
+          </a:xfrm>
+          <a:ln>
+            <a:solidFill>
+              <a:schemeClr val="bg2">
+                <a:lumMod val="90000"/>
+              </a:schemeClr>
+            </a:solidFill>
+          </a:ln>
+        </p:spPr>
+      </p:pic>
+      <p:pic>
+        <p:nvPicPr>
+          <p:cNvPr id="5" name="Picture 4"/>
+          <p:cNvPicPr>
+            <a:picLocks noChangeAspect="1"/>
+          </p:cNvPicPr>
+          <p:nvPr/>
+        </p:nvPicPr>
+        <p:blipFill>
+          <a:blip r:embed="rId3">
+            <a:extLst>
+              <a:ext uri="{28A0092B-C50C-407E-A947-70E740481C1C}">
+                <a14:useLocalDpi xmlns:a14="http://schemas.microsoft.com/office/drawing/2010/main" val="0"/>
+              </a:ext>
+            </a:extLst>
+          </a:blip>
+          <a:stretch>
+            <a:fillRect/>
+          </a:stretch>
+        </p:blipFill>
+        <p:spPr>
+          <a:xfrm>
+            <a:off x="416951" y="1690688"/>
+            <a:ext cx="5487650" cy="3658433"/>
+          </a:xfrm>
+          <a:prstGeom prst="rect">
+            <a:avLst/>
+          </a:prstGeom>
+          <a:ln>
+            <a:solidFill>
+              <a:schemeClr val="bg2">
+                <a:lumMod val="90000"/>
+              </a:schemeClr>
+            </a:solidFill>
+          </a:ln>
+        </p:spPr>
+      </p:pic>
+    </p:spTree>
+    <p:extLst>
+      <p:ext uri="{BB962C8B-B14F-4D97-AF65-F5344CB8AC3E}">
+        <p14:creationId xmlns:p14="http://schemas.microsoft.com/office/powerpoint/2010/main" val="3233909440"/>
+      </p:ext>
+    </p:extLst>
+  </p:cSld>
+  <p:clrMapOvr>
+    <a:masterClrMapping/>
+  </p:clrMapOvr>
+</p:sld>
+</file>
+
+<file path=ppt/slides/slide5.xml><?xml version="1.0" encoding="utf-8"?>
 <p:sld xmlns:a="http://schemas.openxmlformats.org/drawingml/2006/main" xmlns:r="http://schemas.openxmlformats.org/officeDocument/2006/relationships" xmlns:p="http://schemas.openxmlformats.org/presentationml/2006/main">
   <p:cSld>
     <p:spTree>
@@ -6339,7 +6427,7 @@
 </p:sld>
 </file>
 
-<file path=ppt/slides/slide5.xml><?xml version="1.0" encoding="utf-8"?>
+<file path=ppt/slides/slide6.xml><?xml version="1.0" encoding="utf-8"?>
 <p:sld xmlns:a="http://schemas.openxmlformats.org/drawingml/2006/main" xmlns:r="http://schemas.openxmlformats.org/officeDocument/2006/relationships" xmlns:p="http://schemas.openxmlformats.org/presentationml/2006/main">
   <p:cSld>
     <p:spTree>
@@ -6409,225 +6497,6 @@
     <p:extLst>
       <p:ext uri="{BB962C8B-B14F-4D97-AF65-F5344CB8AC3E}">
         <p14:creationId xmlns:p14="http://schemas.microsoft.com/office/powerpoint/2010/main" val="902038576"/>
-      </p:ext>
-    </p:extLst>
-  </p:cSld>
-  <p:clrMapOvr>
-    <a:masterClrMapping/>
-  </p:clrMapOvr>
-</p:sld>
-</file>
-
-<file path=ppt/slides/slide6.xml><?xml version="1.0" encoding="utf-8"?>
-<p:sld xmlns:a="http://schemas.openxmlformats.org/drawingml/2006/main" xmlns:r="http://schemas.openxmlformats.org/officeDocument/2006/relationships" xmlns:p="http://schemas.openxmlformats.org/presentationml/2006/main">
-  <p:cSld>
-    <p:spTree>
-      <p:nvGrpSpPr>
-        <p:cNvPr id="1" name=""/>
-        <p:cNvGrpSpPr/>
-        <p:nvPr/>
-      </p:nvGrpSpPr>
-      <p:grpSpPr>
-        <a:xfrm>
-          <a:off x="0" y="0"/>
-          <a:ext cx="0" cy="0"/>
-          <a:chOff x="0" y="0"/>
-          <a:chExt cx="0" cy="0"/>
-        </a:xfrm>
-      </p:grpSpPr>
-      <p:sp>
-        <p:nvSpPr>
-          <p:cNvPr id="2" name="Title 1"/>
-          <p:cNvSpPr>
-            <a:spLocks noGrp="1"/>
-          </p:cNvSpPr>
-          <p:nvPr>
-            <p:ph type="title"/>
-          </p:nvPr>
-        </p:nvSpPr>
-        <p:spPr/>
-        <p:txBody>
-          <a:bodyPr/>
-          <a:lstStyle/>
-          <a:p>
-            <a:endParaRPr lang="en-US"/>
-          </a:p>
-        </p:txBody>
-      </p:sp>
-      <p:pic>
-        <p:nvPicPr>
-          <p:cNvPr id="4" name="Content Placeholder 3"/>
-          <p:cNvPicPr>
-            <a:picLocks noGrp="1" noChangeAspect="1"/>
-          </p:cNvPicPr>
-          <p:nvPr>
-            <p:ph idx="1"/>
-          </p:nvPr>
-        </p:nvPicPr>
-        <p:blipFill>
-          <a:blip r:embed="rId2">
-            <a:extLst>
-              <a:ext uri="{28A0092B-C50C-407E-A947-70E740481C1C}">
-                <a14:useLocalDpi xmlns:a14="http://schemas.microsoft.com/office/drawing/2010/main" val="0"/>
-              </a:ext>
-            </a:extLst>
-          </a:blip>
-          <a:stretch>
-            <a:fillRect/>
-          </a:stretch>
-        </p:blipFill>
-        <p:spPr>
-          <a:xfrm>
-            <a:off x="330083" y="3319471"/>
-            <a:ext cx="4431518" cy="3268442"/>
-          </a:xfrm>
-        </p:spPr>
-      </p:pic>
-      <p:pic>
-        <p:nvPicPr>
-          <p:cNvPr id="3" name="Picture 2"/>
-          <p:cNvPicPr>
-            <a:picLocks noChangeAspect="1"/>
-          </p:cNvPicPr>
-          <p:nvPr/>
-        </p:nvPicPr>
-        <p:blipFill>
-          <a:blip r:embed="rId3">
-            <a:extLst>
-              <a:ext uri="{28A0092B-C50C-407E-A947-70E740481C1C}">
-                <a14:useLocalDpi xmlns:a14="http://schemas.microsoft.com/office/drawing/2010/main" val="0"/>
-              </a:ext>
-            </a:extLst>
-          </a:blip>
-          <a:stretch>
-            <a:fillRect/>
-          </a:stretch>
-        </p:blipFill>
-        <p:spPr>
-          <a:xfrm>
-            <a:off x="330083" y="213515"/>
-            <a:ext cx="4431518" cy="2954345"/>
-          </a:xfrm>
-          <a:prstGeom prst="rect">
-            <a:avLst/>
-          </a:prstGeom>
-        </p:spPr>
-      </p:pic>
-      <p:pic>
-        <p:nvPicPr>
-          <p:cNvPr id="6" name="Picture 5"/>
-          <p:cNvPicPr>
-            <a:picLocks noChangeAspect="1"/>
-          </p:cNvPicPr>
-          <p:nvPr/>
-        </p:nvPicPr>
-        <p:blipFill>
-          <a:blip r:embed="rId4">
-            <a:extLst>
-              <a:ext uri="{28A0092B-C50C-407E-A947-70E740481C1C}">
-                <a14:useLocalDpi xmlns:a14="http://schemas.microsoft.com/office/drawing/2010/main" val="0"/>
-              </a:ext>
-            </a:extLst>
-          </a:blip>
-          <a:stretch>
-            <a:fillRect/>
-          </a:stretch>
-        </p:blipFill>
-        <p:spPr>
-          <a:xfrm>
-            <a:off x="4804860" y="365125"/>
-            <a:ext cx="5118803" cy="2926715"/>
-          </a:xfrm>
-          <a:prstGeom prst="rect">
-            <a:avLst/>
-          </a:prstGeom>
-        </p:spPr>
-      </p:pic>
-      <p:pic>
-        <p:nvPicPr>
-          <p:cNvPr id="7" name="Picture 6"/>
-          <p:cNvPicPr>
-            <a:picLocks noChangeAspect="1"/>
-          </p:cNvPicPr>
-          <p:nvPr/>
-        </p:nvPicPr>
-        <p:blipFill>
-          <a:blip r:embed="rId5">
-            <a:extLst>
-              <a:ext uri="{28A0092B-C50C-407E-A947-70E740481C1C}">
-                <a14:useLocalDpi xmlns:a14="http://schemas.microsoft.com/office/drawing/2010/main" val="0"/>
-              </a:ext>
-            </a:extLst>
-          </a:blip>
-          <a:stretch>
-            <a:fillRect/>
-          </a:stretch>
-        </p:blipFill>
-        <p:spPr>
-          <a:xfrm>
-            <a:off x="4843859" y="3319471"/>
-            <a:ext cx="5040806" cy="3360537"/>
-          </a:xfrm>
-          <a:prstGeom prst="rect">
-            <a:avLst/>
-          </a:prstGeom>
-        </p:spPr>
-      </p:pic>
-      <p:sp>
-        <p:nvSpPr>
-          <p:cNvPr id="8" name="TextBox 7"/>
-          <p:cNvSpPr txBox="1"/>
-          <p:nvPr/>
-        </p:nvSpPr>
-        <p:spPr>
-          <a:xfrm>
-            <a:off x="9546336" y="740664"/>
-            <a:ext cx="2414016" cy="2862322"/>
-          </a:xfrm>
-          <a:prstGeom prst="rect">
-            <a:avLst/>
-          </a:prstGeom>
-          <a:noFill/>
-        </p:spPr>
-        <p:txBody>
-          <a:bodyPr wrap="square" rtlCol="0">
-            <a:spAutoFit/>
-          </a:bodyPr>
-          <a:lstStyle/>
-          <a:p>
-            <a:r>
-              <a:rPr lang="en-US" dirty="0"/>
-              <a:t># Suicide number has only gone by </a:t>
-            </a:r>
-            <a:r>
-              <a:rPr lang="en-US" dirty="0" err="1"/>
-              <a:t>by</a:t>
-            </a:r>
-            <a:r>
-              <a:rPr lang="en-US" dirty="0"/>
-              <a:t> 35,000 from 1985 to 2016; however population has gone up by 300 </a:t>
-            </a:r>
-            <a:r>
-              <a:rPr lang="en-US" dirty="0" smtClean="0"/>
-              <a:t>million.</a:t>
-            </a:r>
-          </a:p>
-          <a:p>
-            <a:endParaRPr lang="en-US" dirty="0"/>
-          </a:p>
-          <a:p>
-            <a:r>
-              <a:rPr lang="en-US" dirty="0" smtClean="0"/>
-              <a:t>That explains why the suicide rate is going down with time</a:t>
-            </a:r>
-            <a:endParaRPr lang="en-US" dirty="0"/>
-          </a:p>
-        </p:txBody>
-      </p:sp>
-    </p:spTree>
-    <p:extLst>
-      <p:ext uri="{BB962C8B-B14F-4D97-AF65-F5344CB8AC3E}">
-        <p14:creationId xmlns:p14="http://schemas.microsoft.com/office/powerpoint/2010/main" val="719203878"/>
       </p:ext>
     </p:extLst>
   </p:cSld>
@@ -6697,22 +6566,156 @@
         </p:blipFill>
         <p:spPr>
           <a:xfrm>
-            <a:off x="137160" y="1994186"/>
-            <a:ext cx="11716916" cy="4589494"/>
-          </a:xfrm>
-          <a:ln>
-            <a:solidFill>
-              <a:schemeClr val="bg2">
-                <a:lumMod val="90000"/>
-              </a:schemeClr>
-            </a:solidFill>
-          </a:ln>
+            <a:off x="330083" y="3319471"/>
+            <a:ext cx="4431518" cy="3268442"/>
+          </a:xfrm>
         </p:spPr>
       </p:pic>
+      <p:pic>
+        <p:nvPicPr>
+          <p:cNvPr id="3" name="Picture 2"/>
+          <p:cNvPicPr>
+            <a:picLocks noChangeAspect="1"/>
+          </p:cNvPicPr>
+          <p:nvPr/>
+        </p:nvPicPr>
+        <p:blipFill>
+          <a:blip r:embed="rId3">
+            <a:extLst>
+              <a:ext uri="{28A0092B-C50C-407E-A947-70E740481C1C}">
+                <a14:useLocalDpi xmlns:a14="http://schemas.microsoft.com/office/drawing/2010/main" val="0"/>
+              </a:ext>
+            </a:extLst>
+          </a:blip>
+          <a:stretch>
+            <a:fillRect/>
+          </a:stretch>
+        </p:blipFill>
+        <p:spPr>
+          <a:xfrm>
+            <a:off x="330083" y="213515"/>
+            <a:ext cx="4431518" cy="2954345"/>
+          </a:xfrm>
+          <a:prstGeom prst="rect">
+            <a:avLst/>
+          </a:prstGeom>
+        </p:spPr>
+      </p:pic>
+      <p:pic>
+        <p:nvPicPr>
+          <p:cNvPr id="6" name="Picture 5"/>
+          <p:cNvPicPr>
+            <a:picLocks noChangeAspect="1"/>
+          </p:cNvPicPr>
+          <p:nvPr/>
+        </p:nvPicPr>
+        <p:blipFill>
+          <a:blip r:embed="rId4">
+            <a:extLst>
+              <a:ext uri="{28A0092B-C50C-407E-A947-70E740481C1C}">
+                <a14:useLocalDpi xmlns:a14="http://schemas.microsoft.com/office/drawing/2010/main" val="0"/>
+              </a:ext>
+            </a:extLst>
+          </a:blip>
+          <a:stretch>
+            <a:fillRect/>
+          </a:stretch>
+        </p:blipFill>
+        <p:spPr>
+          <a:xfrm>
+            <a:off x="4804860" y="365125"/>
+            <a:ext cx="5118803" cy="2926715"/>
+          </a:xfrm>
+          <a:prstGeom prst="rect">
+            <a:avLst/>
+          </a:prstGeom>
+        </p:spPr>
+      </p:pic>
+      <p:pic>
+        <p:nvPicPr>
+          <p:cNvPr id="7" name="Picture 6"/>
+          <p:cNvPicPr>
+            <a:picLocks noChangeAspect="1"/>
+          </p:cNvPicPr>
+          <p:nvPr/>
+        </p:nvPicPr>
+        <p:blipFill>
+          <a:blip r:embed="rId5">
+            <a:extLst>
+              <a:ext uri="{28A0092B-C50C-407E-A947-70E740481C1C}">
+                <a14:useLocalDpi xmlns:a14="http://schemas.microsoft.com/office/drawing/2010/main" val="0"/>
+              </a:ext>
+            </a:extLst>
+          </a:blip>
+          <a:stretch>
+            <a:fillRect/>
+          </a:stretch>
+        </p:blipFill>
+        <p:spPr>
+          <a:xfrm>
+            <a:off x="4843859" y="3319471"/>
+            <a:ext cx="5040806" cy="3360537"/>
+          </a:xfrm>
+          <a:prstGeom prst="rect">
+            <a:avLst/>
+          </a:prstGeom>
+        </p:spPr>
+      </p:pic>
+      <p:sp>
+        <p:nvSpPr>
+          <p:cNvPr id="8" name="TextBox 7"/>
+          <p:cNvSpPr txBox="1"/>
+          <p:nvPr/>
+        </p:nvSpPr>
+        <p:spPr>
+          <a:xfrm>
+            <a:off x="9546336" y="740664"/>
+            <a:ext cx="2414016" cy="2862322"/>
+          </a:xfrm>
+          <a:prstGeom prst="rect">
+            <a:avLst/>
+          </a:prstGeom>
+          <a:noFill/>
+        </p:spPr>
+        <p:txBody>
+          <a:bodyPr wrap="square" rtlCol="0">
+            <a:spAutoFit/>
+          </a:bodyPr>
+          <a:lstStyle/>
+          <a:p>
+            <a:r>
+              <a:rPr lang="en-US" dirty="0"/>
+              <a:t># Suicide number has only gone by </a:t>
+            </a:r>
+            <a:r>
+              <a:rPr lang="en-US" dirty="0" err="1"/>
+              <a:t>by</a:t>
+            </a:r>
+            <a:r>
+              <a:rPr lang="en-US" dirty="0"/>
+              <a:t> 35,000 from 1985 to 2016; however population has gone up by 300 </a:t>
+            </a:r>
+            <a:r>
+              <a:rPr lang="en-US" dirty="0" smtClean="0"/>
+              <a:t>million.</a:t>
+            </a:r>
+          </a:p>
+          <a:p>
+            <a:endParaRPr lang="en-US" dirty="0"/>
+          </a:p>
+          <a:p>
+            <a:r>
+              <a:rPr lang="en-US" dirty="0" smtClean="0"/>
+              <a:t>That explains why the suicide rate is going down with time</a:t>
+            </a:r>
+            <a:endParaRPr lang="en-US" dirty="0"/>
+          </a:p>
+        </p:txBody>
+      </p:sp>
     </p:spTree>
     <p:extLst>
       <p:ext uri="{BB962C8B-B14F-4D97-AF65-F5344CB8AC3E}">
-        <p14:creationId xmlns:p14="http://schemas.microsoft.com/office/powerpoint/2010/main" val="4270521796"/>
+        <p14:creationId xmlns:p14="http://schemas.microsoft.com/office/powerpoint/2010/main" val="719203878"/>
       </p:ext>
     </p:extLst>
   </p:cSld>
@@ -6760,7 +6763,7 @@
       </p:sp>
       <p:pic>
         <p:nvPicPr>
-          <p:cNvPr id="5" name="Content Placeholder 4"/>
+          <p:cNvPr id="4" name="Content Placeholder 3"/>
           <p:cNvPicPr>
             <a:picLocks noGrp="1" noChangeAspect="1"/>
           </p:cNvPicPr>
@@ -6782,105 +6785,22 @@
         </p:blipFill>
         <p:spPr>
           <a:xfrm>
-            <a:off x="4532376" y="2318381"/>
-            <a:ext cx="4093661" cy="2729107"/>
-          </a:xfrm>
+            <a:off x="137160" y="1994186"/>
+            <a:ext cx="11716916" cy="4589494"/>
+          </a:xfrm>
+          <a:ln>
+            <a:solidFill>
+              <a:schemeClr val="bg2">
+                <a:lumMod val="90000"/>
+              </a:schemeClr>
+            </a:solidFill>
+          </a:ln>
         </p:spPr>
       </p:pic>
-      <p:pic>
-        <p:nvPicPr>
-          <p:cNvPr id="6" name="Picture 5"/>
-          <p:cNvPicPr>
-            <a:picLocks noChangeAspect="1"/>
-          </p:cNvPicPr>
-          <p:nvPr/>
-        </p:nvPicPr>
-        <p:blipFill>
-          <a:blip r:embed="rId3">
-            <a:extLst>
-              <a:ext uri="{28A0092B-C50C-407E-A947-70E740481C1C}">
-                <a14:useLocalDpi xmlns:a14="http://schemas.microsoft.com/office/drawing/2010/main" val="0"/>
-              </a:ext>
-            </a:extLst>
-          </a:blip>
-          <a:stretch>
-            <a:fillRect/>
-          </a:stretch>
-        </p:blipFill>
-        <p:spPr>
-          <a:xfrm>
-            <a:off x="270647" y="2390156"/>
-            <a:ext cx="4127617" cy="2751744"/>
-          </a:xfrm>
-          <a:prstGeom prst="rect">
-            <a:avLst/>
-          </a:prstGeom>
-        </p:spPr>
-      </p:pic>
-      <p:sp>
-        <p:nvSpPr>
-          <p:cNvPr id="7" name="TextBox 6"/>
-          <p:cNvSpPr txBox="1"/>
-          <p:nvPr/>
-        </p:nvSpPr>
-        <p:spPr>
-          <a:xfrm>
-            <a:off x="1051560" y="2020824"/>
-            <a:ext cx="1536192" cy="369332"/>
-          </a:xfrm>
-          <a:prstGeom prst="rect">
-            <a:avLst/>
-          </a:prstGeom>
-          <a:noFill/>
-        </p:spPr>
-        <p:txBody>
-          <a:bodyPr wrap="square" rtlCol="0">
-            <a:spAutoFit/>
-          </a:bodyPr>
-          <a:lstStyle/>
-          <a:p>
-            <a:r>
-              <a:rPr lang="en-US" dirty="0" smtClean="0"/>
-              <a:t>Brazil</a:t>
-            </a:r>
-            <a:endParaRPr lang="en-US" dirty="0"/>
-          </a:p>
-        </p:txBody>
-      </p:sp>
-      <p:sp>
-        <p:nvSpPr>
-          <p:cNvPr id="8" name="TextBox 7"/>
-          <p:cNvSpPr txBox="1"/>
-          <p:nvPr/>
-        </p:nvSpPr>
-        <p:spPr>
-          <a:xfrm>
-            <a:off x="5327904" y="2020824"/>
-            <a:ext cx="1536192" cy="369332"/>
-          </a:xfrm>
-          <a:prstGeom prst="rect">
-            <a:avLst/>
-          </a:prstGeom>
-          <a:noFill/>
-        </p:spPr>
-        <p:txBody>
-          <a:bodyPr wrap="square" rtlCol="0">
-            <a:spAutoFit/>
-          </a:bodyPr>
-          <a:lstStyle/>
-          <a:p>
-            <a:r>
-              <a:rPr lang="en-US" dirty="0" smtClean="0"/>
-              <a:t>USA</a:t>
-            </a:r>
-            <a:endParaRPr lang="en-US" dirty="0"/>
-          </a:p>
-        </p:txBody>
-      </p:sp>
     </p:spTree>
     <p:extLst>
       <p:ext uri="{BB962C8B-B14F-4D97-AF65-F5344CB8AC3E}">
-        <p14:creationId xmlns:p14="http://schemas.microsoft.com/office/powerpoint/2010/main" val="3901015617"/>
+        <p14:creationId xmlns:p14="http://schemas.microsoft.com/office/powerpoint/2010/main" val="4270521796"/>
       </p:ext>
     </p:extLst>
   </p:cSld>
@@ -6917,27 +6837,18 @@
             <p:ph type="title"/>
           </p:nvPr>
         </p:nvSpPr>
-        <p:spPr>
-          <a:xfrm>
-            <a:off x="408432" y="0"/>
-            <a:ext cx="10515600" cy="1325563"/>
-          </a:xfrm>
-        </p:spPr>
+        <p:spPr/>
         <p:txBody>
           <a:bodyPr/>
           <a:lstStyle/>
           <a:p>
-            <a:r>
-              <a:rPr lang="en-US" dirty="0" smtClean="0"/>
-              <a:t>Top 5 countries by Year</a:t>
-            </a:r>
-            <a:endParaRPr lang="en-US" dirty="0"/>
+            <a:endParaRPr lang="en-US"/>
           </a:p>
         </p:txBody>
       </p:sp>
       <p:pic>
         <p:nvPicPr>
-          <p:cNvPr id="4" name="Content Placeholder 3"/>
+          <p:cNvPr id="5" name="Content Placeholder 4"/>
           <p:cNvPicPr>
             <a:picLocks noGrp="1" noChangeAspect="1"/>
           </p:cNvPicPr>
@@ -6959,14 +6870,14 @@
         </p:blipFill>
         <p:spPr>
           <a:xfrm>
-            <a:off x="563255" y="1393350"/>
-            <a:ext cx="4116227" cy="2744151"/>
+            <a:off x="4532376" y="2318381"/>
+            <a:ext cx="4093661" cy="2729107"/>
           </a:xfrm>
         </p:spPr>
       </p:pic>
       <p:pic>
         <p:nvPicPr>
-          <p:cNvPr id="5" name="Picture 4"/>
+          <p:cNvPr id="6" name="Picture 5"/>
           <p:cNvPicPr>
             <a:picLocks noChangeAspect="1"/>
           </p:cNvPicPr>
@@ -6986,8 +6897,8 @@
         </p:blipFill>
         <p:spPr>
           <a:xfrm>
-            <a:off x="563255" y="4357688"/>
-            <a:ext cx="4025412" cy="2683608"/>
+            <a:off x="270647" y="2390156"/>
+            <a:ext cx="4127617" cy="2751744"/>
           </a:xfrm>
           <a:prstGeom prst="rect">
             <a:avLst/>
@@ -6996,21 +6907,19 @@
       </p:pic>
       <p:sp>
         <p:nvSpPr>
-          <p:cNvPr id="6" name="TextBox 5"/>
+          <p:cNvPr id="7" name="TextBox 6"/>
           <p:cNvSpPr txBox="1"/>
           <p:nvPr/>
         </p:nvSpPr>
         <p:spPr>
           <a:xfrm>
-            <a:off x="563255" y="956231"/>
+            <a:off x="1051560" y="2020824"/>
             <a:ext cx="1536192" cy="369332"/>
           </a:xfrm>
           <a:prstGeom prst="rect">
             <a:avLst/>
           </a:prstGeom>
-          <a:solidFill>
-            <a:schemeClr val="accent2"/>
-          </a:solidFill>
+          <a:noFill/>
         </p:spPr>
         <p:txBody>
           <a:bodyPr wrap="square" rtlCol="0">
@@ -7020,7 +6929,7 @@
           <a:p>
             <a:r>
               <a:rPr lang="en-US" dirty="0" smtClean="0"/>
-              <a:t>1985</a:t>
+              <a:t>Brazil</a:t>
             </a:r>
             <a:endParaRPr lang="en-US" dirty="0"/>
           </a:p>
@@ -7028,21 +6937,19 @@
       </p:sp>
       <p:sp>
         <p:nvSpPr>
-          <p:cNvPr id="7" name="TextBox 6"/>
+          <p:cNvPr id="8" name="TextBox 7"/>
           <p:cNvSpPr txBox="1"/>
           <p:nvPr/>
         </p:nvSpPr>
         <p:spPr>
           <a:xfrm>
-            <a:off x="258455" y="4137501"/>
+            <a:off x="5327904" y="2020824"/>
             <a:ext cx="1536192" cy="369332"/>
           </a:xfrm>
           <a:prstGeom prst="rect">
             <a:avLst/>
           </a:prstGeom>
-          <a:solidFill>
-            <a:schemeClr val="accent2"/>
-          </a:solidFill>
+          <a:noFill/>
         </p:spPr>
         <p:txBody>
           <a:bodyPr wrap="square" rtlCol="0">
@@ -7052,140 +6959,16 @@
           <a:p>
             <a:r>
               <a:rPr lang="en-US" dirty="0" smtClean="0"/>
-              <a:t>1995</a:t>
+              <a:t>USA</a:t>
             </a:r>
             <a:endParaRPr lang="en-US" dirty="0"/>
           </a:p>
         </p:txBody>
       </p:sp>
-      <p:sp>
-        <p:nvSpPr>
-          <p:cNvPr id="8" name="TextBox 7"/>
-          <p:cNvSpPr txBox="1"/>
-          <p:nvPr/>
-        </p:nvSpPr>
-        <p:spPr>
-          <a:xfrm>
-            <a:off x="6247775" y="1176418"/>
-            <a:ext cx="1536192" cy="369332"/>
-          </a:xfrm>
-          <a:prstGeom prst="rect">
-            <a:avLst/>
-          </a:prstGeom>
-          <a:solidFill>
-            <a:schemeClr val="accent2"/>
-          </a:solidFill>
-        </p:spPr>
-        <p:txBody>
-          <a:bodyPr wrap="square" rtlCol="0">
-            <a:spAutoFit/>
-          </a:bodyPr>
-          <a:lstStyle/>
-          <a:p>
-            <a:r>
-              <a:rPr lang="en-US" dirty="0" smtClean="0"/>
-              <a:t>2005</a:t>
-            </a:r>
-            <a:endParaRPr lang="en-US" dirty="0"/>
-          </a:p>
-        </p:txBody>
-      </p:sp>
-      <p:sp>
-        <p:nvSpPr>
-          <p:cNvPr id="9" name="TextBox 8"/>
-          <p:cNvSpPr txBox="1"/>
-          <p:nvPr/>
-        </p:nvSpPr>
-        <p:spPr>
-          <a:xfrm>
-            <a:off x="5942975" y="4357688"/>
-            <a:ext cx="1536192" cy="369332"/>
-          </a:xfrm>
-          <a:prstGeom prst="rect">
-            <a:avLst/>
-          </a:prstGeom>
-          <a:solidFill>
-            <a:schemeClr val="accent2"/>
-          </a:solidFill>
-        </p:spPr>
-        <p:txBody>
-          <a:bodyPr wrap="square" rtlCol="0">
-            <a:spAutoFit/>
-          </a:bodyPr>
-          <a:lstStyle/>
-          <a:p>
-            <a:r>
-              <a:rPr lang="en-US" dirty="0" smtClean="0"/>
-              <a:t>2015</a:t>
-            </a:r>
-            <a:endParaRPr lang="en-US" dirty="0"/>
-          </a:p>
-        </p:txBody>
-      </p:sp>
-      <p:pic>
-        <p:nvPicPr>
-          <p:cNvPr id="10" name="Picture 9"/>
-          <p:cNvPicPr>
-            <a:picLocks noChangeAspect="1"/>
-          </p:cNvPicPr>
-          <p:nvPr/>
-        </p:nvPicPr>
-        <p:blipFill>
-          <a:blip r:embed="rId4">
-            <a:extLst>
-              <a:ext uri="{28A0092B-C50C-407E-A947-70E740481C1C}">
-                <a14:useLocalDpi xmlns:a14="http://schemas.microsoft.com/office/drawing/2010/main" val="0"/>
-              </a:ext>
-            </a:extLst>
-          </a:blip>
-          <a:stretch>
-            <a:fillRect/>
-          </a:stretch>
-        </p:blipFill>
-        <p:spPr>
-          <a:xfrm>
-            <a:off x="7626994" y="1538905"/>
-            <a:ext cx="3908161" cy="2605440"/>
-          </a:xfrm>
-          <a:prstGeom prst="rect">
-            <a:avLst/>
-          </a:prstGeom>
-        </p:spPr>
-      </p:pic>
-      <p:pic>
-        <p:nvPicPr>
-          <p:cNvPr id="11" name="Picture 10"/>
-          <p:cNvPicPr>
-            <a:picLocks noChangeAspect="1"/>
-          </p:cNvPicPr>
-          <p:nvPr/>
-        </p:nvPicPr>
-        <p:blipFill>
-          <a:blip r:embed="rId5">
-            <a:extLst>
-              <a:ext uri="{28A0092B-C50C-407E-A947-70E740481C1C}">
-                <a14:useLocalDpi xmlns:a14="http://schemas.microsoft.com/office/drawing/2010/main" val="0"/>
-              </a:ext>
-            </a:extLst>
-          </a:blip>
-          <a:stretch>
-            <a:fillRect/>
-          </a:stretch>
-        </p:blipFill>
-        <p:spPr>
-          <a:xfrm>
-            <a:off x="7695575" y="4506833"/>
-            <a:ext cx="3771001" cy="2514000"/>
-          </a:xfrm>
-          <a:prstGeom prst="rect">
-            <a:avLst/>
-          </a:prstGeom>
-        </p:spPr>
-      </p:pic>
     </p:spTree>
     <p:extLst>
       <p:ext uri="{BB962C8B-B14F-4D97-AF65-F5344CB8AC3E}">
-        <p14:creationId xmlns:p14="http://schemas.microsoft.com/office/powerpoint/2010/main" val="2999283922"/>
+        <p14:creationId xmlns:p14="http://schemas.microsoft.com/office/powerpoint/2010/main" val="3901015617"/>
       </p:ext>
     </p:extLst>
   </p:cSld>

</xml_diff>

<commit_message>
Repeated multivariate regression prediction for Singapore
</commit_message>
<xml_diff>
--- a/An Analysis of the World Suicide Data_sn.pptx
+++ b/An Analysis of the World Suicide Data_sn.pptx
@@ -18,9 +18,10 @@
     <p:sldId id="286" r:id="rId12"/>
     <p:sldId id="290" r:id="rId13"/>
     <p:sldId id="279" r:id="rId14"/>
-    <p:sldId id="288" r:id="rId15"/>
-    <p:sldId id="287" r:id="rId16"/>
-    <p:sldId id="291" r:id="rId17"/>
+    <p:sldId id="293" r:id="rId15"/>
+    <p:sldId id="288" r:id="rId16"/>
+    <p:sldId id="287" r:id="rId17"/>
+    <p:sldId id="291" r:id="rId18"/>
   </p:sldIdLst>
   <p:sldSz cx="12192000" cy="6858000"/>
   <p:notesSz cx="6858000" cy="9144000"/>
@@ -4048,52 +4049,13 @@
           <a:bodyPr/>
           <a:lstStyle/>
           <a:p>
-            <a:endParaRPr lang="en-US"/>
-          </a:p>
-        </p:txBody>
-      </p:sp>
-      <p:sp>
-        <p:nvSpPr>
-          <p:cNvPr id="4" name="AutoShape 2" descr="data:image/png;base64,iVBORw0KGgoAAAANSUhEUgAAAbEAAAFQCAYAAAAxyECWAAAABHNCSVQICAgIfAhkiAAAAAlwSFlzAAALEgAACxIB0t1+/AAAADh0RVh0U29mdHdhcmUAbWF0cGxvdGxpYiB2ZXJzaW9uMy4yLjEsIGh0dHA6Ly9tYXRwbG90bGliLm9yZy+j8jraAAAgAElEQVR4nOzdd3wUVdfA8d9JCD1EagpIFVCUHpHeQgmEjgooCiqiiMKDCChIERXEAlgQH1QEBVHpoVdBQJDepUknjR54CJBs7vvHLsuGbJKNJFmW93z57IedmXNnzt1NcnLvTHbEGINSSinlibzcnYBSSin1b2kRU0op5bG0iCmllPJYWsSUUkp5LC1iSimlPJYWMaWUUh5Li5hSSqlMJyKTRSRGRPamsF1E5AsROSIiu0Wkmiv71SKmlFIqK0wBQlPZ3gIoa3v0BCa6slMtYkoppTKdMeYP4EIqIW2BH43VJuABEQlMa79axJRSSt0LigKnHJZP29alKlumpaMyRfy5o/fd54QVKtnU3SlkuOze9+e31sW4q+5OIVOM82/k7hQyxRunpsndtE/Pz5vshcu8gnUa8JZJxphJ6Tics1zTPP79+Z2mlFLq7iVaXA61Faz0FK07nQYedFguBkSk1UinE5VSSjlnEl1/3L1w4HnbVYo1gcvGmMi0GulITCmllHOJGVKcABCRGUBDoJCInAaGAz4AxphvgMVAS+AIcA14wZX9ahFTSinllLEkZNy+jOmSxnYD9E7vfrWIKaWUci5jpgkzlRYxpZRSzqXjwg530SKmlFLKOR2JKaWU8lgZeGFHZtEippRSyimjIzGllFIeKwOvTswsWsSUUko5pxd2KKWU8lg6naiUUspj6YUdSimlPJaOxJRSSnksHYkppZTyVCYx3t0ppElvxaKSeXfUWOqHdaZd11fdnYpTYz4Zxo5dq9mwaRGVKz/qNKZEiWKs+n0223eu4oepX+Dj45Nm+1df687GzUvYtGUJvV7rbl8/ZGg/NmxaxLo/FzB3/hQCAopkeJ8ah9Rj49albN6xnD79XnYaM2rMEDbvWM6aDeFUqlwhzbaPVXyYJSt/5fd181ixZjZVq1UEIFu2bHw18SPW/hnOhs2L6ftmz2THyizjxo7kwP71bN+2gqpVHnMaU7Lkg/y5fgF/71vPz9MnJnnvAIKrV+ZG3Ek6dAgDoFy5Mmzdstz+uHDuAH3e6JHpfblT8YaV6LrmE55b9xnVX2udbHupZtXosnwUnZd+yNOLRhL4eLkk28VL6LzkA1r90D+rUk5bYqLrDzfRIqaSadeyKd+M/cDdaTjVtFlDypQpSdXKjen7xhDGjh/pNO699wfy9YQfqFYlhEuXLvN8t6dSbf9IhXJ0696Jxg3aU6dmK0JbNKZ0mZIAfDH+W+rUDKNe7dYsXfo7g955I0P75OXlxUefDaPzkz2oUyOM9h1bUa58mSQxTZrWp3SZktSo2oz+fYfy8dgRabYdNnIAn340gUb12jHmw88ZPnIAAG3ahZI9R3Ya1G5DkwYdeL57Jx4snuZd4O9ai9DGlH2oFA9XqEuvXoOY8NVop3GjRw1h/Bff8sijdbl48TIvvnD7w8+9vLwYPWoIy5evsa87dOgfgh9vRvDjzajxRCjXrsUxb/6SzO5OEuIlNPygG+HPf8z0xgMp17Ym+csGJYk5vX4fM5oN5pfQIazq/y0hHycttJVfCuXCkTTvAZm1svZ+Yv+KFrF7jIh4uzuH4CoV8cvn6+40nApr1YQZM+YCsHXLTvz88uHvXzhZXP0GtZg31/qD7Ofpcwhr1TTV9uXLl2Hr5h3ExV3HYrGwfv1mWrduBsCVK1ft+82TOxfWO0ZknGrVK3H86AlOHD9NfHw88+YsokVYSJKY0LAQfp0xD4BtW3fZ8061rTH45ssDgG8+X6KiYmyrDblz58Lb25ucOXMSHx+fpI+ZpXXr5vw0fRYAf23ejt8Dfk5HtY0a1mH27EUA/PTTTNq2aW7f9nrvF5kzdxExZ887PUZI47ocPXqCkyfPZEIPUuZfpQyXjkcTe/IsifEWDoVvonSz6kli4q/dsD/3yZ0jyddRnoAClGxchf0z1mRVyq5JtLj+cBM9J3YXROR94Jwx5nPb8odANJADeNr2/1xjzHDb9nlYb7+dE/jcdjtvROQqMBZoDvQH1mdxVzxGYKA/Z07f/m01IiKKoKAAoqPP2tcVKJify5euYLFYv7EizkQRGBSQavv9+w8xdFh/8hd4gOtx12nWrAE7duy1xw0d3p/OXdoTG3uFVi2fzdg+Bflz5kzU7ZzORFM9uFKyfkc4xkREERDkn2rbIW+P4rc53zPi/UF4eXnRsllnABbMX0aLsBD2HlpPrlw5GTp4NJcuXs7QPjlTNCiA06duv/ZnTkdSNCjAXlwBChbMz6VLl+3v3ekzkQQVtb53QUEBtGsbSpNmTxMcXMXpMZ5+ui2//DovE3vhXJ6A/FyNuGBfvhp5gYCqZZLFlQ4Npvagp8lVKB8Lun1qX19/RFc2jJpB9jy5siRfl3nA1Yk6Ers73wPdAETEC+iMtYiVBWoAVYDqIlLfFv+iMaY6EAz0EZGCtvV5gL3GmCeMMckKmIj0FJGtIrL1ux9nZG6P7nEikmzdnSOj1GJS2nbo4D+MH/df5odPZfa8H9i79wAJCbc/cuf99z7j0YfrMvPX+fR85bm77YbL+aYVk1rbF17qwtDBo6nyaEOGDh7N+K8+BKwjP4slkYrl6xFcKYTXXn+REiWLZURXUnW3793Yz97jncGjSEzh/IuPjw+tWzVj1uyFGZBt+jjPO3nc0aVbmdZoIIt6jKPmW08CUDKkCtfOx3J2z/FMzvJfsCS4/nATLWJ3wRhzHDgvIlWBZsAO4HGH59uBh7EWNbAWrl3AJqwjslvrLcDsVI4zyRgTbIwJ7vF8qjdHvS/16NmVdX8uYN2fC4iKjKFosdvnGoKCAoiMjE4Sf/7cBfwe8MXb2zozG1Q0gChbTEREVIrtf/pxJvXrtqVl8y5cvHCJo/8cT5bLzN/CadM2NEP7F3EmiqK20YY1X/8ko5NbeQc5xgQFEB0Zk2rbTl3aszB8OQDz5y6hWjXrCK3jU61YvXIdCQkJnDt3gc2btlOlasUM7dMtvV7tZr/gIiIyimIP3n7tixYLJOKO9+7cuQs88ICf/b0rVjSQyAhrTPVqlZg+7WuOHNpExw5hfPXFKNo4TDWGhjZix449xMScy5S+pOZq5AXyBhWwL+cNLMD/oi+mGB/x10HylShCzvx5CQwuR+mm1ej25ziaT+hNsToVaPp5r6xIO216Ycf/C98B3YEXgMmAAKONMVVsj4eMMd+LSEOgCVDLGFMZa5HLadvHdWPMvf8hZW7y3aRp1Kvdmnq1W7Nw4XK6dGkPQPDjVYiNvZJkKvGWdX9sol37FgA882wHFi9aCcDiRStTbF+osHVgXKxYIK3bNmfWzAUA9gs8AFqENeHwoX8ytH87tu+hVJmSFC9RDB8fH9p1CGPp4tVJYpYtXk2nLu0AqB5c2Z53am2jomKoXbcGAPUa1OTo0eMAnD4dSb36TwCQO3cuqj9emcOHjmZon26Z+M1U+0UX4eHLeO5Z6+jjiRrViL0cm6xYA6xZ+ycdO1qvPHzuuacIX2AtxGXL1+KhcjV5qFxNZs9ZxOt9BhMevszernOndm6ZSgSI3nWUB0oGkO/Bwnj5eFOuTU2OrdieJMavpL/9eeHHSuKdPRvXL15l45jf+KFGH6bW7sey3hM4vWE/K/pOzOouOOcBRUzPid29ucBIwAd4BkgA3heR6caYqyJSFIgH/ICLxphrIvIwUNNtGadhwPCP2LJjN5cuxRLSriuvvfQcHVs3T7thFli+bA3Nmjdk5+7VXIu7Tu9XB9m3zZz9PW/0foeoqBiGD/2YyVM+592hb7J79z5+nDozzfY/TZ9AgQIPEB+fwFtvjuDSpVgA3hs5gIfKliYxMZFTJ8/Qr+/QDO2TxWLhnbdG8tuc7/Dy9mbGtNkcPHCEbi9az2FNnfwLK5avpUmzBmzeuYK4a3H06T041bYAb/YZyodjBuPtnY0bN27wZt9hAEz+djpffD2adZsWIiLMmD6H/fsOZmifnFm8ZBWhoY05+PcGrsXF0aPHm/ZtC+b/SM9XBxAZGc07gz/k52lfM3LEQHbu2sfkH9KeQs+VKydNQurT67VBacZmBmNJZO3QqbSZNhAvby/2/7qWC4fO8FjXxgDsnbaaMi0e5+GOdUlMsJBw/SZLX/vKLbmmhyf8bi0ZfaXV/0ci8g1wyRjztm25L3Dr+tmrQFfgNDAPKAocBAoDI4wxa0TkqjEmryvHij939L57wwqVbOruFDJcdu/78/fDi3GZfxWjO4zzb+TuFDLFG6emJT9Zlw5xaya7/PMmV8MX7+pY/9b9+Z2WhWwXdNQEnrq1zna14udOwls424erBUwppbKUB1ydqEXsLohIBWAh1svoD7s7H6WUylB6U8z7mzFmP1Da3XkopVSm0A8AVkop5bF0OlEppZTH0pGYUkopj6VFTCmllMfS6USllFIeS69OVEop5bF0OlEppZTH0ulEpZRSHktHYkoppTyWBxQxvRWLUkop5ywW1x8uEJFQETkoIkdE5G0n2/1EZIGI7BKRfSLyQlr71JGYUkop5zJwJCYi3sAEoCnWu3psEZFw28f33dIb2G+MaS0ihYGDttta3UxpvzoSU0op5ZxJdP2RthrAEWPMUVtR+gVoe+cRAV8RESAvcAHrPRpTpEVMKaWUc+m4s7OI9BSRrQ6PnnfsrShwymH5tG2do6+AR4AIYA/Q15jUK6ROJyqllHIuHTdNNsZMAialEuLsppl3HqA5sBNoDJQBVojIOmNMbEo71SLmYe7HuyCfO77C3SlkuCsvp3k+2iNN3F7M3SlkiglxB92dQqZ44253kLFXJ54GHnRYLoZ1xOXoBeAjY4wBjojIMeBhYHNKO9XpRKWUUs5ZElx/pG0LUFZESolIdqAzEH5HzEkgBEBE/IHywNHUdqojMaWUUk6ZRNenE9PclzEJIvI6sAzwBiYbY/aJyKu27d8A7wNTRGQP1unHQcaYc6ntV4uYUkop5zL4j52NMYuBxXes+8bheQTQLD371CKmlFLKOf3sRKWUUh4rA6cTM4sWMaWUUs4l6P3ElFJKeap0/J2Yu2gRU0op5ZwHfIq9FjGllFLO6TkxpZRSHkuvTlRKKeWxdCSmlFLKU5kE12526U5axJRSSjmn04lKKaU8lk4nKqWU8lh6ib1SSimP5QEjMb2f2H1uzCfD2LFrNRs2LaJy5UedxpQoUYxVv89m+85V/DD1C3x8fNJs/+pr3dm4eQmbtiyh12vd7euHDO3Hhk2LWPfnAubOn0JAQJFM61t6vDtqLPXDOtOu66vuTiVdfKrWwO+rn/D7ejo5OzzjNCbbo1XIN/Y78n0+Bd8PPgfAq2BhfEeOx+/LH8n3+RRytOqYlWmnS+kGlXh19Sf0WvsZtXq1Tra9XNPq9Fg6mh6LR/HigvcpFlzODVk6V7dRLZb8OYtlf83h5Te6OY0Z8mF/lv01h/lrfqZCxfL29b758vL59x+xeMNMFq3/jSrBFQFo3jqEBX/8yv6ov3is8iNZ0o8UmUTXH26iRew+1rRZQ8qUKUnVyo3p+8YQxo4f6TTuvfcH8vWEH6hWJYRLly7zfLenUm3/SIVydOveicYN2lOnZitCWzSmdJmSAHwx/lvq1AyjXu3WLF36O4Peuet7y2aIdi2b8s3YD9ydRvp4eZG753+48v5ALvfpRva6IXgVK5EkRHLnJc8r/bg6ajCxfbtz9ZPhAJhEC9emTODyG88TO6gXOVu0T9b2XiBeQuj73fml28f8t8lAHm1Ti0JliyaJObZhL9+FvsN3LQezcMAkwsa87J5k7+Dl5cWwMQN5uUtfWtV9mrAOzShTrlSSmPohtSlRujjNn+jAsP6jGP7x2/ZtQz7sz7rVG2lZ5ynaNXqGfw4dA+DwgX/o88JAtm7ckaX9ccYkWFx+uMt9W8REpI2IvJ1GzJ8prJ8iIk9mTmZZJ6xVE2bMmAvA1i078fPLh79/4WRx9RvUYt7cJQD8PH0OYa2aptq+fPkybN28g7i461gsFtav30zr1tZbAF25ctW+3zy5c2Hukc9eC65SEb98vu5OI12ylX2ExMgzJEZHQkICN9evJnuNuklistdvws1Nf5B4LgYAc/mS9f+LF7AcPWwNuh6H5fQJvAomf+/dLahKGS4cj+bSqbMkxlvYv2AT5ZpWTxITf+2G/blP7hzAvfE1Vanao5w8dorTJ84QH5/A4rkrCAltkCQmpEUD5v+2CIBd2/aSz8+XwkUKkidvHoJrVmXW9PkAxMcncCXW+r1z9PBxjv1zIms7k5JE4/rDTe7bc2LGmHCS3/r6zpjaWZSOWwQG+nPmdIR9OSIiiqCgAKKjz9rXFSiYn8uXrmCxWH+TijgTRWBQQKrt9+8/xNBh/clf4AGux12nWbMG7Nix1x43dHh/OndpT2zsFVq1fDazu3nfkgKFsNiKE0Di+bNkK5d0esk7qBhky4bv++ORXLm5vnA2N9csSxLjVTgA71JlSTi0P0vyTg/fgAJciTxvX46NvEDRqmWSxZVvHkzDgZ3IUygfv77wSVammCL/gMJEnom2L0dFRlO52mPJYyIcYiJi8A8sQoLFwoXzlxj9xXDKP1qWfbv+ZtS7nxF37XqW5e8SPSeWsUQkj4gsEpFdIrJXRDqJyHERKWTbHiwia2zPu4vIV7bn/iIy19Zul4jUtq2/avtfROQrEdkvIouAIg7HrC4ia0Vkm4gsE5FA2/o+tvjdIvJLKjmPEJHJIrJGRI6KSB+HbW/a+rFXRP6TCa9XsnV3joxSi0lp26GD/zB+3H+ZHz6V2fN+YO/eAyQ43LLh/fc+49GH6zLz1/n0fOW5u+3G/19OXv9kgxBvb7KVLseVD97mynsDyPXU83gFFbu9PWcu8g4aybXJX0LctUxNN6M4G70fXLaV/4YMYObL42jQ/yk3ZOWEC99fKcVk8/amQqXyzJgyiw4hXYm7dp2X3+ieSYneBT0nluFCgQhjTGVjzGPAUhfbfQGsNcZUBqoB++7Y3h4oD1QEXgZuFTkf4EvgSWNMdWAy8KGtzdtAVWNMJSCtqwUeBpoDNYDhIuIjItWBF4AngJrAyyJS1VljEekpIltFZOvN+NhUD9SjZ1fW/bmAdX8uICoyhqLFguzbgoICiIyMThJ//twF/B7wxdvb2xpTNIAoW0xERFSK7X/6cSb167alZfMuXLxwiaP/HE+Wy8zfwmnTNjTVfFXKzPmzeBe6fWGMV8HCJF44lyQm8fxZ4ndshhvXMVcuk7B/F94lH7Ju9PbGd+BIbv6xkvhN67IydZddibqAb2BB+3K+wAJcjb6UYvypzQfIX6IIufLnzYr0UhUdGUNgUX/7ckCgPzFR55LHBDnEBBUhJuosUZExREfEsHu79UfRsgWrqFCpPPccD5hO9LQitgdoIiJjRKSeMeayi+0aAxMBjDEWJ+3qAzNs2yKA1bb15YHHgBUishN4F7j1a+5uYLqIdAXSunPcImPMDWPMOSAG8AfqAnONMf8zxlwF5gD1nDU2xkwyxgQbY4Kz++RL9UDfTZpGvdqtqVe7NQsXLqdLl/YABD9ehdjYK0mmEm9Z98cm2rVvAcAzz3Zg8aKVACxetDLF9oUKW3/wFCsWSOu2zZk1cwGA/QIPgBZhTTh86J80XhqVkoTDB/AKLIZXkQDIlo3sdRsTv2VDkpibmzeQrUIl8PKG7DnwLvcIiaet51Py9B6E5fQJrof/5o70XRKx6ygFSgXg92BhvHy8qdC6JodWbEsSk7+EQxF4rCTePtmIu3j1zl1luT079lOidHGKFg/CxycbLds3ZfWyP5LErF76B22fDgOgcvXHuBJ7lbMx5zkXc57IiGhKlbFebFOr/uP2CzvuJSYh0eWHu3jUOTFjzCHbCKYlMFpElmMtILeKcc672b2TdQLsM8bUcrItDGvxawMMFZFHjTEpFbMbDs8tWF93J3NFGWv5sjU0a96QnbtXcy3uOr1fHWTfNnP297zR+x2iomIYPvRjJk/5nHeHvsnu3fv4cerMNNv/NH0CBQo8QHx8Am+9OYJLl6wjxPdGDuChsqVJTEzk1Mkz9Os7NLO76ZIBwz9iy47dXLoUS0i7rrz20nN0bN3c3WmlLtHCtW/H4zv8U/Dy4saqxVhOHSdH8zYA3FgWTuLpE8Tv2Izf+MkYk8iNFYuwnDxGtkcqkqNRcxKO/0O+sd8BEDftW+K3/+XOHiVjLIksGzaFLj8Owsvbi12/reXc4TNUezYEgO3TV/Fwi8ep2LEeifEW4m/cZE7vL92ctZXFYuH9tz/m+1+/wMvbm9k/h3Pk4FE6desAwK9T57B25QbqN6nD8s1zuX7tOoP73r5C+IPBn/LJxJH4ZPfh1IkzDO5j3dakZUPeHfUWBQrm55ufx3Fg7yF6dOrjNIdM5wF/7Cz3ytVjrhCRIOCCMea6iLQDugN5gc+MMUtEZBzWKb6GItIdCDbGvG47Z7XJGDNeRLyBPMaYWBG5aozJKyIdgFewFsciwH6s04rhtufPGWM22qYXywF/A8WNMcdt604D5Y0xyeZBRGQEcNUY86lteS/QCigATME6lSjAX7bjpHpdrV/eMp7zhrno3PEV7k4hw115+QV3p5ApJm4vlnaQB/op7pC7U8gUB2K23NUvy1dea+Hyzxvfr5dk+i/mznjUSAzrOatPRCQRiAd6AbmA70VkMNZC4ExfYJKIvIR1JNQL2OiwfS7WKcc9wCFgLYAx5qbtUvsvRMQP6+s13hYzzbZOgHHOClhqjDHbRWQKsNm26ru0CphSSmUpD7g60aOKmDFmGbDMyaZkf8JvjJmCdaSDMSYaaOskJq/tfwO8nsIxd2KdNrxTXSfrnLUfccfyYw7PxwJjXdmPUkplNU+YqfOoIqaUUioL6Ujs/w8ReQHrtKWjDcaY3u7IRyml7pY7rzp0lRaxDGKM+QH4wd15KKVUhtGRmFJKKY917w/EtIgppZRyzuhITCmllMfSIqaUUspj6XSiUkopT2US7v2RmKd9ALBSSqksYhKNyw9XiEioiBwUkSMp3bRYRBqKyE4R2Scia9Pap47ElFJKOZeB04m2z62dADTF+nmzW0Qk3Biz3yHmAeBrINQYc1JEijjf2206ElNKKeVUBt8TswZwxBhz1BhzE/iF5B8H+AwwxxhzEsAYE0MatIgppZRyLjEdj7QVBU45LJ+2rXNUDsgvImtEZJuIPJ/WTnU6USmllFMp3iHRCRHpCfR0WDXJGDPJMcTZIe5YzgZUB0Kw3qFko4hsMsakeK8cLWJKKaWccnGa0BprLViTUgk5DTzosFwMiHASc84Y8z/gfyLyB1AZ6+2vnNLpRKWUUk5l8DmxLUBZESklItmBzlhvPOxoPlBPRLKJSG7gCaw3IU6RjsQ8THbv++8tux/vguz77f35WdDjy7RwdwqZIihXQXencE9Kz0gszX0ZkyAir2O9J6Q3MNkYs09EXrVt/8YY87eILAV2Yz3T9p0xZm9q+73/fiIqpZTKGMbZaay72J0xi4HFd6z75o7lT4BPXN2nFjGllFJOZeRILLNoEVNKKeVUYkLGjsQygxYxpZRSTpkMnk7MDFrElFJKOaXTiUoppTyWSdSRmFJKKQ9l7v07sWgRU0op5ZyOxJRSSnmsRIsWMaWUUh5KR2JKKaU8ll5ir5RSymPpJfZKKaU8VqKOxJRSSnmqRMu9f7cuLWJKKaWc0r8TU0op5bH06kSllFIeyxPOid37E57qX2scUo+NW5eyecdy+vR72WnMqDFD2LxjOWs2hFOpcoU02z5W8WGWrPyV39fNY8Wa2VStVhGAbNmy8dXEj1j7ZzgbNi+m75s9M7dzTvhUrYHfVz/h9/V0cnZ4xmlMtkerkG/sd+T7fAq+H3wOgFfBwviOHI/flz+S7/Mp5GjVMSvTvivvjhpL/bDOtOv6qrtTSSYrv/6qVqvI7+vmWR/r59OyVZPM7ZxN7UZPMH/9DBZs/I0XX3/OacygD/qxYONvzFz9Iw9XLGdf37VnJ+asncbsNdP4aOJ7ZM+RHYB+w3ozb90MZq7+kXGTR+ObL2+W9MUZY8Tlh7toEXOBiJQUkVRvkW2LecZhOVhEvsj87Jzz8vLio8+G0fnJHtSpEUb7jq0oV75MkpgmTetTukxJalRtRv++Q/l47Ig02w4bOYBPP5pAo3rtGPPh5wwfOQCANu1CyZ4jOw1qt6FJgw48370TDxYvmpUdJnfP/3Dl/YFc7tON7HVD8CpWIkmI5M5Lnlf6cXXUYGL7dufqJ8MBMIkWrk2ZwOU3nid2UC9ytmifrO29ql3Lpnwz9gN3p5FMVn/9Hfj7ME0adqRRvXZ07tiDT8ePxNvbO9P7OHj0W7z2TH/a13+G0PZNKF2uZJKYuiG1KF66GK1rPc3It8bw7hhrvkUCCvFMj6fo0vxFOjbsipe3F6HtrIV309otdGzYlacaP8+Jo6d4qc/zmdqP1Bjj+sNdtIhlnJKAvYgZY7YaY/q4K5lq1Stx/OgJThw/TXx8PPPmLKJFWEiSmNCwEH6dMQ+AbVt34eeXD3//wqm3NQbffHkA8M3nS1RUjG21IXfuXHh7e5MzZ07i4+O5cuVqlvU3W9lHSIw8Q2J0JCQkcHP9arLXqJskJnv9Jtzc9AeJ52w5X75k/f/iBSxHD1uDrsdhOX0Cr4KFsyz3uxFcpSJ++XzdnUYyWf31Fxd3HYvFAkCOnDkwWfBT9bGqFTh17DRnTkaQEJ/A0nkradi8XpKYRs3rseC3pQDs2b4P33x5KVSkIADe3t7kyJkDb29vcuXKydmocwBsXLvZ3pfd2/ZSJNB9X4uWRC+XH+5yXxQx2yjogIhMFZHdIjJLRHKLSIiI7BCRPSIyWURy2OKPi8gYEdlsezxkWz9FRJ502G+yn8K2Y60Tke22R23bpo+AeiKyU0T6iUhDEVloa1NARObZctskIpVs60fY8lojIkdFJMOKXmCQP2fORNmXI85EEzZN38wAACAASURBVBjonzQm0J8Ix5iIKAKC/FNtO+TtUQwfOZCd+9bw3geD+OC9sQAsmL+Ma9fi2HtoPTv2/c6ELydz6eLljOpOmqRAISy24gSQeP4sXgULJYnxDiqG5PXF9/3x5Pt0EtkbNk+2H6/CAXiXKkvCof2ZnvP9LKu//sBaONdtWsgff4YzoN9weyHILEUCCxMVEW1fjok8i/8dBadIYGGiHWKiI89SJLAwMVHnmDpxBsu2zWXl7nCuxF5l49rNyY7RrksrNqzelHmdSIOOxLJWeWCSMaYSEAu8CUwBOhljKmK9iKWXQ3ysMaYG8BUwPh3HiQGaGmOqAZ2AW1OGbwPrjDFVjDHj7mjzHrDDlttg4EeHbQ8DzYEawHAR8bnzgCLSU0S2isjW6zcvuZSkSPI56jt/O00pJrW2L7zUhaGDR1Pl0YYMHTya8V99CFh/gFgsiVQsX4/gSiG89vqLlChZzKVcM4STnLnzG8vbm2yly3Hlg7e58t4Acj31PF5BDjnmzEXeQSO5NvlLiLuWqene77L66w9g+7bd1KvZiqaNnqTvm6+Qw3aOKbM4/ZK786d5Cn3x9fOlUWg9WtZ4kqaV25Ardy7COib9papH325YEiwsmr0sI9NOl0QjLj/c5X4qYqeMMRtsz6cBIcAxY8wh27qpQH2H+BkO/9dKx3F8gG9FZA8wE6iQRjxAXeAnAGPMaqCgiPjZti0yxtwwxpzDWiD972xsjJlkjAk2xgTnzP6AS0lGnImiaNEA+3JQUX/71Is9JiKKIMeYoACiI2NSbdupS3sWhi8HYP7cJVSrVgmAjk+1YvXKdSQkJHDu3AU2b9pOlaoVXco1I5jzZ/EuVMS+7FWwMIkXziWJSTx/lvgdm+HGdcyVyyTs34V3yYesG7298R04kpt/rCR+07osy/t+ldVff44OHzrKtf/F8XCFcsm2ZaToiLMEBN3+dr01wnIUExGDv0OMf2Bhzkado2b9YM6cjODi+UskJFhYtXgNlR+//f3S+ukW1G9ah3d6j8jUPqRFL+zIWukd0BonzxOwvSZi/XXQ2a9y/YBooDIQnELMnZy9w7eOecNhnYUM+rOHHdv3UKpMSYqXKIaPjw/tOoSxdPHqJDHLFq+mU5d2AFQPrkxs7BWio8+m2jYqKobadWsAUK9BTY4ePQ7A6dOR1Kv/BAC5c+ei+uOVOXzoaEZ0xSUJhw/gFVgMryIBkC0b2es2Jn7LhiQxNzdvIFuFSuDlDdlz4F3uERJPnwAgT+9BWE6f4Hr4b1mW8/0sq7/+ipcoZr+Qo9iDQTxUthSnTpzJ1D7u2/k3xUsXo2jxQLL5ZCO0XRPWLl+fJGbN8vW0fjoUgIrVHuXqlf9xLuY8UaejqVT9UXLmygHAE/WCOXbY2pfajZ7ghde70rfbQK7H3cCdPGEkdj/9nVhxEalljNkIdAFWAq+IyEPGmCPAc8Bah/hOWM9jdQI22tYdB6oDvwFtsY667uQHnDbGJIpIN+DWJVBXgJTOsP8BPAu8LyINgXPGmFhn0yYZxWKx8M5bI/ltznd4eXszY9psDh44QrcXOwMwdfIvrFi+libNGrB55wrirsXRp/fgVNsCvNlnKB+OGYy3dzZu3LjBm32HATD52+l88fVo1m1aiIgwY/oc9u87mGn9SybRwrVvx+M7/FPw8uLGqsVYTh0nR/M2ANxYFk7i6RPE79iM3/jJGJPIjRWLsJw8RrZHKpKjUXMSjv9DvrHfARA37Vvit/+Vdfn/SwOGf8SWHbu5dCmWkHZdee2l5+jYOvm5vqyW1V9/T9SsTp9+L5MQn0CiSWRg/xFcuHAx0/s4evBYJs4Yh5e3N/NmLOSfg8d46nlrYZ754zzWrfyTuiG1WLhpJtfjrjPsP9bpzz079rNi4e/8snwKFouFA3sOMeun+QC8M6o/2bP78M2v1rMce7bt44NBn2RqX1LiAR/YgWTFVTyZTURKAouxFovawGGsRasW8CnWYr0F6GWMuSEix4EfgJZYR15djDFHRMQfmG9btwp4wxiT17b/hcaYx0SkLDAbuAb87hDjAywFCmE9F7cDeMsY00pECtiOV8rWrqcxZreIjACuGmM+tfVjL9DKGHM8pb4W9ivv+W/YHQ42Dkg7yMP4fvuDu1PIFEFlWrg7hUwRlKugu1PIFLui/ryr35Q3BDzp8s+bOlGz3DIcu5+K2EJjzGMuxh8Hgm3noTyKFjHPoEXMs2gRc25dOopYPTcVsftpOlEppVQGMk5P599b7osiZpt+c2kUZosvmWnJKKXUfSLRA+Z97osippRSKuMl6khMKaWUp7JoEVNKKeWp9JyYUkopj5Xo7gRcoEVMKaWUU55QxO6nj51SSimVgQzi8sMVIhIqIgdF5IiIvJ1K3OMiYnG8q0hKdCSmlFLKqcQMPCUmIt7ABKApcBrYIiLhxpj9TuLGAC59fL+OxJRSSjllQVx+uKAGcMQYc9QYcxP4Betn1N7pDawf7RfjZFsyWsSUUko5lZiOh+N9D22PnnfsrihwymH5tG2dnYgUBdoD37iao04nKqWUcioxHXfaMMZMAialEpLaLaluGQ8MMsZYXL3LhxYxpZRSTmXwp06dBh50WC4GRNwREwz8YitghYCWIpJgjJmX0k61iCmllHIqgy+x3wKUFZFSwBmgM/CMY4AxptSt5yIyBevdSVIsYKBFTCmlVAoSMvDGvcaYBBF5HetVh97AZGPMPhF51bbd5fNgjrSIKaWUciqjP8TeGLMY6w2MHdc5LV7GmO6u7FOLmIe5GHfV3SlkuInbi7k7hQw3/j69eWTEP0vcnUKm8C/V3N0p3JMy8u/EMosWMaWUUk55wsdOaRFTSinllAfcE1OLmFJKKed0OlEppZTHSnB3Ai7QIqaUUsopoyMxpZRSnkov7FBKKeWxtIgppZTyWHp1olJKKY+lVycqpZTyWHp1olJKKY+l04lKKaU8lk4nKqWU8lh6daJSSimPpdOJSimlPFaCB5QxLWJKKaWcuvdLGHi5OwGVdcaNHcmB/evZvm0FVas85jSmZMkH+XP9Av7et56fp0/Ex8cnyfbg6pW5EXeSDh3CAChXrgxbtyy3Py6cO0CfN3pkel/SUrpBJV5d/Qm91n5GrV6tk20v17Q6PZaOpsfiUby44H2KBZdzQ5a3NQ6px8atS9m8Yzl9+r3sNGbUmCFs3rGcNRvCqVS5QpptH6v4MEtW/srv6+axYs1sqlarCEDVahX5fd0862P9fFq2apK5nUund0eNpX5YZ9p1fdXdqSQx+uOhbN25knUbFyR5/R0VL1GMFatnsWXHCr6fMj7J909K7UOa1OOv7cvYunMlfd/saV//3geD2LRtKes2LuDHnyeQz88XgIaN6rD6j7ms37SQ1X/MpV79mpnUY+s5MVcf7pJpRUxE2ojI22nE/JnC+iki8uS/PK6PiGyzPZ8sIjEisveOmAIiskJEDtv+z++w7R0ROSIiB0WkucN6j76lcovQxpR9qBQPV6hLr16DmPDVaKdxo0cNYfwX3/LIo3W5ePEyL77Qxb7Ny8uL0aOGsHz5Gvu6Q4f+IfjxZgQ/3owaT4Ry7Voc8+a79+6/4iWEvt+dX7p9zH+bDOTRNrUoVLZokphjG/byXeg7fNdyMAsHTCJsjPPCkRW8vLz46LNhdH6yB3VqhNG+YyvKlS+TJKZJ0/qULlOSGlWb0b/vUD4eOyLNtsNGDuDTjybQqF47xnz4OcNHDgDgwN+HadKwI43qtaNzxx58On4k3t7eWdrn1LRr2ZRvxn7g7jSSaNKsAWXKlCC4ShP69RnKZ+NGOo0bMXIAEyf8wONVm3LpUixdn38q1fZeXl58/NkInu7Qg1qPt6Djk60oX/4hANas3kCdGmHUq9Waf44cp19/a1E/f/4izzz9CnVrtqL3KwOZ+O0nmdbvRHH94S6ZVsSMMeHGmI/SiKmdCYeuC9wqjlOAUCcxbwOrjDFlgVW2ZUSkAtAZeNTW7msRuXe+u+9C69bN+Wn6LAD+2rwdvwf8CAgokiyuUcM6zJ69CICffppJ2za3b9v+eu8XmTN3ETFnzzs9Rkjjuhw9eoKTJ89kQg9cF1SlDBeOR3Pp1FkS4y3sX7CJck2rJ4mJv3bD/twndw7cOXFSrXoljh89wYnjp4mPj2fenEW0CAtJEhMaFsKvM+YBsG3rLvz88uHvXzj1tsbgmy8PAL75fImKigEgLu46FosFgBw5c2DMvTVpFFylIn75fN2dRhItw5rwi+3137plJ/ke8MXfv3CyuHoNajJ/3lIAfvl5DmG2UW5K7asHV+LY0ROcOH6K+Ph45sxeRItW1vfv99Xr7e/T1i07CQoKAGDP7v329/Lvvw+TM2cOsmfPnin9TsS4/HAXl4uYiOQRkUUisktE9opIJ9v64yJSyPY8WETW2J53F5GvbM/9RWSure0uEaltW3/V9r+IyFcisl9EFgFFHI5bXUTWisg2EVkmIoG29X1s8btF5BeHVEOBJQDGmD+AC0660xaYans+FWjnsP4XY8wNY8wx4AhQ447XoZCIbBSRsDvWlxSRAyIy1ZbTLBHJbdsWIiI7RGSPbXSYw+G1GyMim22Ph1x8O9KtaFAAp09F2JfPnI6kqO2b4paCBfNz6dJl+zfO6TORBBW1xgQFBdCubSj/nfRTisd4+um2/PLrvEzIPn18AwpwJfJ2oY2NvIBvQP5kceWbB/PKqk/o9MMAFg6YlJUpJhEY5M+ZM1H25Ygz0QQG+ieNCfQnwjEmIoqAIP9U2w55exTDRw5k5741vPfBID54b6w9rlr1SqzbtJA//gxnQL/h9vdcOWd9nSPtyxFnoggMSvoeFSiYn8uXrthfS8eYlNoHBgYkX3/Hew/w7HNPsnLF2mTr27QNZfeu/dy8efPuOpgCk46Hu6RnJBYKRBhjKhtjHgOWpqPtF8BaY0xloBqw747t7YHyQEXgZeBWkfMBvgSeNMZUByYDH9ravA1UNcZUAhwnzxsBa9LIx98YEwlg+/9W0SwKnHKIO21bhy0ff2ARMMwYs8jJfssDk2w5xQKviUhOrCPCTsaYilgvpunl0CbWGFMD+AoYn0be/5pI8vH+nb+BpxYz9rP3eGfwKBITnc9++/j40LpVM2bNXpgB2WY8Z6ONg8u28t+QAcx8eRwN+j/lhqys7ua9Sa3tCy91Yejg0VR5tCFDB49m/Fcf2mO2b9tNvZqtaNroSfq++Qo5cmTOb/L3i7v9/kn5/Ut+rDv3++ZbvUhISGDmr+FJ1j/88EMMHzmAN/sOSzP/fysB4/LDXdJTxPYATWwjh3rGmMvpaNsYmAhgjLE4aVsfmGHbFgGstq0vDzwGrBCRncC7QDHbtt3AdBHpiu0jvkQkCLhgjLmWjtwcOZvZvfXu+GCdehxojFmRQvtTxpgNtufTsE5tlgeOGWMO2dZPxdrfW2Y4/F/LaVIiPUVkq4hsTUz8n2s9AXq92s1+wUVEZBTFHgyybytaLJCIyOgk8efOXeCBB/zs50eKFQ0kMsIaU71aJaZP+5ojhzbRsUMYX30xijYOU42hoY3YsWMPMTHnXM4vs1yJuoBvYEH7cr7AAlyNvpRi/KnNB8hfogi58ufNivSSiTgTRdGit0fFQUX97dNF9piIKPuoGKwj4+jImFTbdurSnoXhywGYP3cJ1apVSnbsw4eOcu1/cTxcwb0XttyLXnr5WdZuCGfthnCiIqMpWjTQvi2oaABRkUnfo/PnLuD3gK/9+8cxxvo+JW8fEeFkvcN73/mZ9jRv0YhXXuqf5FhBQQH8OONrXntlAMePncy4Tt/hvhqJ2X4IV8dazEaLyK3yn+Cwn5x3kYuz10GAfcaYKrZHRWNMM9u2MGCCLadtIpINaAEsc+FY0Q7TkoHAra+a08CDDnHFgFtzcAnANqA5KbuzDwbnhTGlNk6/Fowxk4wxwcaYYC+vPGns7raJ30y1X3QRHr6M5561XivzRI1qxF6OTfaDEmDN2j/p2NE6U/rcc08RvsD6Q7Bs+Vo8VK4mD5Wryew5i3i9z2DCw2+/1J07tbsnphIBInYdpUCpAPweLIyXjzcVWtfk0IptSWLyl7g9ZRPwWEm8fbIRd9E91+7s2L6HUmVKUrxEMXx8fGjXIYyli1cniVm2eDWdulhnvasHVyY29grR0WdTbRsVFUPtutbZ8HoNanL06HHAegWd/ReVB4N4qGwpTp1w73nMe9H3306nQZ02NKjThkULV9LZ9voHP16F2MvW1/9O6//4i7btrKfhOz/TgcWLVgKwZPEqp+23b9tDaYf3r0PHMJYuWgVYr1rs268nz3R6lbi46/Zj5PPz5ZdZk3h/+Gf8tWl7pr4GnnB1ost/J+YwyplmO5fV3bbpONZCsgTomELzVVin0MbbLpTIY4yJddj+B/CKiPyIdWqvEfAzcBAoLCK1jDEbbdOL5YC/gQeNMb+LyHrgGSAv1inPoS50JxzoBnxk+3++w/qfRWQsEASUBTbbthngRWCmiLydwkUrxW/lCnQB1gMHgJIi8pAx5gjwHOA4ud3JlkcnYKMLuf8ri5esIjS0MQf/3sC1uDh69HjTvm3B/B/p+eoAIiOjeWfwh/w87WtGjhjIzl37mPzDjFT2apUrV06ahNSn12uDMiv9dDGWRJYNm0KXHwfh5e3Frt/Wcu7wGao9az1hvn36Kh5u8TgVO9YjMd5C/I2bzOn9pdvytVgsvPPWSH6b8x1e3t7MmDabgweO0O3FzgBMnfwLK5avpUmzBmzeuYK4a3H06T041bYAb/YZyodjBuPtnY0bN27Yp52eqFmdPv1eJiE+gUSTyMD+I7hw4aJ7Ou/EgOEfsWXHbi5diiWkXVdee+k5OrZO7XfHzLdi2RqaNmvAtl2riIuL4/Vety+8/nXWt/R9fQhRUTGMGPYJ3/0wjsFD+7Fn936m/Tgr1fYWi4WBb73HrHmT8fbyZvpPszhge//GfDqcHDmyM2f+FMB6cUf//wzj5Z7PUap0Cd4a1Ju3BvUGoGPb7pw75+z0/91x5wUbrhJXr0yyXW7+CdaiGw/0MsZsFZF6wPdANPAXEGyMaSgi3W3PX7edS5oElAYstrYbReSqMSavWCeMv8Q67Xhr2m2aMWaWiFTBek7ND2vRHY/1HNPvtnWCderuE2CbMaaKQ84zgIZAIVt+w40x34tIQeA3oDhwEnjKGHPB1mYI1mKVAPzHGLPEtv5WrtmBBcB8Y8zXDscqCSzGWpBrA4eB54wx10QkBPjUlv8WW/9viMhx4AegJdbRbBdboUtRtuxF7/2vqnR6L7Chu1PIcOMvbXV3Cpki4h/3/vlEZvEv5d4imVkuXDl8Vxe/9yvZ2eWfN+OO/+KWC+1dLmL3OhGpC3Q1xrjlLyRtRWyh7aIXV9scx1roXT6RpEXMM2gR8yxaxJzrm44i9rmbith987FTxpj1WKfvlFJKZQCLB0wn3jdFzN2MMcexXkmZnjYlMyUZpZTKAJ5wTkyLmFJKKafu/RKmRUwppVQKdCSmlFLKY3nCnZ31VixKKaWcsmBcfrhCREJtdwg5Ik7uciIiz9o+e3a3iPwpIpXT2qeOxJRSSjllMnA60fZBFxOAplg/HWmLiIQbY/Y7hB0DGhhjLopIC6x/X/xEavvVIqaUUsqpDJ5OrAEcMcYcBbDdfaQtYC9ixhjHe0xu4vZn5aZIi5hSSimnEjP2wzCc3SUktVHWS9huq5UaLWJKKaWcSk8JE5GeQE+HVZOMMY436kvtLiF37qsR1iJWN63jahFTSinlVHousbcVrNTuLpvaXULsRKQS8B3Qwhjj/DbyDrSIKaWUciqDP3ZqC1BWREoBZ4DOWO9AYicixYE5WD88/VDyXSSnRUwppZRTGfnHzsaYBBF5Hes9H72BycaYfSLyqm37N8AwoCDwte1u2AnGmODU9qtFTCmllFMZeYk9gDFmMdZbVjmu+8bheQ+gR3r2qUVMKaWUU57wiR1axJRSSjnlCfeb1CLmYcb5N3J3ChluQtxBd6eQ4YJyFXR3Cpnifr15ZPSxZe5O4Z6kHwCslFLKY+lNMZVSSnksHYkppZTyWHpOTCmllMfSqxOVUkp5rIz+O7HMoEVMKaWUUxZz74/FtIgppZRySi/sUEop5bF0OlEppZTHyuCbYmYKLWJKKaWcuvdLmBYxpZRSKdBzYkoppTyWXp2olFLKY+lITCmllMfSqxOVUkp5LP3sRKWUUh5LpxOVUkp5LE+4sMPL3QmorFe8YSW6rvmE59Z9RvXXWifbXqpZNbosH0XnpR/y9KKRBD5eLsl28RI6L/mAVj/0z6qUnarbqBZL/pzFsr/m8PIb3ZzGDPmwP8v+msP8NT9ToWJ5+3rffHn5/PuPWLxhJovW/0aV4IoANG8dwoI/fmV/1F88VvmRLOnHnWo3eoL562ewYONvvPj6c05jBn3QjwUbf2Pm6h95uOLt96drz07MWTuN2Wum8dHE98ieIzsA/Yb1Zt66Gcxc/SPjJo/GN1/eTMt/9MdD2bpzJes2LqBS5QpOY4qXKMaK1bPYsmMF308Zj4+PT5rtQ5rU46/ty9i6cyV93+xpX//eB4PYtG0p6zYu4MefJ5DPzxeAho3qsPqPuazftJDVf8ylXv2amdRj17w7aiz1wzrTruurbs0jPUw6/rmLFrH/Z8RLaPhBN8Kf/5jpjQdSrm1N8pcNShJzev0+ZjQbzC+hQ1jV/1tCPu6RZHvll0K5cCQiK9NOxsvLi2FjBvJyl760qvs0YR2aUaZcqSQx9UNqU6J0cZo/0YFh/Ucx/OO37duGfNifdas30rLOU7Rr9Az/HDoGwOED/9DnhYFs3bgjS/tzi5eXF4NHv8Vrz/Snff1nCG3fhNLlSiaJqRtSi+Kli9G61tOMfGsM744ZAECRgEI80+MpujR/kY4Nu+Ll7UVouyYAbFq7hY4Nu/JU4+c5cfQUL/V5PlPyb9KsAWXKlCC4ShP69RnKZ+NGOo0bMXIAEyf8wONVm3LpUixdn38q1fZeXl58/NkInu7Qg1qPt6Djk60oX/4hANas3kCdGmHUq9Waf44cp19/a5E4f/4izzz9CnVrtqL3KwOZ+O0nmdJnV7Vr2ZRvxn7g1hzSK9EYlx/ukiFFTERKisjejNjXvURERopIE9vz/4hI7n+xj/EiUv+OdSPuWK4oIlPuJldX+Vcpw6Xj0cSePEtivIVD4Zso3ax6kpj4azfsz31y50hycjdPQAFKNq7C/hlrsiLdFFWq9ignj53i9IkzxMcnsHjuCkJCGySJCWnRgPm/LQJg17a95PPzpXCRguTJm4fgmlWZNX0+APHxCVyJvQrA0cPHOfbPiaztjIPHqlbg1LHTnDkZQUJ8AkvnraRh83pJYho1r8eC35YCsGf7Pnzz5aVQkYIAeHt7kyNnDry9vcmVKydno84BsHHtZiwWCwC7t+2lSGDhTMm/ZVgTfpkxD4CtW3aS7wFf/P2TH6teg5rMn2ftwy8/zyGsVZNU21cPrsSxoyc4cfwU8fHxzJm9iBatQgD4ffV6e9+2btlJUFCA9bXZvZ+oqBgA/v77MDlz5iB79uyZ0m9XBFepiF8+X7cd/9/QkVgmE5FMPadnjBlmjFlpW/wPkK4iJiIFgJrGmD9sy3VFZAvwqohsFpHGtuPsAYqJSPEMTN+pPAH5uRpxwb58NfICeQPyJ4srHRpM198/pvXUt1j11rf29fVHdGXDqBmYRPee8PUPKEzkmWj7clRkNP53/GD2DyhMZIRDTEQM/oFFeLBkUS6cv8ToL4YzZ9U03h87hFy5c2ZZ7qkpEliYKIecYyLPJutXkcDCRDvEREeepUhgYWKizjF14gyWbZvLyt3hXIm9ysa1m5Mdo12XVmxYvSlT8g8M8ufMmUj7csSZKAKD/JPEFCiYn8uXrtgLj2NMSu0DAwOSrw9Mul+AZ597kpUr1iZb36ZtKLt37efmzZt318H/Z+6LkZiIDBWRAyKyQkRmiMhbtvXVRWSXiGwEejvEdxeR+SKyVEQOisjwVPZd0rbvqSKyW0Rm3Rrt2Pa/VkS2icgyEQm0rV8jIqNEZC3QN4X9+ovIXFt+u0Sktm39PNv+9olIT4f4qyLymYhsF5FVIlLYtn6KiDwpIn2AIOB3Efndtm2iiGy17eu9FLr4JLDUYXks8A7wDdAUOOKwbQHQOYX+9LQda+uGq4dTejldIiLJ1jn7+ju6dCvTGg1kUY9x1HzrSQBKhlTh2vlYzu45flc5ZAin/TAuxWTz9qZCpfLMmDKLDiFdibt2nZff6J5JiaaPk5Rd7pevny+NQuvRssaTNK3chly5cxHWsXmSuB59u2FJsLBo9rKMTNshtbTfl9RiUtrmyuvy5lu9SEhIYOav4UnWP/zwQwwfOYA3+w5LM3+VlMePxEQkGOgIVAU6AMEOm38A+hhjajlpWgN4FqgCPGXbT0rKA5OMMZWAWOA1EfEBvgSeNMZUByYDHzq0ecAY08AY81kK+/wCWGuMqQxUA/bZ1r9o218w0EdECtrW5wG2G2OqAWuBJIXXGPMFEAE0MsY0sq0eYowJBioBDUSkkpM86gDbHJZvAgG2fV42xpx02LYVSDpvdPv4k4wxwcaY4Dp5y6bQZddcjbxA3qAC9uW8gQX4X/TFFOMj/jpIvhJFyJk/L4HB5SjdtBrd/hxH8wm9KVanAk0/73VX+fxb0ZExBBa9/Zt4QKA/MbapsyQxDqOAgKAixESdJSoyhuiIGHZvt35ZLFuwigqVynMviI44S4BDzrdGWI5iImLwd4jxDyzM2ahz1KwfzJmTEVw8f4mEBAurFq+h8uMV7XGtn25B/aZ1eKf3iAzN+aWXn2XthnDWbggnKjKaokUD7duCigYQFRmTJP78uQv4PfB/7d15vJVVvcfxzxc86r1OaZpDhlNqVzFLJVEp59JMJSfUCJTJ7AAAGnhJREFURm9mRipaDqXm0C2zMivNWXPMket0cSQVCRQHQMVZA8dQnEEElcP3/rGeg5vj5hzg7MPaz8Pv/Xrt1z7Pep69+W7Bvc5azxqWomfPnh+75t8vv1L39f/+d53yVz563733/SZf23FrfvSD2QcbrbLKSlxyxZkM/NERPDfhBcK8afXMuX7k0llLrB9wg+1ptqeQWgtIWoZUkbS12y9t97qhtt+wPQ24tnifOXnR9sji58uKa9cFegNDJT0EHAusWvOaqzrJvQ1wFoDtVtvvFOWHSHoYGAV8BmirEWbWvGdbhs7sJWkMMBZYH6g3DGtl4LWa4wOAAUWOKyStXnNuEqm1161efXg8n1h9JZb+zAr0aOnJOrv0ZcLQMbNds8zqH31BrtB7dXouugjT33qXe393NRd+6RAu3vwwbvvJGbw08nGGDjqruyPXNW7s46y2Zi8+3WsVWloW4evf3J47bxs+2zV33jqcXffaCYANN+7NlMnv8tqkN3h90htM/PerrLHWagBs9pU+swZ25PbYQ0/Qa81V+XSvlVmkZRF26L8dd98+YrZrht0+gp332gGADTZan3enTOX1SW/wykuv8vmN12fx/1gMgE2/vAkTnnkOSCMe9zvo2wz63pFMn/Y+jXTBeX9nyy12YcstduGmIf9g7336A7BJny8w+Z0pvPrqax97zYjh97Fr//QZ9t53N26+KfXa33LzHXVfP2b0ONZca3V6rbYqLS0t7Lb7Ttx60x1AGrU46LAD2HfAgUybNn3Wn7H0Mktx5eBz+Z/j/8h9o8YQ5l0ZuhM7u6dUpxE/q7yj1O3Pzeu1Ah6bQysPYGoH71eXpK2A7YDNbL8naRgwpxshHf6NSFoDOBzoY/utYlBGvfeaVltu+3FgZ0m/AV4GLgC2LU4vXlzfrdw6k7t/eTG7XHYkPXr24PGr7ubNp1+m97e3AeDRy+5krR378Lnd+zFzRiszpn/ArQP/2t2x5llrayv/8/Pfc8FVp9GjZ0/+9/Ibefap8Qz43m4AXHXxtdz9j5F8ZbstuP3+65j+3nSOHvTRSLlfH30KfzjrV7Qs2sKLz7/M0Yekc9t9fSuOPelwlvvkspx9+Z948tGn2X/AIQv0c/326FM564o/0aNnT66/Ygj/emoCe343fbFfc8n1/PMf99Bv280YMuoapk+bznGHpk6KcWMfZ+iQu7jy9otobW3lyXFPM/jSNHjlFyf9jEUXbeHsq/6crh39GL8+qvGj9YbeNoztv7olox++g2nTpnHQjz8aEXrV4PMYdNAxvPLKJE447g+cf+GfOPqXhzHukce57JLBHb6+tbWVIw8/kcHX/42ePXry90sH8+STqTf+d6ccz2KLLcq1N1wEpMEdPzv0OH54wHdYY83VOPyon3D4UemOx+67fp/XX3+THI44/mQeGPsIb789mW37f5uBP/gOu+/8tc5fmFEZlp1SR8uKSOoDnANsTqrwRgPn2T5F0iPAQNsjJP0O2Ml2b0nfB04itaSmAfeRuvEerPP+qwMTgM1t3yvpPOBJUlfi48B3ivIWYB3bjxWVz+H13q/mfa8ERtn+s6SepO7CrYH9be8s6XPAQ8AOtodJMrCP7SslHQusaPvgonIaYnuwpHHALrYnSNoQuITUzboC8AhwlO2L2uU4GXjW9vnFcW/bjxajE28FTrP9peLc7sD2tjucRHL6Z77d/P+q5tEZ7z+VO0LDLdajpfOLSujFqR9vVVXBqxO65x5hbi3LrzmnhshcWeOTG871982ENx7u0p81vzpsidl+QNKNwMPA86T7Nm1dc/sBf5P0HtD+X8AIUhfjZ4HLO6pwgCeA70k6B3gGOMv2B5L2AE4rui4XAf7MR/e2OjMIOFfSD4BW4MekSuPAovJ9itSl2GYqsL6k0cXnG1DnPc8FbpE00fbWksYWecYDI+tcD3AT8CPg/OJ4oKQvkLoy+5NGPLbZurg+hBCaQhmWneqwJQYgaUnb7xajBocDB9ieYwdz0RLbxPZBnf7hqSU2xHbveQndaJLetd0tSxhIGgF8w/bbNWUn2D6h5ngx0oCSfrZndPR+0RIrh2iJlUu0xOrrtdwGc/1988Kb45qvJVY4V9J6pHs2F3dUgYW6fgb0At6uKRvW7ppewM87q8BCCGFBKsPaiZ1WYrb3nZc3LO4LXVRbVgxlv6PO5dt2pRUm6Rhgz3bF19j+Tb3r56S7WmHFe99Xp2xYu+NnSF2pIYTQNHKOOpxbC2QVe9tvkOaMNfp9f8Ps88dCCCE0SKNHJ0raAfgL0BM43/bJ7c6rOP914D3g+531/pV62akQQgjdx/ZcPzpTjBQ/A9iRNK92n+JWVa0dSfN31ybNq+10ImpUYiGEEOqaief6MRe+RJpyNN72B8CVwK7trtkVuMTJKOATbUsOzklUYiGEEOpqnTlzrh+1a7wWjwPavd2ngRdrjl8qyub1mtnEzs4hhBDqmptuwpprzyXNp52TekPw2/8Bc3PNbKISCyGEUFeDJzu/RFrooc2qpIXV5/Wa2UR3YgghhLoaObADeABYW9IakhYlbT11Y7trbgS+q6Qv8I7tie3fqFa0xEIIIdTVyHlitmdIOoi0TGFP4G/FergHFufPBm4mDa9/ljTEfr/O3jcqsRBCCHU1ep6Y7ZtJFVVt2dk1P5uaTZbnRlRiIYQQ6mqdWYFlp0IIISycyrCfWFRiIYQQ6pqXIfa5RCUWQgihrjJUYp3uJxYWXpIOKCYwVkYVPxNU83NV8TNBdT9XLjFPLHSk/bIxVVDFzwTV/FxV/ExQ3c+VRVRiIYQQSisqsRBCCKUVlVjoSBX77av4maCan6uKnwmq+7myiIEdIYQQSitaYiGEEEorKrEQQgilFZVYCCGE0opKLAAgqYekzXPnCAsvSWtK+j9Jr0uaJOkGSWvmztUVklaVdHjxWR6QNFzSmZJ2khTfvw0QAzvCLJLutb1Z7hzdQdKGwJeLw3/afjhnnkaR1BNYkZol5Gy/kC/R/JM0CjgDuKIo2hs42Pam+VLNP0kXAp8GhgAPApOAxYF1gK2BjYGf2x6eLWQFRCUWZpF0IvAIcK0r9A9D0iDgh8C1RdE3gXNtn54vVddJOhg4HngVaNszw7Y/ny/V/JN0X/sKS9Io231zZeoKSb1tP9rB+UWBXrafXYCxKicqsTCLpCnAEsAMYDog0pfi0lmDdZGkR4DNbE8tjpcA7i3rl30bSc8Cm9p+I3eWRpB0MvA2cCVgYACwGKl1hu0386ULzSpWsQ+z2F4qd4ZuIqC15ri1KCu7F4F3codooAHF84/alf83qVIr3f0xSVsBz9p+SdJqwAXAksCR0Y3YGFGJhdlIWhZYm9R3D0AF/me7ELhP0nXFcX/Sl0nZjQeGSboJeL+t0Pap+SLNP9tr5M7QDU4Gti9+PgkYDIwFzgI2yhWqSqISC7NI2h8YBKwKPAT0Be4FtsmZq6tsnyrpbmALUgtsP9tjM8dqhBeKx6LFo9QktQA/Br5SFA0DzrH9YbZQXSDpeKAXcJgkAV8j/eKxIrC8pOOAYRX4JTGruCcWZpE0DugDjLL9BUmfA060PaCTlza9Ko3ia0/SUqR7l+/mztIVks4HWoCLi6LvAK2298+Xqmsk3Q/8HFgZGGB7l6J8pO0tsoariGiJhVrTbU+XhKTFbD8pad3cobqq3Si+tvthBso+sKM3cCmwXHH8OvBd249lDTb/+tjesOb4TkllnwpxGHAqqbv3AABJ65N6OkIDRCUWar0k6RPA9cBQSW8B/86cqREGAetWZRRfjXOBn9q+C2YNIjgPKOuk9VZJa9n+F6TJz8w+IKd0bI8ENm1X9hjwkzyJqie6E0NdkrYElgFutf1B7jxdIekuYHvbM3JnaSRJD7drudQtKwtJ25IG4YwntZZXI92/vCtrsPkkqZ/tER2cX5o0T2yOc8lC56IlFmYjqR+wtu0LJa1AWnFgQuZYXVWpUXw1xkv6JalLEeDblPjvyvYdktYG1iVVYk/afr+TlzWz3SX9HrgVGA28Rhr1+1nSih2rAT/LF68aoiUWZilGU21C6npbR9IqwDVlvwFdfK6PsX3igs7SSMV0iBOBfqQv/eHACbbfyhpsPklaHBhI+jwG/gmcbXt61mBdUPwd7UEaGbsyMA14Aripo1ZamHtRiYVZJD0EfBEYY/uLRdkjZV/ZojOSTrd9cO4cCztJVwNTgMuKon2AZW3vmS9VaHbRnRhqfWDbkgyzlmdaGJSqpSnpz7YPlfR/pBbLbNqGcZfQuu3u591VgdGJoZtFJRZqXS3pHOATkn5IWu7nvMyZwse13QM7JWuKxhsrqa/tUQCSNgVGZs4UmlxUYqHW+8A/gMmkm+vH2R6aN1Joz/bo4scv2P5L7blixf67F3yqhtgU+K6ktknovYAnikn4pV2dP3SvuCcWZpH0a9IeTmOAvwG3VWlLljmRNLbtHmCZSBpje6N2ZaX8LADFArlzZPv5BZWl0YqJ6esx+5qkl+RLVB1RiYXZFGu8fRXYjzRS8WrggrYJqGVX7Ka7pO3JNWXft31RvlTzRtI+wL6kUXz/rDm1FGmZpu2yBAt1FaNjtyJVYjcDOwIjbO+RM1dVRHdimE0xsOMV4BXSvmLLAoMlDbV9ZN5080fS5cCBpNUfRgPLSDrV9h8AylSBFe4BJgLLA3+sKZ9C2tQ0NJc9gA2Bsbb3k7QicH7mTJURLbEwi6RDgO8Br5P+J7ve9odF6+UZ22tlDTifJD1ULGj8LdKW8EcBo+MeS1gQJN1v+0uSRpMmOU8BHrW9fuZoldAjd4DQVJYHdrP9NdvXtG2BYXsm8I280bqkpdjmoz9wQ/G5Sv/bm6S+kh6Q9K6kDyS1Sprc+Subk6Qd65QdmCNLgz1YrEl6HqknYAxwf95I1REtsVB5RQvzKOBhYCfSqLfLbH85a7AukvQgaSDONaT7l98FPmv7mKzB5pOke4Bjbd9ZHB8FbGX7Y5VbWUlaHVjadnT7NkhUYmGhJGmRsi8ILOlB25vUrqoi6R7bpVzFXtLywBDgCGAH4HPA3mXdFLONpDtsb9tZWZg/MbAjVF5xI/0kYBXbO0paD9gMuCBvsi57T9KiwEPFQrMTgdKusmL7dUm7kOYqjgb2KPMUj2ItyP8k7eK8LGl9S4ClgVWyBauYaImFypN0C2mLj2NsbyhpEdJIsQ0yR+uSYl7VJNJuyIeRts450/azWYPNI0lTSPco2zYrXZQ0MtakAbNLZ4w334qJ54eSKqzaffkmA+fZ/muWYBUTlVioPEkP2O5TOxG4bcRi7myh+iQdbPv03DmqKroTw8JgqqRPUoxIlNQXeCdvpPnXtgzTnM6XcepAMcn+S6T960xqudxf8u7EbYpBKi9L2q39edvXZohVOVGJhYXBT4EbgbUkjQRWIE1ALasyT3f4GElfBc4EngFeLopXBT4raaDt27OF65otgTuBneucMxCVWANEd2JYKBT3wdp2DH6q7CPeqkTSE8COtp9rV74GcLPt/8oSLJRCtMRCZdXrwimsI6n03Tk1AyIgDYZoAaaWcCDEIsBLdcpfJn2mUiu6so/nox2rRwC/sv1G1mAVEZVYqLK2bpxPAZuTunYgLf0zjJJ359heqvZYUn/SfaWy+RvwgKQrgReLss+QJnKXfRoEwJXAcGD34vhbwFVALNTcANGdGCpP0hDgh7YnFscrA2fYnlNLrbQkjbLdN3eOeVXM3duFNLBDpJbZjbYfzxqsASSNtr1xu7IHbW+SK1OVREssLAxWb6vACq8C6+QK0yjtukt7kJaeKuVvpUVlVfoKaw7ukrQ3aVsjSIOKbsqYp1KiJRYqT9JfgbWBK0hf8nsDz9o+OGuwLpJ0Yc3hDOA50iTaSXkSzR9JywC/IC3QvEJRPAm4ATjZ9tu5sjVCce9yCWBmUdQDmFr8XNrJ3M0iKrGwUChaLW0L/g63fV3OPOEjkm4j3a+82PYrRdlKwPeBbW1vnzFeaHJRiYVQUpLWBP4C9CW1MO8FDrM9PmuweSTpKdvrzuu5MinWTlwbWLytzPbwfImqI/YTC5UlaUTxPEXS5JrHlDLvu1XjctJ9lpVJ6/NdQ+oyLZvnJR1ZLNQMpEWbi61YXuzgdaUgaX/S6MTbgBOL5xNyZqqSqMRCZdnuVzwvZXvpmsdSFbkPIduX2p5RPC6jnAM7BgCfBO6W9KakN0lTIJYD9soZrEEGAX2A521vDXwReC1vpOqI7sRQecVaiY/ZnlIcLwmsb/u+vMm6RtLJwNukeUgmVQaLAWcA2H4zX7rQpmYB6oeATW2/HwtQN05UYqHyJI0FNmpbTFZSD+BB2xvlTdY1kiZ0cNq211xgYbqJpP1sX9j5lc1L0nXAfqRtWbYB3gJabH89a7CKiEosVF6933prd0MOzUvSC7Z75c7RKJK2JO37dqvtD3LnqYKY7BwWBuMlHQKcVRwPBEo1gq8eSS3Aj4GvFEXDgHPKtrixpEfmdApYcQ7nSqO2O9v23ZKWIt0XK3V3drOIllioPEmfAk4jdeUYuAM4tGyTgtuTdD5pgdyLi6LvAK2298+Xat5JehX4GqmbbbZTwD22V1nwqRqnqt3ZzSJaYqHyispq79w5ukEf2xvWHN8p6eFsaebfEGBJ2w+1PyFp2IKP03Cq3dzT9sxia6DQAPEfMlSWpCNt/17S6dQZem77kAyxGqlV0lq2/wWzJj+3Zs40z2z/oINz+y7ILN2kkt3ZzSIqsVBlTxTPD2ZN0X2OIC0u2/aFuDppFFypSHoQGAncAgyzPT1zpEY7kNSdfSwfdWcfkDVRhcQ9sRBKStLiwM+AbYuiocCfylYJFF1r/YAdSHu9vUFa1eIW20/nzLYgSPqF7d/mzlFWUYmFypN0F/W7E7fJEKdhJF0NTAb+XhTtAyxre898qbqu2O9tR1KltjZwr+2BeVN1H0ljYpDH/IvuxLAwOLzm58VJO+zOyJSlkdZtN7DjrpIO7JiN7YmSLgIGA+8Cm+VN1O2UO0CZRSUWKs/26HZFIyXdnSVMY42V1Nf2KABJm5LuLZWSpMtJ949agdGkScGn2v5D1mDdL7rDuiAWAA6VJ2m5msfyknYAVsqdqwE2Be6R9Jyk50hbsWwpaVwHE4ib2Xq2J5M2x7wZ6EWa+1Z10RLrgmiJhYXBaNJvuwI+JO2APMdh3SWyQ+4ADdZSrELSH/ir7Q8llbqVIqkncIjtP3Vw2TULKk8VRSUWFgZHkdaqmyzpl8BGwHuZM3WZ7edzZ2iwc0i/YDwMDJe0GmngSmnZbpW0KzDHSsz2SQswUuXE6MRQeW2L/UrqB5wE/BE42vammaOFTkhaxHapB+FI+g3p/t5VwNS2cttjsoWqkKjEQuVJGmv7i5J+C4yzfXlbWe5s4SPFzs4nAavY3lHSesBmti/IHK1Liike7bnsUzyaRVRiofIkDQFeBrYDNgamAfe3G54eMpN0C3AhcIztDYtJ0GNtb5A5WmhiMToxLAz2Iq0AsYPtt0nb3h+RN1KoY3nbVwMzAYpuxNKtBdmepBUlXVBU0khaT1IVBhY1hajEQuXZfs/2tbafKY4n2r49d67wMVMlfZJi3lSxD9c7eSM1xEWkX6LatpR5mrTLc2iAqMRCCM3ip8CNwFqSRgKXAAfnjdQQlWxhNosYYh9CaAq2x0jaEliXNKfvqbLtUj0HVW1hNoUY2BFCyErSbh2dt33tgsrSHSRtBJwO9AYeBVYA9rBdxlVVmk5UYiGErCRdWPz4KWBz4M7ieGvS/mIdVnJlUIy0rFoLsylEd2IIISvb+8GsqRDr2Z5YHK8MnJEzWyMU+74NJO2ZZuCfks4u275vzSpaYiGEpiDpUdu9a457AI/UlpVRse/bFOCyoqgS+741i2iJhRCaxTBJtwFXkFosewP1Vrsom0ru+9YsohILITQF2wcVgzy+XBSda/u6nJkapFL7vjWb6E4MIYRuJOkJ0qCOF4qiXsATpHljtv35XNmqICqxEEJWkkbY7idpCrPvcizSl/zSmaI1RLGlTEcm235rgYSpoKjEQgghI0ljbG+UO0dZxbJTIYSmIKmvpKVqjpcs7h9VnXIHKLOoxEIIzeIs4N2a4/eKsqqL7rAuiEoshNAs5Jr7G7ZnEiOoQyeiEgshNIvxkg6R1FI8BgHjc4daAKI7sQtiYEcIoSlI+hRwGrANqYvtDuBQ25OyBmuAYhHgtmWnRtoeU3NuOdtvZgtXclGJhRBCN5J0HLAn0LYaf3/gGtu/zpeqOqISCyFkJelI27+XdDp1BjnYPiRDrIYpJjt/sW3BX0n/AYyx/V95k1VD3DQNIeT2RPH8YNYU3ec5YHGgbdX6xYB/ZUtTMdESCyGEbiTpeqAPMJTU0tweGAFMgvK3NHOLSiyE0BQk3UX97sRtMsRpGEnf6+i87YsXVJYqikoshNAUJG1cc7g4sDsww/aRmSKFEohKLITQtCTdbXvL3Dnmh6RxdLAaR6xe3xgxsCOE0BQkLVdz2APYGFgpU5xG+Ebx/JPi+dLi+VukJbVCA0RLLITQFCRNILVcBMwAJgC/sj0ia7AukjTS9hadlYX5Ey2xEEJTsL1G7gzdZAlJ/doqY0mbA0tkzlQZsXZiCKEpSNqzbSsWScdKurZYrqnsfgCcIek5Sc8BZwL/nTdSdUR3YgihKUh6xPbnJfUDfgucAhxtuxJ7iklamvSd+07uLFUS3YkhhGbRWjzvBJxl+wZJJ2TM0xCSftruGOAdYLTth7KEqpDoTgwhNIuXJZ0D7AXcLGkxqvEdtQlwIPDp4nEAsBVwnqSYA9dF0Z0YQmgKkv4T2AEYZ/sZSSsDG9i+PXO0LpF0G7C77XeL4yWBwcA3Sa2x9XLmK7voTgwhNAXb7/HRdiXYnghMzJeoYXoBH9QcfwisZnuapPczZaqMqMRCCKF7XQ6MknRDcbwzcIWkJYDH88WqhuhODCGEblasC9mPNJF7hO2qbjuzwEUlFkIIobSqMPInhBDCQioqsRBCCKUVlVgIIYTSikoshBBCaUUlFkIIobT+H7VK9lh2D1a5AAAAAElFTkSuQmCC"/>
-          <p:cNvSpPr>
-            <a:spLocks noChangeAspect="1" noChangeArrowheads="1"/>
-          </p:cNvSpPr>
-          <p:nvPr/>
-        </p:nvSpPr>
-        <p:spPr bwMode="auto">
-          <a:xfrm>
-            <a:off x="155575" y="-144463"/>
-            <a:ext cx="304800" cy="304801"/>
-          </a:xfrm>
-          <a:prstGeom prst="rect">
-            <a:avLst/>
-          </a:prstGeom>
-          <a:noFill/>
-          <a:extLst>
-            <a:ext uri="{909E8E84-426E-40DD-AFC4-6F175D3DCCD1}">
-              <a14:hiddenFill xmlns:a14="http://schemas.microsoft.com/office/drawing/2010/main">
-                <a:solidFill>
-                  <a:srgbClr val="FFFFFF"/>
-                </a:solidFill>
-              </a14:hiddenFill>
-            </a:ext>
-          </a:extLst>
-        </p:spPr>
-        <p:txBody>
-          <a:bodyPr vert="horz" wrap="square" lIns="91440" tIns="45720" rIns="91440" bIns="45720" numCol="1" anchor="t" anchorCtr="0" compatLnSpc="1">
-            <a:prstTxWarp prst="textNoShape">
-              <a:avLst/>
-            </a:prstTxWarp>
-          </a:bodyPr>
-          <a:lstStyle/>
-          <a:p>
-            <a:endParaRPr lang="en-US"/>
+            <a:endParaRPr lang="en-US" dirty="0"/>
           </a:p>
         </p:txBody>
       </p:sp>
       <p:pic>
         <p:nvPicPr>
-          <p:cNvPr id="5" name="Picture 4"/>
+          <p:cNvPr id="4" name="Picture 3"/>
           <p:cNvPicPr>
             <a:picLocks noChangeAspect="1"/>
           </p:cNvPicPr>
@@ -4107,25 +4069,50 @@
         </p:blipFill>
         <p:spPr>
           <a:xfrm>
-            <a:off x="460375" y="1825625"/>
-            <a:ext cx="6467285" cy="4660060"/>
+            <a:off x="1119187" y="1762125"/>
+            <a:ext cx="9953625" cy="3333750"/>
           </a:xfrm>
           <a:prstGeom prst="rect">
             <a:avLst/>
           </a:prstGeom>
-          <a:ln>
-            <a:solidFill>
-              <a:schemeClr val="bg2">
-                <a:lumMod val="90000"/>
-              </a:schemeClr>
-            </a:solidFill>
-          </a:ln>
         </p:spPr>
       </p:pic>
+      <p:sp>
+        <p:nvSpPr>
+          <p:cNvPr id="5" name="TextBox 4"/>
+          <p:cNvSpPr txBox="1"/>
+          <p:nvPr/>
+        </p:nvSpPr>
+        <p:spPr>
+          <a:xfrm>
+            <a:off x="402336" y="6345936"/>
+            <a:ext cx="11603736" cy="369332"/>
+          </a:xfrm>
+          <a:prstGeom prst="rect">
+            <a:avLst/>
+          </a:prstGeom>
+          <a:noFill/>
+        </p:spPr>
+        <p:txBody>
+          <a:bodyPr wrap="square" rtlCol="0">
+            <a:spAutoFit/>
+          </a:bodyPr>
+          <a:lstStyle/>
+          <a:p>
+            <a:r>
+              <a:rPr lang="en-US" dirty="0">
+                <a:hlinkClick r:id="rId3"/>
+              </a:rPr>
+              <a:t>https://medium.com/analytics-vidhya/multiple-linear-regression-with-python-98f4a7f1c26c</a:t>
+            </a:r>
+            <a:endParaRPr lang="en-US" dirty="0"/>
+          </a:p>
+        </p:txBody>
+      </p:sp>
     </p:spTree>
     <p:extLst>
       <p:ext uri="{BB962C8B-B14F-4D97-AF65-F5344CB8AC3E}">
-        <p14:creationId xmlns:p14="http://schemas.microsoft.com/office/powerpoint/2010/main" val="3052993595"/>
+        <p14:creationId xmlns:p14="http://schemas.microsoft.com/office/powerpoint/2010/main" val="3655209790"/>
       </p:ext>
     </p:extLst>
   </p:cSld>
@@ -4167,6 +4154,144 @@
           <a:bodyPr/>
           <a:lstStyle/>
           <a:p>
+            <a:endParaRPr lang="en-US"/>
+          </a:p>
+        </p:txBody>
+      </p:sp>
+      <p:sp>
+        <p:nvSpPr>
+          <p:cNvPr id="3" name="Content Placeholder 2"/>
+          <p:cNvSpPr>
+            <a:spLocks noGrp="1"/>
+          </p:cNvSpPr>
+          <p:nvPr>
+            <p:ph idx="1"/>
+          </p:nvPr>
+        </p:nvSpPr>
+        <p:spPr/>
+        <p:txBody>
+          <a:bodyPr/>
+          <a:lstStyle/>
+          <a:p>
+            <a:endParaRPr lang="en-US"/>
+          </a:p>
+        </p:txBody>
+      </p:sp>
+      <p:sp>
+        <p:nvSpPr>
+          <p:cNvPr id="4" name="AutoShape 2" descr="data:image/png;base64,iVBORw0KGgoAAAANSUhEUgAAAbEAAAFQCAYAAAAxyECWAAAABHNCSVQICAgIfAhkiAAAAAlwSFlzAAALEgAACxIB0t1+/AAAADh0RVh0U29mdHdhcmUAbWF0cGxvdGxpYiB2ZXJzaW9uMy4yLjEsIGh0dHA6Ly9tYXRwbG90bGliLm9yZy+j8jraAAAgAElEQVR4nOzdd3wUVdfA8d9JCD1EagpIFVCUHpHeQgmEjgooCiqiiMKDCChIERXEAlgQH1QEBVHpoVdBQJDepUknjR54CJBs7vvHLsuGbJKNJFmW93z57IedmXNnzt1NcnLvTHbEGINSSinlibzcnYBSSin1b2kRU0op5bG0iCmllPJYWsSUUkp5LC1iSimlPJYWMaWUUh5Li5hSSqlMJyKTRSRGRPamsF1E5AsROSIiu0Wkmiv71SKmlFIqK0wBQlPZ3gIoa3v0BCa6slMtYkoppTKdMeYP4EIqIW2BH43VJuABEQlMa79axJRSSt0LigKnHJZP29alKlumpaMyRfy5o/fd54QVKtnU3SlkuOze9+e31sW4q+5OIVOM82/k7hQyxRunpsndtE/Pz5vshcu8gnUa8JZJxphJ6Tics1zTPP79+Z2mlFLq7iVaXA61Faz0FK07nQYedFguBkSk1UinE5VSSjlnEl1/3L1w4HnbVYo1gcvGmMi0GulITCmllHOJGVKcABCRGUBDoJCInAaGAz4AxphvgMVAS+AIcA14wZX9ahFTSinllLEkZNy+jOmSxnYD9E7vfrWIKaWUci5jpgkzlRYxpZRSzqXjwg530SKmlFLKOR2JKaWU8lgZeGFHZtEippRSyimjIzGllFIeKwOvTswsWsSUUko5pxd2KKWU8lg6naiUUspj6YUdSimlPJaOxJRSSnksHYkppZTyVCYx3t0ppElvxaKSeXfUWOqHdaZd11fdnYpTYz4Zxo5dq9mwaRGVKz/qNKZEiWKs+n0223eu4oepX+Dj45Nm+1df687GzUvYtGUJvV7rbl8/ZGg/NmxaxLo/FzB3/hQCAopkeJ8ah9Rj49albN6xnD79XnYaM2rMEDbvWM6aDeFUqlwhzbaPVXyYJSt/5fd181ixZjZVq1UEIFu2bHw18SPW/hnOhs2L6ftmz2THyizjxo7kwP71bN+2gqpVHnMaU7Lkg/y5fgF/71vPz9MnJnnvAIKrV+ZG3Ek6dAgDoFy5Mmzdstz+uHDuAH3e6JHpfblT8YaV6LrmE55b9xnVX2udbHupZtXosnwUnZd+yNOLRhL4eLkk28VL6LzkA1r90D+rUk5bYqLrDzfRIqaSadeyKd+M/cDdaTjVtFlDypQpSdXKjen7xhDGjh/pNO699wfy9YQfqFYlhEuXLvN8t6dSbf9IhXJ0696Jxg3aU6dmK0JbNKZ0mZIAfDH+W+rUDKNe7dYsXfo7g955I0P75OXlxUefDaPzkz2oUyOM9h1bUa58mSQxTZrWp3SZktSo2oz+fYfy8dgRabYdNnIAn340gUb12jHmw88ZPnIAAG3ahZI9R3Ya1G5DkwYdeL57Jx4snuZd4O9ai9DGlH2oFA9XqEuvXoOY8NVop3GjRw1h/Bff8sijdbl48TIvvnD7w8+9vLwYPWoIy5evsa87dOgfgh9vRvDjzajxRCjXrsUxb/6SzO5OEuIlNPygG+HPf8z0xgMp17Ym+csGJYk5vX4fM5oN5pfQIazq/y0hHycttJVfCuXCkTTvAZm1svZ+Yv+KFrF7jIh4uzuH4CoV8cvn6+40nApr1YQZM+YCsHXLTvz88uHvXzhZXP0GtZg31/qD7Ofpcwhr1TTV9uXLl2Hr5h3ExV3HYrGwfv1mWrduBsCVK1ft+82TOxfWO0ZknGrVK3H86AlOHD9NfHw88+YsokVYSJKY0LAQfp0xD4BtW3fZ8061rTH45ssDgG8+X6KiYmyrDblz58Lb25ucOXMSHx+fpI+ZpXXr5vw0fRYAf23ejt8Dfk5HtY0a1mH27EUA/PTTTNq2aW7f9nrvF5kzdxExZ887PUZI47ocPXqCkyfPZEIPUuZfpQyXjkcTe/IsifEWDoVvonSz6kli4q/dsD/3yZ0jyddRnoAClGxchf0z1mRVyq5JtLj+cBM9J3YXROR94Jwx5nPb8odANJADeNr2/1xjzHDb9nlYb7+dE/jcdjtvROQqMBZoDvQH1mdxVzxGYKA/Z07f/m01IiKKoKAAoqPP2tcVKJify5euYLFYv7EizkQRGBSQavv9+w8xdFh/8hd4gOtx12nWrAE7duy1xw0d3p/OXdoTG3uFVi2fzdg+Bflz5kzU7ZzORFM9uFKyfkc4xkREERDkn2rbIW+P4rc53zPi/UF4eXnRsllnABbMX0aLsBD2HlpPrlw5GTp4NJcuXs7QPjlTNCiA06duv/ZnTkdSNCjAXlwBChbMz6VLl+3v3ekzkQQVtb53QUEBtGsbSpNmTxMcXMXpMZ5+ui2//DovE3vhXJ6A/FyNuGBfvhp5gYCqZZLFlQ4Npvagp8lVKB8Lun1qX19/RFc2jJpB9jy5siRfl3nA1Yk6Ers73wPdAETEC+iMtYiVBWoAVYDqIlLfFv+iMaY6EAz0EZGCtvV5gL3GmCeMMckKmIj0FJGtIrL1ux9nZG6P7nEikmzdnSOj1GJS2nbo4D+MH/df5odPZfa8H9i79wAJCbc/cuf99z7j0YfrMvPX+fR85bm77YbL+aYVk1rbF17qwtDBo6nyaEOGDh7N+K8+BKwjP4slkYrl6xFcKYTXXn+REiWLZURXUnW3793Yz97jncGjSEzh/IuPjw+tWzVj1uyFGZBt+jjPO3nc0aVbmdZoIIt6jKPmW08CUDKkCtfOx3J2z/FMzvJfsCS4/nATLWJ3wRhzHDgvIlWBZsAO4HGH59uBh7EWNbAWrl3AJqwjslvrLcDsVI4zyRgTbIwJ7vF8qjdHvS/16NmVdX8uYN2fC4iKjKFosdvnGoKCAoiMjE4Sf/7cBfwe8MXb2zozG1Q0gChbTEREVIrtf/pxJvXrtqVl8y5cvHCJo/8cT5bLzN/CadM2NEP7F3EmiqK20YY1X/8ko5NbeQc5xgQFEB0Zk2rbTl3aszB8OQDz5y6hWjXrCK3jU61YvXIdCQkJnDt3gc2btlOlasUM7dMtvV7tZr/gIiIyimIP3n7tixYLJOKO9+7cuQs88ICf/b0rVjSQyAhrTPVqlZg+7WuOHNpExw5hfPXFKNo4TDWGhjZix449xMScy5S+pOZq5AXyBhWwL+cNLMD/oi+mGB/x10HylShCzvx5CQwuR+mm1ej25ziaT+hNsToVaPp5r6xIO216Ycf/C98B3YEXgMmAAKONMVVsj4eMMd+LSEOgCVDLGFMZa5HLadvHdWPMvf8hZW7y3aRp1Kvdmnq1W7Nw4XK6dGkPQPDjVYiNvZJkKvGWdX9sol37FgA882wHFi9aCcDiRStTbF+osHVgXKxYIK3bNmfWzAUA9gs8AFqENeHwoX8ytH87tu+hVJmSFC9RDB8fH9p1CGPp4tVJYpYtXk2nLu0AqB5c2Z53am2jomKoXbcGAPUa1OTo0eMAnD4dSb36TwCQO3cuqj9emcOHjmZon26Z+M1U+0UX4eHLeO5Z6+jjiRrViL0cm6xYA6xZ+ycdO1qvPHzuuacIX2AtxGXL1+KhcjV5qFxNZs9ZxOt9BhMevszernOndm6ZSgSI3nWUB0oGkO/Bwnj5eFOuTU2OrdieJMavpL/9eeHHSuKdPRvXL15l45jf+KFGH6bW7sey3hM4vWE/K/pOzOouOOcBRUzPid29ucBIwAd4BkgA3heR6caYqyJSFIgH/ICLxphrIvIwUNNtGadhwPCP2LJjN5cuxRLSriuvvfQcHVs3T7thFli+bA3Nmjdk5+7VXIu7Tu9XB9m3zZz9PW/0foeoqBiGD/2YyVM+592hb7J79z5+nDozzfY/TZ9AgQIPEB+fwFtvjuDSpVgA3hs5gIfKliYxMZFTJ8/Qr+/QDO2TxWLhnbdG8tuc7/Dy9mbGtNkcPHCEbi9az2FNnfwLK5avpUmzBmzeuYK4a3H06T041bYAb/YZyodjBuPtnY0bN27wZt9hAEz+djpffD2adZsWIiLMmD6H/fsOZmifnFm8ZBWhoY05+PcGrsXF0aPHm/ZtC+b/SM9XBxAZGc07gz/k52lfM3LEQHbu2sfkH9KeQs+VKydNQurT67VBacZmBmNJZO3QqbSZNhAvby/2/7qWC4fO8FjXxgDsnbaaMi0e5+GOdUlMsJBw/SZLX/vKLbmmhyf8bi0ZfaXV/0ci8g1wyRjztm25L3Dr+tmrQFfgNDAPKAocBAoDI4wxa0TkqjEmryvHij939L57wwqVbOruFDJcdu/78/fDi3GZfxWjO4zzb+TuFDLFG6emJT9Zlw5xaya7/PMmV8MX7+pY/9b9+Z2WhWwXdNQEnrq1zna14udOwls424erBUwppbKUB1ydqEXsLohIBWAh1svoD7s7H6WUylB6U8z7mzFmP1Da3XkopVSm0A8AVkop5bF0OlEppZTH0pGYUkopj6VFTCmllMfS6USllFIeS69OVEop5bF0OlEppZTH0ulEpZRSHktHYkoppTyWBxQxvRWLUkop5ywW1x8uEJFQETkoIkdE5G0n2/1EZIGI7BKRfSLyQlr71JGYUkop5zJwJCYi3sAEoCnWu3psEZFw28f33dIb2G+MaS0ihYGDttta3UxpvzoSU0op5ZxJdP2RthrAEWPMUVtR+gVoe+cRAV8RESAvcAHrPRpTpEVMKaWUc+m4s7OI9BSRrQ6PnnfsrShwymH5tG2do6+AR4AIYA/Q15jUK6ROJyqllHIuHTdNNsZMAialEuLsppl3HqA5sBNoDJQBVojIOmNMbEo71SLmYe7HuyCfO77C3SlkuCsvp3k+2iNN3F7M3SlkiglxB92dQqZ44253kLFXJ54GHnRYLoZ1xOXoBeAjY4wBjojIMeBhYHNKO9XpRKWUUs5ZElx/pG0LUFZESolIdqAzEH5HzEkgBEBE/IHywNHUdqojMaWUUk6ZRNenE9PclzEJIvI6sAzwBiYbY/aJyKu27d8A7wNTRGQP1unHQcaYc6ntV4uYUkop5zL4j52NMYuBxXes+8bheQTQLD371CKmlFLKOf3sRKWUUh4rA6cTM4sWMaWUUs4l6P3ElFJKeap0/J2Yu2gRU0op5ZwHfIq9FjGllFLO6TkxpZRSHkuvTlRKKeWxdCSmlFLKU5kE12526U5axJRSSjmn04lKKaU8lk4nKqWU8lh6ib1SSimP5QEjMb2f2H1uzCfD2LFrNRs2LaJy5UedxpQoUYxVv89m+85V/DD1C3x8fNJs/+pr3dm4eQmbtiyh12vd7euHDO3Hhk2LWPfnAubOn0JAQJFM61t6vDtqLPXDOtOu66vuTiVdfKrWwO+rn/D7ejo5OzzjNCbbo1XIN/Y78n0+Bd8PPgfAq2BhfEeOx+/LH8n3+RRytOqYlWmnS+kGlXh19Sf0WvsZtXq1Tra9XNPq9Fg6mh6LR/HigvcpFlzODVk6V7dRLZb8OYtlf83h5Te6OY0Z8mF/lv01h/lrfqZCxfL29b758vL59x+xeMNMFq3/jSrBFQFo3jqEBX/8yv6ov3is8iNZ0o8UmUTXH26iRew+1rRZQ8qUKUnVyo3p+8YQxo4f6TTuvfcH8vWEH6hWJYRLly7zfLenUm3/SIVydOveicYN2lOnZitCWzSmdJmSAHwx/lvq1AyjXu3WLF36O4Peuet7y2aIdi2b8s3YD9ydRvp4eZG753+48v5ALvfpRva6IXgVK5EkRHLnJc8r/bg6ajCxfbtz9ZPhAJhEC9emTODyG88TO6gXOVu0T9b2XiBeQuj73fml28f8t8lAHm1Ti0JliyaJObZhL9+FvsN3LQezcMAkwsa87J5k7+Dl5cWwMQN5uUtfWtV9mrAOzShTrlSSmPohtSlRujjNn+jAsP6jGP7x2/ZtQz7sz7rVG2lZ5ynaNXqGfw4dA+DwgX/o88JAtm7ckaX9ccYkWFx+uMt9W8REpI2IvJ1GzJ8prJ8iIk9mTmZZJ6xVE2bMmAvA1i078fPLh79/4WRx9RvUYt7cJQD8PH0OYa2aptq+fPkybN28g7i461gsFtav30zr1tZbAF25ctW+3zy5c2Hukc9eC65SEb98vu5OI12ylX2ExMgzJEZHQkICN9evJnuNuklistdvws1Nf5B4LgYAc/mS9f+LF7AcPWwNuh6H5fQJvAomf+/dLahKGS4cj+bSqbMkxlvYv2AT5ZpWTxITf+2G/blP7hzAvfE1Vanao5w8dorTJ84QH5/A4rkrCAltkCQmpEUD5v+2CIBd2/aSz8+XwkUKkidvHoJrVmXW9PkAxMcncCXW+r1z9PBxjv1zIms7k5JE4/rDTe7bc2LGmHCS3/r6zpjaWZSOWwQG+nPmdIR9OSIiiqCgAKKjz9rXFSiYn8uXrmCxWH+TijgTRWBQQKrt9+8/xNBh/clf4AGux12nWbMG7Nix1x43dHh/OndpT2zsFVq1fDazu3nfkgKFsNiKE0Di+bNkK5d0esk7qBhky4bv++ORXLm5vnA2N9csSxLjVTgA71JlSTi0P0vyTg/fgAJciTxvX46NvEDRqmWSxZVvHkzDgZ3IUygfv77wSVammCL/gMJEnom2L0dFRlO52mPJYyIcYiJi8A8sQoLFwoXzlxj9xXDKP1qWfbv+ZtS7nxF37XqW5e8SPSeWsUQkj4gsEpFdIrJXRDqJyHERKWTbHiwia2zPu4vIV7bn/iIy19Zul4jUtq2/avtfROQrEdkvIouAIg7HrC4ia0Vkm4gsE5FA2/o+tvjdIvJLKjmPEJHJIrJGRI6KSB+HbW/a+rFXRP6TCa9XsnV3joxSi0lp26GD/zB+3H+ZHz6V2fN+YO/eAyQ43LLh/fc+49GH6zLz1/n0fOW5u+3G/19OXv9kgxBvb7KVLseVD97mynsDyPXU83gFFbu9PWcu8g4aybXJX0LctUxNN6M4G70fXLaV/4YMYObL42jQ/yk3ZOWEC99fKcVk8/amQqXyzJgyiw4hXYm7dp2X3+ieSYneBT0nluFCgQhjTGVjzGPAUhfbfQGsNcZUBqoB++7Y3h4oD1QEXgZuFTkf4EvgSWNMdWAy8KGtzdtAVWNMJSCtqwUeBpoDNYDhIuIjItWBF4AngJrAyyJS1VljEekpIltFZOvN+NhUD9SjZ1fW/bmAdX8uICoyhqLFguzbgoICiIyMThJ//twF/B7wxdvb2xpTNIAoW0xERFSK7X/6cSb167alZfMuXLxwiaP/HE+Wy8zfwmnTNjTVfFXKzPmzeBe6fWGMV8HCJF44lyQm8fxZ4ndshhvXMVcuk7B/F94lH7Ju9PbGd+BIbv6xkvhN67IydZddibqAb2BB+3K+wAJcjb6UYvypzQfIX6IIufLnzYr0UhUdGUNgUX/7ckCgPzFR55LHBDnEBBUhJuosUZExREfEsHu79UfRsgWrqFCpPPccD5hO9LQitgdoIiJjRKSeMeayi+0aAxMBjDEWJ+3qAzNs2yKA1bb15YHHgBUishN4F7j1a+5uYLqIdAXSunPcImPMDWPMOSAG8AfqAnONMf8zxlwF5gD1nDU2xkwyxgQbY4Kz++RL9UDfTZpGvdqtqVe7NQsXLqdLl/YABD9ehdjYK0mmEm9Z98cm2rVvAcAzz3Zg8aKVACxetDLF9oUKW3/wFCsWSOu2zZk1cwGA/QIPgBZhTTh86J80XhqVkoTDB/AKLIZXkQDIlo3sdRsTv2VDkpibmzeQrUIl8PKG7DnwLvcIiaet51Py9B6E5fQJrof/5o70XRKx6ygFSgXg92BhvHy8qdC6JodWbEsSk7+EQxF4rCTePtmIu3j1zl1luT079lOidHGKFg/CxycbLds3ZfWyP5LErF76B22fDgOgcvXHuBJ7lbMx5zkXc57IiGhKlbFebFOr/uP2CzvuJSYh0eWHu3jUOTFjzCHbCKYlMFpElmMtILeKcc672b2TdQLsM8bUcrItDGvxawMMFZFHjTEpFbMbDs8tWF93J3NFGWv5sjU0a96QnbtXcy3uOr1fHWTfNnP297zR+x2iomIYPvRjJk/5nHeHvsnu3fv4cerMNNv/NH0CBQo8QHx8Am+9OYJLl6wjxPdGDuChsqVJTEzk1Mkz9Os7NLO76ZIBwz9iy47dXLoUS0i7rrz20nN0bN3c3WmlLtHCtW/H4zv8U/Dy4saqxVhOHSdH8zYA3FgWTuLpE8Tv2Izf+MkYk8iNFYuwnDxGtkcqkqNRcxKO/0O+sd8BEDftW+K3/+XOHiVjLIksGzaFLj8Owsvbi12/reXc4TNUezYEgO3TV/Fwi8ep2LEeifEW4m/cZE7vL92ctZXFYuH9tz/m+1+/wMvbm9k/h3Pk4FE6desAwK9T57B25QbqN6nD8s1zuX7tOoP73r5C+IPBn/LJxJH4ZPfh1IkzDO5j3dakZUPeHfUWBQrm55ufx3Fg7yF6dOrjNIdM5wF/7Cz3ytVjrhCRIOCCMea6iLQDugN5gc+MMUtEZBzWKb6GItIdCDbGvG47Z7XJGDNeRLyBPMaYWBG5aozJKyIdgFewFsciwH6s04rhtufPGWM22qYXywF/A8WNMcdt604D5Y0xyeZBRGQEcNUY86lteS/QCigATME6lSjAX7bjpHpdrV/eMp7zhrno3PEV7k4hw115+QV3p5ApJm4vlnaQB/op7pC7U8gUB2K23NUvy1dea+Hyzxvfr5dk+i/mznjUSAzrOatPRCQRiAd6AbmA70VkMNZC4ExfYJKIvIR1JNQL2OiwfS7WKcc9wCFgLYAx5qbtUvsvRMQP6+s13hYzzbZOgHHOClhqjDHbRWQKsNm26ru0CphSSmUpD7g60aOKmDFmGbDMyaZkf8JvjJmCdaSDMSYaaOskJq/tfwO8nsIxd2KdNrxTXSfrnLUfccfyYw7PxwJjXdmPUkplNU+YqfOoIqaUUioL6Ujs/w8ReQHrtKWjDcaY3u7IRyml7pY7rzp0lRaxDGKM+QH4wd15KKVUhtGRmFJKKY917w/EtIgppZRyzuhITCmllMfSIqaUUspj6XSiUkopT2US7v2RmKd9ALBSSqksYhKNyw9XiEioiBwUkSMp3bRYRBqKyE4R2Scia9Pap47ElFJKOZeB04m2z62dADTF+nmzW0Qk3Biz3yHmAeBrINQYc1JEijjf2206ElNKKeVUBt8TswZwxBhz1BhzE/iF5B8H+AwwxxhzEsAYE0MatIgppZRyLjEdj7QVBU45LJ+2rXNUDsgvImtEZJuIPJ/WTnU6USmllFMp3iHRCRHpCfR0WDXJGDPJMcTZIe5YzgZUB0Kw3qFko4hsMsakeK8cLWJKKaWccnGa0BprLViTUgk5DTzosFwMiHASc84Y8z/gfyLyB1AZ6+2vnNLpRKWUUk5l8DmxLUBZESklItmBzlhvPOxoPlBPRLKJSG7gCaw3IU6RjsQ8THbv++8tux/vguz77f35WdDjy7RwdwqZIihXQXencE9Kz0gszX0ZkyAir2O9J6Q3MNkYs09EXrVt/8YY87eILAV2Yz3T9p0xZm9q+73/fiIqpZTKGMbZaay72J0xi4HFd6z75o7lT4BPXN2nFjGllFJOZeRILLNoEVNKKeVUYkLGjsQygxYxpZRSTpkMnk7MDFrElFJKOaXTiUoppTyWSdSRmFJKKQ9l7v07sWgRU0op5ZyOxJRSSnmsRIsWMaWUUh5KR2JKKaU8ll5ir5RSymPpJfZKKaU8VqKOxJRSSnmqRMu9f7cuLWJKKaWc0r8TU0op5bH06kSllFIeyxPOid37E57qX2scUo+NW5eyecdy+vR72WnMqDFD2LxjOWs2hFOpcoU02z5W8WGWrPyV39fNY8Wa2VStVhGAbNmy8dXEj1j7ZzgbNi+m75s9M7dzTvhUrYHfVz/h9/V0cnZ4xmlMtkerkG/sd+T7fAq+H3wOgFfBwviOHI/flz+S7/Mp5GjVMSvTvivvjhpL/bDOtOv6qrtTSSYrv/6qVqvI7+vmWR/r59OyVZPM7ZxN7UZPMH/9DBZs/I0XX3/OacygD/qxYONvzFz9Iw9XLGdf37VnJ+asncbsNdP4aOJ7ZM+RHYB+w3ozb90MZq7+kXGTR+ObL2+W9MUZY8Tlh7toEXOBiJQUkVRvkW2LecZhOVhEvsj87Jzz8vLio8+G0fnJHtSpEUb7jq0oV75MkpgmTetTukxJalRtRv++Q/l47Ig02w4bOYBPP5pAo3rtGPPh5wwfOQCANu1CyZ4jOw1qt6FJgw48370TDxYvmpUdJnfP/3Dl/YFc7tON7HVD8CpWIkmI5M5Lnlf6cXXUYGL7dufqJ8MBMIkWrk2ZwOU3nid2UC9ytmifrO29ql3Lpnwz9gN3p5FMVn/9Hfj7ME0adqRRvXZ07tiDT8ePxNvbO9P7OHj0W7z2TH/a13+G0PZNKF2uZJKYuiG1KF66GK1rPc3It8bw7hhrvkUCCvFMj6fo0vxFOjbsipe3F6HtrIV309otdGzYlacaP8+Jo6d4qc/zmdqP1Bjj+sNdtIhlnJKAvYgZY7YaY/q4K5lq1Stx/OgJThw/TXx8PPPmLKJFWEiSmNCwEH6dMQ+AbVt34eeXD3//wqm3NQbffHkA8M3nS1RUjG21IXfuXHh7e5MzZ07i4+O5cuVqlvU3W9lHSIw8Q2J0JCQkcHP9arLXqJskJnv9Jtzc9AeJ52w5X75k/f/iBSxHD1uDrsdhOX0Cr4KFsyz3uxFcpSJ++XzdnUYyWf31Fxd3HYvFAkCOnDkwWfBT9bGqFTh17DRnTkaQEJ/A0nkradi8XpKYRs3rseC3pQDs2b4P33x5KVSkIADe3t7kyJkDb29vcuXKydmocwBsXLvZ3pfd2/ZSJNB9X4uWRC+XH+5yXxQx2yjogIhMFZHdIjJLRHKLSIiI7BCRPSIyWURy2OKPi8gYEdlsezxkWz9FRJ502G+yn8K2Y60Tke22R23bpo+AeiKyU0T6iUhDEVloa1NARObZctskIpVs60fY8lojIkdFJMOKXmCQP2fORNmXI85EEzZN38wAACAASURBVBjonzQm0J8Ix5iIKAKC/FNtO+TtUQwfOZCd+9bw3geD+OC9sQAsmL+Ma9fi2HtoPTv2/c6ELydz6eLljOpOmqRAISy24gSQeP4sXgULJYnxDiqG5PXF9/3x5Pt0EtkbNk+2H6/CAXiXKkvCof2ZnvP9LKu//sBaONdtWsgff4YzoN9weyHILEUCCxMVEW1fjok8i/8dBadIYGGiHWKiI89SJLAwMVHnmDpxBsu2zWXl7nCuxF5l49rNyY7RrksrNqzelHmdSIOOxLJWeWCSMaYSEAu8CUwBOhljKmK9iKWXQ3ysMaYG8BUwPh3HiQGaGmOqAZ2AW1OGbwPrjDFVjDHj7mjzHrDDlttg4EeHbQ8DzYEawHAR8bnzgCLSU0S2isjW6zcvuZSkSPI56jt/O00pJrW2L7zUhaGDR1Pl0YYMHTya8V99CFh/gFgsiVQsX4/gSiG89vqLlChZzKVcM4STnLnzG8vbm2yly3Hlg7e58t4Acj31PF5BDjnmzEXeQSO5NvlLiLuWqene77L66w9g+7bd1KvZiqaNnqTvm6+Qw3aOKbM4/ZK786d5Cn3x9fOlUWg9WtZ4kqaV25Ardy7COib9papH325YEiwsmr0sI9NOl0QjLj/c5X4qYqeMMRtsz6cBIcAxY8wh27qpQH2H+BkO/9dKx3F8gG9FZA8wE6iQRjxAXeAnAGPMaqCgiPjZti0yxtwwxpzDWiD972xsjJlkjAk2xgTnzP6AS0lGnImiaNEA+3JQUX/71Is9JiKKIMeYoACiI2NSbdupS3sWhi8HYP7cJVSrVgmAjk+1YvXKdSQkJHDu3AU2b9pOlaoVXco1I5jzZ/EuVMS+7FWwMIkXziWJSTx/lvgdm+HGdcyVyyTs34V3yYesG7298R04kpt/rCR+07osy/t+ldVff44OHzrKtf/F8XCFcsm2ZaToiLMEBN3+dr01wnIUExGDv0OMf2Bhzkado2b9YM6cjODi+UskJFhYtXgNlR+//f3S+ukW1G9ah3d6j8jUPqRFL+zIWukd0BonzxOwvSZi/XXQ2a9y/YBooDIQnELMnZy9w7eOecNhnYUM+rOHHdv3UKpMSYqXKIaPjw/tOoSxdPHqJDHLFq+mU5d2AFQPrkxs7BWio8+m2jYqKobadWsAUK9BTY4ePQ7A6dOR1Kv/BAC5c+ei+uOVOXzoaEZ0xSUJhw/gFVgMryIBkC0b2es2Jn7LhiQxNzdvIFuFSuDlDdlz4F3uERJPnwAgT+9BWE6f4Hr4b1mW8/0sq7/+ipcoZr+Qo9iDQTxUthSnTpzJ1D7u2/k3xUsXo2jxQLL5ZCO0XRPWLl+fJGbN8vW0fjoUgIrVHuXqlf9xLuY8UaejqVT9UXLmygHAE/WCOXbY2pfajZ7ghde70rfbQK7H3cCdPGEkdj/9nVhxEalljNkIdAFWAq+IyEPGmCPAc8Bah/hOWM9jdQI22tYdB6oDvwFtsY667uQHnDbGJIpIN+DWJVBXgJTOsP8BPAu8LyINgXPGmFhn0yYZxWKx8M5bI/ltznd4eXszY9psDh44QrcXOwMwdfIvrFi+libNGrB55wrirsXRp/fgVNsCvNlnKB+OGYy3dzZu3LjBm32HATD52+l88fVo1m1aiIgwY/oc9u87mGn9SybRwrVvx+M7/FPw8uLGqsVYTh0nR/M2ANxYFk7i6RPE79iM3/jJGJPIjRWLsJw8RrZHKpKjUXMSjv9DvrHfARA37Vvit/+Vdfn/SwOGf8SWHbu5dCmWkHZdee2l5+jYOvm5vqyW1V9/T9SsTp9+L5MQn0CiSWRg/xFcuHAx0/s4evBYJs4Yh5e3N/NmLOSfg8d46nlrYZ754zzWrfyTuiG1WLhpJtfjrjPsP9bpzz079rNi4e/8snwKFouFA3sOMeun+QC8M6o/2bP78M2v1rMce7bt44NBn2RqX1LiAR/YgWTFVTyZTURKAouxFovawGGsRasW8CnWYr0F6GWMuSEix4EfgJZYR15djDFHRMQfmG9btwp4wxiT17b/hcaYx0SkLDAbuAb87hDjAywFCmE9F7cDeMsY00pECtiOV8rWrqcxZreIjACuGmM+tfVjL9DKGHM8pb4W9ivv+W/YHQ42Dkg7yMP4fvuDu1PIFEFlWrg7hUwRlKugu1PIFLui/ryr35Q3BDzp8s+bOlGz3DIcu5+K2EJjzGMuxh8Hgm3noTyKFjHPoEXMs2gRc25dOopYPTcVsftpOlEppVQGMk5P599b7osiZpt+c2kUZosvmWnJKKXUfSLRA+Z97osippRSKuMl6khMKaWUp7JoEVNKKeWp9JyYUkopj5Xo7gRcoEVMKaWUU55QxO6nj51SSimVgQzi8sMVIhIqIgdF5IiIvJ1K3OMiYnG8q0hKdCSmlFLKqcQMPCUmIt7ABKApcBrYIiLhxpj9TuLGAC59fL+OxJRSSjllQVx+uKAGcMQYc9QYcxP4Betn1N7pDawf7RfjZFsyWsSUUko5lZiOh+N9D22PnnfsrihwymH5tG2dnYgUBdoD37iao04nKqWUcioxHXfaMMZMAialEpLaLaluGQ8MMsZYXL3LhxYxpZRSTmXwp06dBh50WC4GRNwREwz8YitghYCWIpJgjJmX0k61iCmllHIqgy+x3wKUFZFSwBmgM/CMY4AxptSt5yIyBevdSVIsYKBFTCmlVAoSMvDGvcaYBBF5HetVh97AZGPMPhF51bbd5fNgjrSIKaWUciqjP8TeGLMY6w2MHdc5LV7GmO6u7FOLmIe5GHfV3SlkuInbi7k7hQw3/j69eWTEP0vcnUKm8C/V3N0p3JMy8u/EMosWMaWUUk55wsdOaRFTSinllAfcE1OLmFJKKed0OlEppZTHSnB3Ai7QIqaUUsopoyMxpZRSnkov7FBKKeWxtIgppZTyWHp1olJKKY+lVycqpZTyWHp1olJKKY+l04lKKaU8lk4nKqWU8lh6daJSSimPpdOJSimlPFaCB5QxLWJKKaWcuvdLGHi5OwGVdcaNHcmB/evZvm0FVas85jSmZMkH+XP9Av7et56fp0/Ex8cnyfbg6pW5EXeSDh3CAChXrgxbtyy3Py6cO0CfN3pkel/SUrpBJV5d/Qm91n5GrV6tk20v17Q6PZaOpsfiUby44H2KBZdzQ5a3NQ6px8atS9m8Yzl9+r3sNGbUmCFs3rGcNRvCqVS5QpptH6v4MEtW/srv6+axYs1sqlarCEDVahX5fd0862P9fFq2apK5nUund0eNpX5YZ9p1fdXdqSQx+uOhbN25knUbFyR5/R0VL1GMFatnsWXHCr6fMj7J909K7UOa1OOv7cvYunMlfd/saV//3geD2LRtKes2LuDHnyeQz88XgIaN6rD6j7ms37SQ1X/MpV79mpnUY+s5MVcf7pJpRUxE2ojI22nE/JnC+iki8uS/PK6PiGyzPZ8sIjEisveOmAIiskJEDtv+z++w7R0ROSIiB0WkucN6j76lcovQxpR9qBQPV6hLr16DmPDVaKdxo0cNYfwX3/LIo3W5ePEyL77Qxb7Ny8uL0aOGsHz5Gvu6Q4f+IfjxZgQ/3owaT4Ry7Voc8+a79+6/4iWEvt+dX7p9zH+bDOTRNrUoVLZokphjG/byXeg7fNdyMAsHTCJsjPPCkRW8vLz46LNhdH6yB3VqhNG+YyvKlS+TJKZJ0/qULlOSGlWb0b/vUD4eOyLNtsNGDuDTjybQqF47xnz4OcNHDgDgwN+HadKwI43qtaNzxx58On4k3t7eWdrn1LRr2ZRvxn7g7jSSaNKsAWXKlCC4ShP69RnKZ+NGOo0bMXIAEyf8wONVm3LpUixdn38q1fZeXl58/NkInu7Qg1qPt6Djk60oX/4hANas3kCdGmHUq9Waf44cp19/a1E/f/4izzz9CnVrtqL3KwOZ+O0nmdbvRHH94S6ZVsSMMeHGmI/SiKmdCYeuC9wqjlOAUCcxbwOrjDFlgVW2ZUSkAtAZeNTW7msRuXe+u+9C69bN+Wn6LAD+2rwdvwf8CAgokiyuUcM6zJ69CICffppJ2za3b9v+eu8XmTN3ETFnzzs9Rkjjuhw9eoKTJ89kQg9cF1SlDBeOR3Pp1FkS4y3sX7CJck2rJ4mJv3bD/twndw7cOXFSrXoljh89wYnjp4mPj2fenEW0CAtJEhMaFsKvM+YBsG3rLvz88uHvXzj1tsbgmy8PAL75fImKigEgLu46FosFgBw5c2DMvTVpFFylIn75fN2dRhItw5rwi+3137plJ/ke8MXfv3CyuHoNajJ/3lIAfvl5DmG2UW5K7asHV+LY0ROcOH6K+Ph45sxeRItW1vfv99Xr7e/T1i07CQoKAGDP7v329/Lvvw+TM2cOsmfPnin9TsS4/HAXl4uYiOQRkUUisktE9opIJ9v64yJSyPY8WETW2J53F5GvbM/9RWSure0uEaltW3/V9r+IyFcisl9EFgFFHI5bXUTWisg2EVkmIoG29X1s8btF5BeHVEOBJQDGmD+AC0660xaYans+FWjnsP4XY8wNY8wx4AhQ447XoZCIbBSRsDvWlxSRAyIy1ZbTLBHJbdsWIiI7RGSPbXSYw+G1GyMim22Ph1x8O9KtaFAAp09F2JfPnI6kqO2b4paCBfNz6dJl+zfO6TORBBW1xgQFBdCubSj/nfRTisd4+um2/PLrvEzIPn18AwpwJfJ2oY2NvIBvQP5kceWbB/PKqk/o9MMAFg6YlJUpJhEY5M+ZM1H25Ygz0QQG+ieNCfQnwjEmIoqAIP9U2w55exTDRw5k5741vPfBID54b6w9rlr1SqzbtJA//gxnQL/h9vdcOWd9nSPtyxFnoggMSvoeFSiYn8uXrthfS8eYlNoHBgYkX3/Hew/w7HNPsnLF2mTr27QNZfeu/dy8efPuOpgCk46Hu6RnJBYKRBhjKhtjHgOWpqPtF8BaY0xloBqw747t7YHyQEXgZeBWkfMBvgSeNMZUByYDH9ravA1UNcZUAhwnzxsBa9LIx98YEwlg+/9W0SwKnHKIO21bhy0ff2ARMMwYs8jJfssDk2w5xQKviUhOrCPCTsaYilgvpunl0CbWGFMD+AoYn0be/5pI8vH+nb+BpxYz9rP3eGfwKBITnc9++/j40LpVM2bNXpgB2WY8Z6ONg8u28t+QAcx8eRwN+j/lhqys7ua9Sa3tCy91Yejg0VR5tCFDB49m/Fcf2mO2b9tNvZqtaNroSfq++Qo5cmTOb/L3i7v9/kn5/Ut+rDv3++ZbvUhISGDmr+FJ1j/88EMMHzmAN/sOSzP/fysB4/LDXdJTxPYATWwjh3rGmMvpaNsYmAhgjLE4aVsfmGHbFgGstq0vDzwGrBCRncC7QDHbtt3AdBHpiu0jvkQkCLhgjLmWjtwcOZvZvfXu+GCdehxojFmRQvtTxpgNtufTsE5tlgeOGWMO2dZPxdrfW2Y4/F/LaVIiPUVkq4hsTUz8n2s9AXq92s1+wUVEZBTFHgyybytaLJCIyOgk8efOXeCBB/zs50eKFQ0kMsIaU71aJaZP+5ojhzbRsUMYX30xijYOU42hoY3YsWMPMTHnXM4vs1yJuoBvYEH7cr7AAlyNvpRi/KnNB8hfogi58ufNivSSiTgTRdGit0fFQUX97dNF9piIKPuoGKwj4+jImFTbdurSnoXhywGYP3cJ1apVSnbsw4eOcu1/cTxcwb0XttyLXnr5WdZuCGfthnCiIqMpWjTQvi2oaABRkUnfo/PnLuD3gK/9+8cxxvo+JW8fEeFkvcN73/mZ9jRv0YhXXuqf5FhBQQH8OONrXntlAMePncy4Tt/hvhqJ2X4IV8dazEaLyK3yn+Cwn5x3kYuz10GAfcaYKrZHRWNMM9u2MGCCLadtIpINaAEsc+FY0Q7TkoHAra+a08CDDnHFgFtzcAnANqA5KbuzDwbnhTGlNk6/Fowxk4wxwcaYYC+vPGns7raJ30y1X3QRHr6M5561XivzRI1qxF6OTfaDEmDN2j/p2NE6U/rcc08RvsD6Q7Bs+Vo8VK4mD5Wryew5i3i9z2DCw2+/1J07tbsnphIBInYdpUCpAPweLIyXjzcVWtfk0IptSWLyl7g9ZRPwWEm8fbIRd9E91+7s2L6HUmVKUrxEMXx8fGjXIYyli1cniVm2eDWdulhnvasHVyY29grR0WdTbRsVFUPtutbZ8HoNanL06HHAegWd/ReVB4N4qGwpTp1w73nMe9H3306nQZ02NKjThkULV9LZ9voHP16F2MvW1/9O6//4i7btrKfhOz/TgcWLVgKwZPEqp+23b9tDaYf3r0PHMJYuWgVYr1rs268nz3R6lbi46/Zj5PPz5ZdZk3h/+Gf8tWl7pr4GnnB1ost/J+YwyplmO5fV3bbpONZCsgTomELzVVin0MbbLpTIY4yJddj+B/CKiPyIdWqvEfAzcBAoLCK1jDEbbdOL5YC/gQeNMb+LyHrgGSAv1inPoS50JxzoBnxk+3++w/qfRWQsEASUBTbbthngRWCmiLydwkUrxW/lCnQB1gMHgJIi8pAx5gjwHOA4ud3JlkcnYKMLuf8ri5esIjS0MQf/3sC1uDh69HjTvm3B/B/p+eoAIiOjeWfwh/w87WtGjhjIzl37mPzDjFT2apUrV06ahNSn12uDMiv9dDGWRJYNm0KXHwfh5e3Frt/Wcu7wGao9az1hvn36Kh5u8TgVO9YjMd5C/I2bzOn9pdvytVgsvPPWSH6b8x1e3t7MmDabgweO0O3FzgBMnfwLK5avpUmzBmzeuYK4a3H06T041bYAb/YZyodjBuPtnY0bN27Yp52eqFmdPv1eJiE+gUSTyMD+I7hw4aJ7Ou/EgOEfsWXHbi5diiWkXVdee+k5OrZO7XfHzLdi2RqaNmvAtl2riIuL4/Vety+8/nXWt/R9fQhRUTGMGPYJ3/0wjsFD+7Fn936m/Tgr1fYWi4WBb73HrHmT8fbyZvpPszhge//GfDqcHDmyM2f+FMB6cUf//wzj5Z7PUap0Cd4a1Ju3BvUGoGPb7pw75+z0/91x5wUbrhJXr0yyXW7+CdaiGw/0MsZsFZF6wPdANPAXEGyMaSgi3W3PX7edS5oElAYstrYbReSqMSavWCeMv8Q67Xhr2m2aMWaWiFTBek7ND2vRHY/1HNPvtnWCderuE2CbMaaKQ84zgIZAIVt+w40x34tIQeA3oDhwEnjKGHPB1mYI1mKVAPzHGLPEtv5WrtmBBcB8Y8zXDscqCSzGWpBrA4eB54wx10QkBPjUlv8WW/9viMhx4AegJdbRbBdboUtRtuxF7/2vqnR6L7Chu1PIcOMvbXV3Cpki4h/3/vlEZvEv5d4imVkuXDl8Vxe/9yvZ2eWfN+OO/+KWC+1dLmL3OhGpC3Q1xrjlLyRtRWyh7aIXV9scx1roXT6RpEXMM2gR8yxaxJzrm44i9rmbith987FTxpj1WKfvlFJKZQCLB0wn3jdFzN2MMcexXkmZnjYlMyUZpZTKAJ5wTkyLmFJKKafu/RKmRUwppVQKdCSmlFLKY3nCnZ31VixKKaWcsmBcfrhCREJtdwg5Ik7uciIiz9o+e3a3iPwpIpXT2qeOxJRSSjllMnA60fZBFxOAplg/HWmLiIQbY/Y7hB0DGhhjLopIC6x/X/xEavvVIqaUUsqpDJ5OrAEcMcYcBbDdfaQtYC9ixhjHe0xu4vZn5aZIi5hSSimnEjP2wzCc3SUktVHWS9huq5UaLWJKKaWcSk8JE5GeQE+HVZOMMY436kvtLiF37qsR1iJWN63jahFTSinlVHousbcVrNTuLpvaXULsRKQS8B3Qwhjj/DbyDrSIKaWUciqDP3ZqC1BWREoBZ4DOWO9AYicixYE5WD88/VDyXSSnRUwppZRTGfnHzsaYBBF5Hes9H72BycaYfSLyqm37N8AwoCDwte1u2AnGmODU9qtFTCmllFMZeYk9gDFmMdZbVjmu+8bheQ+gR3r2qUVMKaWUU57wiR1axJRSSjnlCfeb1CLmYcb5N3J3ChluQtxBd6eQ4YJyFXR3Cpnifr15ZPSxZe5O4Z6kHwCslFLKY+lNMZVSSnksHYkppZTyWHpOTCmllMfSqxOVUkp5rIz+O7HMoEVMKaWUUxZz74/FtIgppZRySi/sUEop5bF0OlEppZTHyuCbYmYKLWJKKaWcuvdLmBYxpZRSKdBzYkoppTyWXp2olFLKY+lITCmllMfSqxOVUkp5LP3sRKWUUh5LpxOVUkp5LE+4sMPL3QmorFe8YSW6rvmE59Z9RvXXWifbXqpZNbosH0XnpR/y9KKRBD5eLsl28RI6L/mAVj/0z6qUnarbqBZL/pzFsr/m8PIb3ZzGDPmwP8v+msP8NT9ToWJ5+3rffHn5/PuPWLxhJovW/0aV4IoANG8dwoI/fmV/1F88VvmRLOnHnWo3eoL562ewYONvvPj6c05jBn3QjwUbf2Pm6h95uOLt96drz07MWTuN2Wum8dHE98ieIzsA/Yb1Zt66Gcxc/SPjJo/GN1/eTMt/9MdD2bpzJes2LqBS5QpOY4qXKMaK1bPYsmMF308Zj4+PT5rtQ5rU46/ty9i6cyV93+xpX//eB4PYtG0p6zYu4MefJ5DPzxeAho3qsPqPuazftJDVf8ylXv2amdRj17w7aiz1wzrTruurbs0jPUw6/rmLFrH/Z8RLaPhBN8Kf/5jpjQdSrm1N8pcNShJzev0+ZjQbzC+hQ1jV/1tCPu6RZHvll0K5cCQiK9NOxsvLi2FjBvJyl760qvs0YR2aUaZcqSQx9UNqU6J0cZo/0YFh/Ucx/OO37duGfNifdas30rLOU7Rr9Az/HDoGwOED/9DnhYFs3bgjS/tzi5eXF4NHv8Vrz/Snff1nCG3fhNLlSiaJqRtSi+Kli9G61tOMfGsM744ZAECRgEI80+MpujR/kY4Nu+Ll7UVouyYAbFq7hY4Nu/JU4+c5cfQUL/V5PlPyb9KsAWXKlCC4ShP69RnKZ+NGOo0bMXIAEyf8wONVm3LpUixdn38q1fZeXl58/NkInu7Qg1qPt6Djk60oX/4hANas3kCdGmHUq9Waf44cp19/a5E4f/4izzz9CnVrtqL3KwOZ+O0nmdJnV7Vr2ZRvxn7g1hzSK9EYlx/ukiFFTERKisjejNjXvURERopIE9vz/4hI7n+xj/EiUv+OdSPuWK4oIlPuJldX+Vcpw6Xj0cSePEtivIVD4Zso3ax6kpj4azfsz31y50hycjdPQAFKNq7C/hlrsiLdFFWq9ignj53i9IkzxMcnsHjuCkJCGySJCWnRgPm/LQJg17a95PPzpXCRguTJm4fgmlWZNX0+APHxCVyJvQrA0cPHOfbPiaztjIPHqlbg1LHTnDkZQUJ8AkvnraRh83pJYho1r8eC35YCsGf7Pnzz5aVQkYIAeHt7kyNnDry9vcmVKydno84BsHHtZiwWCwC7t+2lSGDhTMm/ZVgTfpkxD4CtW3aS7wFf/P2TH6teg5rMn2ftwy8/zyGsVZNU21cPrsSxoyc4cfwU8fHxzJm9iBatQgD4ffV6e9+2btlJUFCA9bXZvZ+oqBgA/v77MDlz5iB79uyZ0m9XBFepiF8+X7cd/9/QkVgmE5FMPadnjBlmjFlpW/wPkK4iJiIFgJrGmD9sy3VFZAvwqohsFpHGtuPsAYqJSPEMTN+pPAH5uRpxwb58NfICeQPyJ4srHRpM198/pvXUt1j11rf29fVHdGXDqBmYRPee8PUPKEzkmWj7clRkNP53/GD2DyhMZIRDTEQM/oFFeLBkUS6cv8ToL4YzZ9U03h87hFy5c2ZZ7qkpEliYKIecYyLPJutXkcDCRDvEREeepUhgYWKizjF14gyWbZvLyt3hXIm9ysa1m5Mdo12XVmxYvSlT8g8M8ufMmUj7csSZKAKD/JPEFCiYn8uXrtgLj2NMSu0DAwOSrw9Mul+AZ597kpUr1iZb36ZtKLt37efmzZt318H/Z+6LkZiIDBWRAyKyQkRmiMhbtvXVRWSXiGwEejvEdxeR+SKyVEQOisjwVPZd0rbvqSKyW0Rm3Rrt2Pa/VkS2icgyEQm0rV8jIqNEZC3QN4X9+ovIXFt+u0Sktm39PNv+9olIT4f4qyLymYhsF5FVIlLYtn6KiDwpIn2AIOB3Efndtm2iiGy17eu9FLr4JLDUYXks8A7wDdAUOOKwbQHQOYX+9LQda+uGq4dTejldIiLJ1jn7+ju6dCvTGg1kUY9x1HzrSQBKhlTh2vlYzu45flc5ZAin/TAuxWTz9qZCpfLMmDKLDiFdibt2nZff6J5JiaaPk5Rd7pevny+NQuvRssaTNK3chly5cxHWsXmSuB59u2FJsLBo9rKMTNshtbTfl9RiUtrmyuvy5lu9SEhIYOav4UnWP/zwQwwfOYA3+w5LM3+VlMePxEQkGOgIVAU6AMEOm38A+hhjajlpWgN4FqgCPGXbT0rKA5OMMZWAWOA1EfEBvgSeNMZUByYDHzq0ecAY08AY81kK+/wCWGuMqQxUA/bZ1r9o218w0EdECtrW5wG2G2OqAWuBJIXXGPMFEAE0MsY0sq0eYowJBioBDUSkkpM86gDbHJZvAgG2fV42xpx02LYVSDpvdPv4k4wxwcaY4Dp5y6bQZddcjbxA3qAC9uW8gQX4X/TFFOMj/jpIvhJFyJk/L4HB5SjdtBrd/hxH8wm9KVanAk0/73VX+fxb0ZExBBa9/Zt4QKA/MbapsyQxDqOAgKAixESdJSoyhuiIGHZvt35ZLFuwigqVynMviI44S4BDzrdGWI5iImLwd4jxDyzM2ahz1KwfzJmTEVw8f4mEBAurFq+h8uMV7XGtn25B/aZ1eKf3iAzN+aWXn2XthnDWbggnKjKaokUD7duCigYQFRmTJP78uQv4PfB/7d15vJVVvcfxzxc86r1OaZpDhlNqVzFLJVEp59JMJSfUCJTJ7AAAGnhJREFURm9mRipaDqXm0C2zMivNWXPMket0cSQVCRQHQMVZA8dQnEEElcP3/rGeg5vj5hzg7MPaz8Pv/Xrt1z7Pep69+W7Bvc5azxqWomfPnh+75t8vv1L39f/+d53yVz563733/SZf23FrfvSD2QcbrbLKSlxyxZkM/NERPDfhBcK8afXMuX7k0llLrB9wg+1ptqeQWgtIWoZUkbS12y9t97qhtt+wPQ24tnifOXnR9sji58uKa9cFegNDJT0EHAusWvOaqzrJvQ1wFoDtVtvvFOWHSHoYGAV8BmirEWbWvGdbhs7sJWkMMBZYH6g3DGtl4LWa4wOAAUWOKyStXnNuEqm1161efXg8n1h9JZb+zAr0aOnJOrv0ZcLQMbNds8zqH31BrtB7dXouugjT33qXe393NRd+6RAu3vwwbvvJGbw08nGGDjqruyPXNW7s46y2Zi8+3WsVWloW4evf3J47bxs+2zV33jqcXffaCYANN+7NlMnv8tqkN3h90htM/PerrLHWagBs9pU+swZ25PbYQ0/Qa81V+XSvlVmkZRF26L8dd98+YrZrht0+gp332gGADTZan3enTOX1SW/wykuv8vmN12fx/1gMgE2/vAkTnnkOSCMe9zvo2wz63pFMn/Y+jXTBeX9nyy12YcstduGmIf9g7336A7BJny8w+Z0pvPrqax97zYjh97Fr//QZ9t53N26+KfXa33LzHXVfP2b0ONZca3V6rbYqLS0t7Lb7Ttx60x1AGrU46LAD2HfAgUybNn3Wn7H0Mktx5eBz+Z/j/8h9o8YQ5l0ZuhM7u6dUpxE/q7yj1O3Pzeu1Ah6bQysPYGoH71eXpK2A7YDNbL8naRgwpxshHf6NSFoDOBzoY/utYlBGvfeaVltu+3FgZ0m/AV4GLgC2LU4vXlzfrdw6k7t/eTG7XHYkPXr24PGr7ubNp1+m97e3AeDRy+5krR378Lnd+zFzRiszpn/ArQP/2t2x5llrayv/8/Pfc8FVp9GjZ0/+9/Ibefap8Qz43m4AXHXxtdz9j5F8ZbstuP3+65j+3nSOHvTRSLlfH30KfzjrV7Qs2sKLz7/M0Yekc9t9fSuOPelwlvvkspx9+Z948tGn2X/AIQv0c/326FM564o/0aNnT66/Ygj/emoCe343fbFfc8n1/PMf99Bv280YMuoapk+bznGHpk6KcWMfZ+iQu7jy9otobW3lyXFPM/jSNHjlFyf9jEUXbeHsq/6crh39GL8+qvGj9YbeNoztv7olox++g2nTpnHQjz8aEXrV4PMYdNAxvPLKJE447g+cf+GfOPqXhzHukce57JLBHb6+tbWVIw8/kcHX/42ePXry90sH8+STqTf+d6ccz2KLLcq1N1wEpMEdPzv0OH54wHdYY83VOPyon3D4UemOx+67fp/XX3+THI44/mQeGPsIb789mW37f5uBP/gOu+/8tc5fmFEZlp1SR8uKSOoDnANsTqrwRgPn2T5F0iPAQNsjJP0O2Ml2b0nfB04itaSmAfeRuvEerPP+qwMTgM1t3yvpPOBJUlfi48B3ivIWYB3bjxWVz+H13q/mfa8ERtn+s6SepO7CrYH9be8s6XPAQ8AOtodJMrCP7SslHQusaPvgonIaYnuwpHHALrYnSNoQuITUzboC8AhwlO2L2uU4GXjW9vnFcW/bjxajE28FTrP9peLc7sD2tjucRHL6Z77d/P+q5tEZ7z+VO0LDLdajpfOLSujFqR9vVVXBqxO65x5hbi3LrzmnhshcWeOTG871982ENx7u0p81vzpsidl+QNKNwMPA86T7Nm1dc/sBf5P0HtD+X8AIUhfjZ4HLO6pwgCeA70k6B3gGOMv2B5L2AE4rui4XAf7MR/e2OjMIOFfSD4BW4MekSuPAovJ9itSl2GYqsL6k0cXnG1DnPc8FbpE00fbWksYWecYDI+tcD3AT8CPg/OJ4oKQvkLoy+5NGPLbZurg+hBCaQhmWneqwJQYgaUnb7xajBocDB9ieYwdz0RLbxPZBnf7hqSU2xHbveQndaJLetd0tSxhIGgF8w/bbNWUn2D6h5ngx0oCSfrZndPR+0RIrh2iJlUu0xOrrtdwGc/1988Kb45qvJVY4V9J6pHs2F3dUgYW6fgb0At6uKRvW7ppewM87q8BCCGFBKsPaiZ1WYrb3nZc3LO4LXVRbVgxlv6PO5dt2pRUm6Rhgz3bF19j+Tb3r56S7WmHFe99Xp2xYu+NnSF2pIYTQNHKOOpxbC2QVe9tvkOaMNfp9f8Ps88dCCCE0SKNHJ0raAfgL0BM43/bJ7c6rOP914D3g+531/pV62akQQgjdx/ZcPzpTjBQ/A9iRNK92n+JWVa0dSfN31ybNq+10ImpUYiGEEOqaief6MRe+RJpyNN72B8CVwK7trtkVuMTJKOATbUsOzklUYiGEEOpqnTlzrh+1a7wWjwPavd2ngRdrjl8qyub1mtnEzs4hhBDqmptuwpprzyXNp52TekPw2/8Bc3PNbKISCyGEUFeDJzu/RFrooc2qpIXV5/Wa2UR3YgghhLoaObADeABYW9IakhYlbT11Y7trbgS+q6Qv8I7tie3fqFa0xEIIIdTVyHlitmdIOoi0TGFP4G/FergHFufPBm4mDa9/ljTEfr/O3jcqsRBCCHU1ep6Y7ZtJFVVt2dk1P5uaTZbnRlRiIYQQ6mqdWYFlp0IIISycyrCfWFRiIYQQ6pqXIfa5RCUWQgihrjJUYp3uJxYWXpIOKCYwVkYVPxNU83NV8TNBdT9XLjFPLHSk/bIxVVDFzwTV/FxV/ExQ3c+VRVRiIYQQSisqsRBCCKUVlVjoSBX77av4maCan6uKnwmq+7myiIEdIYQQSitaYiGEEEorKrEQQgilFZVYCCGE0opKLAAgqYekzXPnCAsvSWtK+j9Jr0uaJOkGSWvmztUVklaVdHjxWR6QNFzSmZJ2khTfvw0QAzvCLJLutb1Z7hzdQdKGwJeLw3/afjhnnkaR1BNYkZol5Gy/kC/R/JM0CjgDuKIo2hs42Pam+VLNP0kXAp8GhgAPApOAxYF1gK2BjYGf2x6eLWQFRCUWZpF0IvAIcK0r9A9D0iDgh8C1RdE3gXNtn54vVddJOhg4HngVaNszw7Y/ny/V/JN0X/sKS9Io231zZeoKSb1tP9rB+UWBXrafXYCxKicqsTCLpCnAEsAMYDog0pfi0lmDdZGkR4DNbE8tjpcA7i3rl30bSc8Cm9p+I3eWRpB0MvA2cCVgYACwGKl1hu0386ULzSpWsQ+z2F4qd4ZuIqC15ri1KCu7F4F3codooAHF84/alf83qVIr3f0xSVsBz9p+SdJqwAXAksCR0Y3YGFGJhdlIWhZYm9R3D0AF/me7ELhP0nXFcX/Sl0nZjQeGSboJeL+t0Pap+SLNP9tr5M7QDU4Gti9+PgkYDIwFzgI2yhWqSqISC7NI2h8YBKwKPAT0Be4FtsmZq6tsnyrpbmALUgtsP9tjM8dqhBeKx6LFo9QktQA/Br5SFA0DzrH9YbZQXSDpeKAXcJgkAV8j/eKxIrC8pOOAYRX4JTGruCcWZpE0DugDjLL9BUmfA060PaCTlza9Ko3ia0/SUqR7l+/mztIVks4HWoCLi6LvAK2298+Xqmsk3Q/8HFgZGGB7l6J8pO0tsoariGiJhVrTbU+XhKTFbD8pad3cobqq3Si+tvthBso+sKM3cCmwXHH8OvBd249lDTb/+tjesOb4TkllnwpxGHAqqbv3AABJ65N6OkIDRCUWar0k6RPA9cBQSW8B/86cqREGAetWZRRfjXOBn9q+C2YNIjgPKOuk9VZJa9n+F6TJz8w+IKd0bI8ENm1X9hjwkzyJqie6E0NdkrYElgFutf1B7jxdIekuYHvbM3JnaSRJD7drudQtKwtJ25IG4YwntZZXI92/vCtrsPkkqZ/tER2cX5o0T2yOc8lC56IlFmYjqR+wtu0LJa1AWnFgQuZYXVWpUXw1xkv6JalLEeDblPjvyvYdktYG1iVVYk/afr+TlzWz3SX9HrgVGA28Rhr1+1nSih2rAT/LF68aoiUWZilGU21C6npbR9IqwDVlvwFdfK6PsX3igs7SSMV0iBOBfqQv/eHACbbfyhpsPklaHBhI+jwG/gmcbXt61mBdUPwd7UEaGbsyMA14Aripo1ZamHtRiYVZJD0EfBEYY/uLRdkjZV/ZojOSTrd9cO4cCztJVwNTgMuKon2AZW3vmS9VaHbRnRhqfWDbkgyzlmdaGJSqpSnpz7YPlfR/pBbLbNqGcZfQuu3u591VgdGJoZtFJRZqXS3pHOATkn5IWu7nvMyZwse13QM7JWuKxhsrqa/tUQCSNgVGZs4UmlxUYqHW+8A/gMmkm+vH2R6aN1Joz/bo4scv2P5L7blixf67F3yqhtgU+K6ktknovYAnikn4pV2dP3SvuCcWZpH0a9IeTmOAvwG3VWlLljmRNLbtHmCZSBpje6N2ZaX8LADFArlzZPv5BZWl0YqJ6esx+5qkl+RLVB1RiYXZFGu8fRXYjzRS8WrggrYJqGVX7Ka7pO3JNWXft31RvlTzRtI+wL6kUXz/rDm1FGmZpu2yBAt1FaNjtyJVYjcDOwIjbO+RM1dVRHdimE0xsOMV4BXSvmLLAoMlDbV9ZN5080fS5cCBpNUfRgPLSDrV9h8AylSBFe4BJgLLA3+sKZ9C2tQ0NJc9gA2Bsbb3k7QicH7mTJURLbEwi6RDgO8Br5P+J7ve9odF6+UZ22tlDTifJD1ULGj8LdKW8EcBo+MeS1gQJN1v+0uSRpMmOU8BHrW9fuZoldAjd4DQVJYHdrP9NdvXtG2BYXsm8I280bqkpdjmoz9wQ/G5Sv/bm6S+kh6Q9K6kDyS1Sprc+Subk6Qd65QdmCNLgz1YrEl6HqknYAxwf95I1REtsVB5RQvzKOBhYCfSqLfLbH85a7AukvQgaSDONaT7l98FPmv7mKzB5pOke4Bjbd9ZHB8FbGX7Y5VbWUlaHVjadnT7NkhUYmGhJGmRsi8ILOlB25vUrqoi6R7bpVzFXtLywBDgCGAH4HPA3mXdFLONpDtsb9tZWZg/MbAjVF5xI/0kYBXbO0paD9gMuCBvsi57T9KiwEPFQrMTgdKusmL7dUm7kOYqjgb2KPMUj2ItyP8k7eK8LGl9S4ClgVWyBauYaImFypN0C2mLj2NsbyhpEdJIsQ0yR+uSYl7VJNJuyIeRts450/azWYPNI0lTSPco2zYrXZQ0MtakAbNLZ4w334qJ54eSKqzaffkmA+fZ/muWYBUTlVioPEkP2O5TOxG4bcRi7myh+iQdbPv03DmqKroTw8JgqqRPUoxIlNQXeCdvpPnXtgzTnM6XcepAMcn+S6T960xqudxf8u7EbYpBKi9L2q39edvXZohVOVGJhYXBT4EbgbUkjQRWIE1ALasyT3f4GElfBc4EngFeLopXBT4raaDt27OF65otgTuBneucMxCVWANEd2JYKBT3wdp2DH6q7CPeqkTSE8COtp9rV74GcLPt/8oSLJRCtMRCZdXrwimsI6n03Tk1AyIgDYZoAaaWcCDEIsBLdcpfJn2mUiu6so/nox2rRwC/sv1G1mAVEZVYqLK2bpxPAZuTunYgLf0zjJJ359heqvZYUn/SfaWy+RvwgKQrgReLss+QJnKXfRoEwJXAcGD34vhbwFVALNTcANGdGCpP0hDgh7YnFscrA2fYnlNLrbQkjbLdN3eOeVXM3duFNLBDpJbZjbYfzxqsASSNtr1xu7IHbW+SK1OVREssLAxWb6vACq8C6+QK0yjtukt7kJaeKuVvpUVlVfoKaw7ukrQ3aVsjSIOKbsqYp1KiJRYqT9JfgbWBK0hf8nsDz9o+OGuwLpJ0Yc3hDOA50iTaSXkSzR9JywC/IC3QvEJRPAm4ATjZ9tu5sjVCce9yCWBmUdQDmFr8XNrJ3M0iKrGwUChaLW0L/g63fV3OPOEjkm4j3a+82PYrRdlKwPeBbW1vnzFeaHJRiYVQUpLWBP4C9CW1MO8FDrM9PmuweSTpKdvrzuu5MinWTlwbWLytzPbwfImqI/YTC5UlaUTxPEXS5JrHlDLvu1XjctJ9lpVJ6/NdQ+oyLZvnJR1ZLNQMpEWbi61YXuzgdaUgaX/S6MTbgBOL5xNyZqqSqMRCZdnuVzwvZXvpmsdSFbkPIduX2p5RPC6jnAM7BgCfBO6W9KakN0lTIJYD9soZrEEGAX2A521vDXwReC1vpOqI7sRQecVaiY/ZnlIcLwmsb/u+vMm6RtLJwNukeUgmVQaLAWcA2H4zX7rQpmYB6oeATW2/HwtQN05UYqHyJI0FNmpbTFZSD+BB2xvlTdY1kiZ0cNq211xgYbqJpP1sX9j5lc1L0nXAfqRtWbYB3gJabH89a7CKiEosVF6933prd0MOzUvSC7Z75c7RKJK2JO37dqvtD3LnqYKY7BwWBuMlHQKcVRwPBEo1gq8eSS3Aj4GvFEXDgHPKtrixpEfmdApYcQ7nSqO2O9v23ZKWIt0XK3V3drOIllioPEmfAk4jdeUYuAM4tGyTgtuTdD5pgdyLi6LvAK2298+Xat5JehX4GqmbbbZTwD22V1nwqRqnqt3ZzSJaYqHyispq79w5ukEf2xvWHN8p6eFsaebfEGBJ2w+1PyFp2IKP03Cq3dzT9sxia6DQAPEfMlSWpCNt/17S6dQZem77kAyxGqlV0lq2/wWzJj+3Zs40z2z/oINz+y7ILN2kkt3ZzSIqsVBlTxTPD2ZN0X2OIC0u2/aFuDppFFypSHoQGAncAgyzPT1zpEY7kNSdfSwfdWcfkDVRhcQ9sRBKStLiwM+AbYuiocCfylYJFF1r/YAdSHu9vUFa1eIW20/nzLYgSPqF7d/mzlFWUYmFypN0F/W7E7fJEKdhJF0NTAb+XhTtAyxre898qbqu2O9tR1KltjZwr+2BeVN1H0ljYpDH/IvuxLAwOLzm58VJO+zOyJSlkdZtN7DjrpIO7JiN7YmSLgIGA+8Cm+VN1O2UO0CZRSUWKs/26HZFIyXdnSVMY42V1Nf2KABJm5LuLZWSpMtJ949agdGkScGn2v5D1mDdL7rDuiAWAA6VJ2m5msfyknYAVsqdqwE2Be6R9Jyk50hbsWwpaVwHE4ib2Xq2J5M2x7wZ6EWa+1Z10RLrgmiJhYXBaNJvuwI+JO2APMdh3SWyQ+4ADdZSrELSH/ir7Q8llbqVIqkncIjtP3Vw2TULKk8VRSUWFgZHkdaqmyzpl8BGwHuZM3WZ7edzZ2iwc0i/YDwMDJe0GmngSmnZbpW0KzDHSsz2SQswUuXE6MRQeW2L/UrqB5wE/BE42vammaOFTkhaxHapB+FI+g3p/t5VwNS2cttjsoWqkKjEQuVJGmv7i5J+C4yzfXlbWe5s4SPFzs4nAavY3lHSesBmti/IHK1Liike7bnsUzyaRVRiofIkDQFeBrYDNgamAfe3G54eMpN0C3AhcIztDYtJ0GNtb5A5WmhiMToxLAz2Iq0AsYPtt0nb3h+RN1KoY3nbVwMzAYpuxNKtBdmepBUlXVBU0khaT1IVBhY1hajEQuXZfs/2tbafKY4n2r49d67wMVMlfZJi3lSxD9c7eSM1xEWkX6LatpR5mrTLc2iAqMRCCM3ip8CNwFqSRgKXAAfnjdQQlWxhNosYYh9CaAq2x0jaEliXNKfvqbLtUj0HVW1hNoUY2BFCyErSbh2dt33tgsrSHSRtBJwO9AYeBVYA9rBdxlVVmk5UYiGErCRdWPz4KWBz4M7ieGvS/mIdVnJlUIy0rFoLsylEd2IIISvb+8GsqRDr2Z5YHK8MnJEzWyMU+74NJO2ZZuCfks4u275vzSpaYiGEpiDpUdu9a457AI/UlpVRse/bFOCyoqgS+741i2iJhRCaxTBJtwFXkFosewP1Vrsom0ru+9YsohILITQF2wcVgzy+XBSda/u6nJkapFL7vjWb6E4MIYRuJOkJ0qCOF4qiXsATpHljtv35XNmqICqxEEJWkkbY7idpCrPvcizSl/zSmaI1RLGlTEcm235rgYSpoKjEQgghI0ljbG+UO0dZxbJTIYSmIKmvpKVqjpcs7h9VnXIHKLOoxEIIzeIs4N2a4/eKsqqL7rAuiEoshNAs5Jr7G7ZnEiOoQyeiEgshNIvxkg6R1FI8BgHjc4daAKI7sQtiYEcIoSlI+hRwGrANqYvtDuBQ25OyBmuAYhHgtmWnRtoeU3NuOdtvZgtXclGJhRBCN5J0HLAn0LYaf3/gGtu/zpeqOqISCyFkJelI27+XdDp1BjnYPiRDrIYpJjt/sW3BX0n/AYyx/V95k1VD3DQNIeT2RPH8YNYU3ec5YHGgbdX6xYB/ZUtTMdESCyGEbiTpeqAPMJTU0tweGAFMgvK3NHOLSiyE0BQk3UX97sRtMsRpGEnf6+i87YsXVJYqikoshNAUJG1cc7g4sDsww/aRmSKFEohKLITQtCTdbXvL3Dnmh6RxdLAaR6xe3xgxsCOE0BQkLVdz2APYGFgpU5xG+Ebx/JPi+dLi+VukJbVCA0RLLITQFCRNILVcBMwAJgC/sj0ia7AukjTS9hadlYX5Ey2xEEJTsL1G7gzdZAlJ/doqY0mbA0tkzlQZsXZiCKEpSNqzbSsWScdKurZYrqnsfgCcIek5Sc8BZwL/nTdSdUR3YgihKUh6xPbnJfUDfgucAhxtuxJ7iklamvSd+07uLFUS3YkhhGbRWjzvBJxl+wZJJ2TM0xCSftruGOAdYLTth7KEqpDoTgwhNIuXJZ0D7AXcLGkxqvEdtQlwIPDp4nEAsBVwnqSYA9dF0Z0YQmgKkv4T2AEYZ/sZSSsDG9i+PXO0LpF0G7C77XeL4yWBwcA3Sa2x9XLmK7voTgwhNAXb7/HRdiXYnghMzJeoYXoBH9QcfwisZnuapPczZaqMqMRCCKF7XQ6MknRDcbwzcIWkJYDH88WqhuhODCGEblasC9mPNJF7hO2qbjuzwEUlFkIIobSqMPInhBDCQioqsRBCCKUVlVgIIYTSikoshBBCaUUlFkIIobT+H7VK9lh2D1a5AAAAAElFTkSuQmCC"/>
+          <p:cNvSpPr>
+            <a:spLocks noChangeAspect="1" noChangeArrowheads="1"/>
+          </p:cNvSpPr>
+          <p:nvPr/>
+        </p:nvSpPr>
+        <p:spPr bwMode="auto">
+          <a:xfrm>
+            <a:off x="155575" y="-144463"/>
+            <a:ext cx="304800" cy="304801"/>
+          </a:xfrm>
+          <a:prstGeom prst="rect">
+            <a:avLst/>
+          </a:prstGeom>
+          <a:noFill/>
+          <a:extLst>
+            <a:ext uri="{909E8E84-426E-40DD-AFC4-6F175D3DCCD1}">
+              <a14:hiddenFill xmlns:a14="http://schemas.microsoft.com/office/drawing/2010/main">
+                <a:solidFill>
+                  <a:srgbClr val="FFFFFF"/>
+                </a:solidFill>
+              </a14:hiddenFill>
+            </a:ext>
+          </a:extLst>
+        </p:spPr>
+        <p:txBody>
+          <a:bodyPr vert="horz" wrap="square" lIns="91440" tIns="45720" rIns="91440" bIns="45720" numCol="1" anchor="t" anchorCtr="0" compatLnSpc="1">
+            <a:prstTxWarp prst="textNoShape">
+              <a:avLst/>
+            </a:prstTxWarp>
+          </a:bodyPr>
+          <a:lstStyle/>
+          <a:p>
+            <a:endParaRPr lang="en-US"/>
+          </a:p>
+        </p:txBody>
+      </p:sp>
+      <p:pic>
+        <p:nvPicPr>
+          <p:cNvPr id="5" name="Picture 4"/>
+          <p:cNvPicPr>
+            <a:picLocks noChangeAspect="1"/>
+          </p:cNvPicPr>
+          <p:nvPr/>
+        </p:nvPicPr>
+        <p:blipFill>
+          <a:blip r:embed="rId2"/>
+          <a:stretch>
+            <a:fillRect/>
+          </a:stretch>
+        </p:blipFill>
+        <p:spPr>
+          <a:xfrm>
+            <a:off x="460375" y="1825625"/>
+            <a:ext cx="6467285" cy="4660060"/>
+          </a:xfrm>
+          <a:prstGeom prst="rect">
+            <a:avLst/>
+          </a:prstGeom>
+          <a:ln>
+            <a:solidFill>
+              <a:schemeClr val="bg2">
+                <a:lumMod val="90000"/>
+              </a:schemeClr>
+            </a:solidFill>
+          </a:ln>
+        </p:spPr>
+      </p:pic>
+    </p:spTree>
+    <p:extLst>
+      <p:ext uri="{BB962C8B-B14F-4D97-AF65-F5344CB8AC3E}">
+        <p14:creationId xmlns:p14="http://schemas.microsoft.com/office/powerpoint/2010/main" val="3052993595"/>
+      </p:ext>
+    </p:extLst>
+  </p:cSld>
+  <p:clrMapOvr>
+    <a:masterClrMapping/>
+  </p:clrMapOvr>
+</p:sld>
+</file>
+
+<file path=ppt/slides/slide16.xml><?xml version="1.0" encoding="utf-8"?>
+<p:sld xmlns:a="http://schemas.openxmlformats.org/drawingml/2006/main" xmlns:r="http://schemas.openxmlformats.org/officeDocument/2006/relationships" xmlns:p="http://schemas.openxmlformats.org/presentationml/2006/main">
+  <p:cSld>
+    <p:spTree>
+      <p:nvGrpSpPr>
+        <p:cNvPr id="1" name=""/>
+        <p:cNvGrpSpPr/>
+        <p:nvPr/>
+      </p:nvGrpSpPr>
+      <p:grpSpPr>
+        <a:xfrm>
+          <a:off x="0" y="0"/>
+          <a:ext cx="0" cy="0"/>
+          <a:chOff x="0" y="0"/>
+          <a:chExt cx="0" cy="0"/>
+        </a:xfrm>
+      </p:grpSpPr>
+      <p:sp>
+        <p:nvSpPr>
+          <p:cNvPr id="2" name="Title 1"/>
+          <p:cNvSpPr>
+            <a:spLocks noGrp="1"/>
+          </p:cNvSpPr>
+          <p:nvPr>
+            <p:ph type="title"/>
+          </p:nvPr>
+        </p:nvSpPr>
+        <p:spPr/>
+        <p:txBody>
+          <a:bodyPr/>
+          <a:lstStyle/>
+          <a:p>
             <a:r>
               <a:rPr lang="en-US" dirty="0" smtClean="0"/>
               <a:t>Multi variate regression Model</a:t>
@@ -4469,7 +4594,7 @@
 </p:sld>
 </file>
 
-<file path=ppt/slides/slide16.xml><?xml version="1.0" encoding="utf-8"?>
+<file path=ppt/slides/slide17.xml><?xml version="1.0" encoding="utf-8"?>
 <p:sld xmlns:a="http://schemas.openxmlformats.org/drawingml/2006/main" xmlns:r="http://schemas.openxmlformats.org/officeDocument/2006/relationships" xmlns:p="http://schemas.openxmlformats.org/presentationml/2006/main">
   <p:cSld>
     <p:spTree>

</xml_diff>